<commit_message>
MySQL PPT is in progress
MySQL PPT is in progress
</commit_message>
<xml_diff>
--- a/Offline/BusinessManagement/Teach_Tech@anodiam/IT/CourseMaterials/MySQL/MySQL.pptx
+++ b/Offline/BusinessManagement/Teach_Tech@anodiam/IT/CourseMaterials/MySQL/MySQL.pptx
@@ -2,22 +2,23 @@
 <file path=ppt/presentation.xml><?xml version="1.0" encoding="utf-8"?>
 <p:presentation xmlns:a="http://schemas.openxmlformats.org/drawingml/2006/main" xmlns:r="http://schemas.openxmlformats.org/officeDocument/2006/relationships" xmlns:p="http://schemas.openxmlformats.org/presentationml/2006/main" saveSubsetFonts="1">
   <p:sldMasterIdLst>
-    <p:sldMasterId id="2147483648" r:id="rId1"/>
+    <p:sldMasterId id="2147483660" r:id="rId1"/>
   </p:sldMasterIdLst>
   <p:notesMasterIdLst>
-    <p:notesMasterId r:id="rId4"/>
+    <p:notesMasterId r:id="rId5"/>
   </p:notesMasterIdLst>
   <p:sldIdLst>
     <p:sldId id="259" r:id="rId2"/>
     <p:sldId id="260" r:id="rId3"/>
+    <p:sldId id="261" r:id="rId4"/>
   </p:sldIdLst>
-  <p:sldSz cx="12192000" cy="6858000"/>
+  <p:sldSz cx="12192000" cy="7218363"/>
   <p:notesSz cx="6858000" cy="9144000"/>
   <p:defaultTextStyle>
     <a:defPPr>
       <a:defRPr lang="en-US"/>
     </a:defPPr>
-    <a:lvl1pPr marL="0" algn="l" defTabSz="914400" rtl="0" eaLnBrk="1" latinLnBrk="0" hangingPunct="1">
+    <a:lvl1pPr marL="0" algn="l" defTabSz="457200" rtl="0" eaLnBrk="1" latinLnBrk="0" hangingPunct="1">
       <a:defRPr sz="1800" kern="1200">
         <a:solidFill>
           <a:schemeClr val="tx1"/>
@@ -27,7 +28,7 @@
         <a:cs typeface="+mn-cs"/>
       </a:defRPr>
     </a:lvl1pPr>
-    <a:lvl2pPr marL="457200" algn="l" defTabSz="914400" rtl="0" eaLnBrk="1" latinLnBrk="0" hangingPunct="1">
+    <a:lvl2pPr marL="457200" algn="l" defTabSz="457200" rtl="0" eaLnBrk="1" latinLnBrk="0" hangingPunct="1">
       <a:defRPr sz="1800" kern="1200">
         <a:solidFill>
           <a:schemeClr val="tx1"/>
@@ -37,7 +38,7 @@
         <a:cs typeface="+mn-cs"/>
       </a:defRPr>
     </a:lvl2pPr>
-    <a:lvl3pPr marL="914400" algn="l" defTabSz="914400" rtl="0" eaLnBrk="1" latinLnBrk="0" hangingPunct="1">
+    <a:lvl3pPr marL="914400" algn="l" defTabSz="457200" rtl="0" eaLnBrk="1" latinLnBrk="0" hangingPunct="1">
       <a:defRPr sz="1800" kern="1200">
         <a:solidFill>
           <a:schemeClr val="tx1"/>
@@ -47,7 +48,7 @@
         <a:cs typeface="+mn-cs"/>
       </a:defRPr>
     </a:lvl3pPr>
-    <a:lvl4pPr marL="1371600" algn="l" defTabSz="914400" rtl="0" eaLnBrk="1" latinLnBrk="0" hangingPunct="1">
+    <a:lvl4pPr marL="1371600" algn="l" defTabSz="457200" rtl="0" eaLnBrk="1" latinLnBrk="0" hangingPunct="1">
       <a:defRPr sz="1800" kern="1200">
         <a:solidFill>
           <a:schemeClr val="tx1"/>
@@ -57,7 +58,7 @@
         <a:cs typeface="+mn-cs"/>
       </a:defRPr>
     </a:lvl4pPr>
-    <a:lvl5pPr marL="1828800" algn="l" defTabSz="914400" rtl="0" eaLnBrk="1" latinLnBrk="0" hangingPunct="1">
+    <a:lvl5pPr marL="1828800" algn="l" defTabSz="457200" rtl="0" eaLnBrk="1" latinLnBrk="0" hangingPunct="1">
       <a:defRPr sz="1800" kern="1200">
         <a:solidFill>
           <a:schemeClr val="tx1"/>
@@ -67,7 +68,7 @@
         <a:cs typeface="+mn-cs"/>
       </a:defRPr>
     </a:lvl5pPr>
-    <a:lvl6pPr marL="2286000" algn="l" defTabSz="914400" rtl="0" eaLnBrk="1" latinLnBrk="0" hangingPunct="1">
+    <a:lvl6pPr marL="2286000" algn="l" defTabSz="457200" rtl="0" eaLnBrk="1" latinLnBrk="0" hangingPunct="1">
       <a:defRPr sz="1800" kern="1200">
         <a:solidFill>
           <a:schemeClr val="tx1"/>
@@ -77,7 +78,7 @@
         <a:cs typeface="+mn-cs"/>
       </a:defRPr>
     </a:lvl6pPr>
-    <a:lvl7pPr marL="2743200" algn="l" defTabSz="914400" rtl="0" eaLnBrk="1" latinLnBrk="0" hangingPunct="1">
+    <a:lvl7pPr marL="2743200" algn="l" defTabSz="457200" rtl="0" eaLnBrk="1" latinLnBrk="0" hangingPunct="1">
       <a:defRPr sz="1800" kern="1200">
         <a:solidFill>
           <a:schemeClr val="tx1"/>
@@ -87,7 +88,7 @@
         <a:cs typeface="+mn-cs"/>
       </a:defRPr>
     </a:lvl7pPr>
-    <a:lvl8pPr marL="3200400" algn="l" defTabSz="914400" rtl="0" eaLnBrk="1" latinLnBrk="0" hangingPunct="1">
+    <a:lvl8pPr marL="3200400" algn="l" defTabSz="457200" rtl="0" eaLnBrk="1" latinLnBrk="0" hangingPunct="1">
       <a:defRPr sz="1800" kern="1200">
         <a:solidFill>
           <a:schemeClr val="tx1"/>
@@ -97,7 +98,7 @@
         <a:cs typeface="+mn-cs"/>
       </a:defRPr>
     </a:lvl8pPr>
-    <a:lvl9pPr marL="3657600" algn="l" defTabSz="914400" rtl="0" eaLnBrk="1" latinLnBrk="0" hangingPunct="1">
+    <a:lvl9pPr marL="3657600" algn="l" defTabSz="457200" rtl="0" eaLnBrk="1" latinLnBrk="0" hangingPunct="1">
       <a:defRPr sz="1800" kern="1200">
         <a:solidFill>
           <a:schemeClr val="tx1"/>
@@ -216,8 +217,8 @@
         </p:nvSpPr>
         <p:spPr>
           <a:xfrm>
-            <a:off x="685800" y="1143000"/>
-            <a:ext cx="5486400" cy="3086100"/>
+            <a:off x="822325" y="1143000"/>
+            <a:ext cx="5213350" cy="3086100"/>
           </a:xfrm>
           <a:prstGeom prst="rect">
             <a:avLst/>
@@ -485,13 +486,7 @@
       </p:grpSpPr>
       <p:sp>
         <p:nvSpPr>
-          <p:cNvPr id="2" name="Title 1">
-            <a:extLst>
-              <a:ext uri="{FF2B5EF4-FFF2-40B4-BE49-F238E27FC236}">
-                <a16:creationId xmlns:a16="http://schemas.microsoft.com/office/drawing/2014/main" id="{920CC966-701D-CCF5-AA19-13C4F4A4F3CF}"/>
-              </a:ext>
-            </a:extLst>
-          </p:cNvPr>
+          <p:cNvPr id="2" name="Title 1"/>
           <p:cNvSpPr>
             <a:spLocks noGrp="1"/>
           </p:cNvSpPr>
@@ -501,8 +496,8 @@
         </p:nvSpPr>
         <p:spPr>
           <a:xfrm>
-            <a:off x="1524000" y="1122363"/>
-            <a:ext cx="9144000" cy="2387600"/>
+            <a:off x="1524000" y="1181339"/>
+            <a:ext cx="9144000" cy="2513060"/>
           </a:xfrm>
         </p:spPr>
         <p:txBody>
@@ -517,19 +512,13 @@
               <a:rPr lang="en-US"/>
               <a:t>Click to edit Master title style</a:t>
             </a:r>
-            <a:endParaRPr lang="en-IN"/>
-          </a:p>
-        </p:txBody>
-      </p:sp>
-      <p:sp>
-        <p:nvSpPr>
-          <p:cNvPr id="3" name="Subtitle 2">
-            <a:extLst>
-              <a:ext uri="{FF2B5EF4-FFF2-40B4-BE49-F238E27FC236}">
-                <a16:creationId xmlns:a16="http://schemas.microsoft.com/office/drawing/2014/main" id="{F798F6ED-EA82-12BC-565E-1CE91199FBAC}"/>
-              </a:ext>
-            </a:extLst>
-          </p:cNvPr>
+            <a:endParaRPr lang="en-US" dirty="0"/>
+          </a:p>
+        </p:txBody>
+      </p:sp>
+      <p:sp>
+        <p:nvSpPr>
+          <p:cNvPr id="3" name="Subtitle 2"/>
           <p:cNvSpPr>
             <a:spLocks noGrp="1"/>
           </p:cNvSpPr>
@@ -539,8 +528,8 @@
         </p:nvSpPr>
         <p:spPr>
           <a:xfrm>
-            <a:off x="1524000" y="3602038"/>
-            <a:ext cx="9144000" cy="1655762"/>
+            <a:off x="1524000" y="3791312"/>
+            <a:ext cx="9144000" cy="1742766"/>
           </a:xfrm>
         </p:spPr>
         <p:txBody>
@@ -588,19 +577,13 @@
               <a:rPr lang="en-US"/>
               <a:t>Click to edit Master subtitle style</a:t>
             </a:r>
-            <a:endParaRPr lang="en-IN"/>
-          </a:p>
-        </p:txBody>
-      </p:sp>
-      <p:sp>
-        <p:nvSpPr>
-          <p:cNvPr id="4" name="Date Placeholder 3">
-            <a:extLst>
-              <a:ext uri="{FF2B5EF4-FFF2-40B4-BE49-F238E27FC236}">
-                <a16:creationId xmlns:a16="http://schemas.microsoft.com/office/drawing/2014/main" id="{DF02A626-1CB6-7BA0-AF9B-6945F99A3805}"/>
-              </a:ext>
-            </a:extLst>
-          </p:cNvPr>
+            <a:endParaRPr lang="en-US" dirty="0"/>
+          </a:p>
+        </p:txBody>
+      </p:sp>
+      <p:sp>
+        <p:nvSpPr>
+          <p:cNvPr id="4" name="Date Placeholder 3"/>
           <p:cNvSpPr>
             <a:spLocks noGrp="1"/>
           </p:cNvSpPr>
@@ -623,13 +606,7 @@
       </p:sp>
       <p:sp>
         <p:nvSpPr>
-          <p:cNvPr id="5" name="Footer Placeholder 4">
-            <a:extLst>
-              <a:ext uri="{FF2B5EF4-FFF2-40B4-BE49-F238E27FC236}">
-                <a16:creationId xmlns:a16="http://schemas.microsoft.com/office/drawing/2014/main" id="{9736BBD8-5097-D352-F016-55791DA12BC7}"/>
-              </a:ext>
-            </a:extLst>
-          </p:cNvPr>
+          <p:cNvPr id="5" name="Footer Placeholder 4"/>
           <p:cNvSpPr>
             <a:spLocks noGrp="1"/>
           </p:cNvSpPr>
@@ -648,13 +625,7 @@
       </p:sp>
       <p:sp>
         <p:nvSpPr>
-          <p:cNvPr id="6" name="Slide Number Placeholder 5">
-            <a:extLst>
-              <a:ext uri="{FF2B5EF4-FFF2-40B4-BE49-F238E27FC236}">
-                <a16:creationId xmlns:a16="http://schemas.microsoft.com/office/drawing/2014/main" id="{FDB1331F-96A8-D97C-D736-DC99F96CF53B}"/>
-              </a:ext>
-            </a:extLst>
-          </p:cNvPr>
+          <p:cNvPr id="6" name="Slide Number Placeholder 5"/>
           <p:cNvSpPr>
             <a:spLocks noGrp="1"/>
           </p:cNvSpPr>
@@ -678,7 +649,7 @@
     </p:spTree>
     <p:extLst>
       <p:ext uri="{BB962C8B-B14F-4D97-AF65-F5344CB8AC3E}">
-        <p14:creationId xmlns:p14="http://schemas.microsoft.com/office/powerpoint/2010/main" val="2790869870"/>
+        <p14:creationId xmlns:p14="http://schemas.microsoft.com/office/powerpoint/2010/main" val="490733599"/>
       </p:ext>
     </p:extLst>
   </p:cSld>
@@ -707,13 +678,7 @@
       </p:grpSpPr>
       <p:sp>
         <p:nvSpPr>
-          <p:cNvPr id="2" name="Title 1">
-            <a:extLst>
-              <a:ext uri="{FF2B5EF4-FFF2-40B4-BE49-F238E27FC236}">
-                <a16:creationId xmlns:a16="http://schemas.microsoft.com/office/drawing/2014/main" id="{CFC6786F-676B-2FA7-C203-1C9FD2CAEAB8}"/>
-              </a:ext>
-            </a:extLst>
-          </p:cNvPr>
+          <p:cNvPr id="2" name="Title 1"/>
           <p:cNvSpPr>
             <a:spLocks noGrp="1"/>
           </p:cNvSpPr>
@@ -730,19 +695,13 @@
               <a:rPr lang="en-US"/>
               <a:t>Click to edit Master title style</a:t>
             </a:r>
-            <a:endParaRPr lang="en-IN"/>
-          </a:p>
-        </p:txBody>
-      </p:sp>
-      <p:sp>
-        <p:nvSpPr>
-          <p:cNvPr id="3" name="Vertical Text Placeholder 2">
-            <a:extLst>
-              <a:ext uri="{FF2B5EF4-FFF2-40B4-BE49-F238E27FC236}">
-                <a16:creationId xmlns:a16="http://schemas.microsoft.com/office/drawing/2014/main" id="{8E4A3051-142A-5288-2AF3-F3EF741AEC18}"/>
-              </a:ext>
-            </a:extLst>
-          </p:cNvPr>
+            <a:endParaRPr lang="en-US" dirty="0"/>
+          </a:p>
+        </p:txBody>
+      </p:sp>
+      <p:sp>
+        <p:nvSpPr>
+          <p:cNvPr id="3" name="Vertical Text Placeholder 2"/>
           <p:cNvSpPr>
             <a:spLocks noGrp="1"/>
           </p:cNvSpPr>
@@ -788,19 +747,13 @@
               <a:rPr lang="en-US"/>
               <a:t>Fifth level</a:t>
             </a:r>
-            <a:endParaRPr lang="en-IN"/>
-          </a:p>
-        </p:txBody>
-      </p:sp>
-      <p:sp>
-        <p:nvSpPr>
-          <p:cNvPr id="4" name="Date Placeholder 3">
-            <a:extLst>
-              <a:ext uri="{FF2B5EF4-FFF2-40B4-BE49-F238E27FC236}">
-                <a16:creationId xmlns:a16="http://schemas.microsoft.com/office/drawing/2014/main" id="{35FDCBF7-AC68-DA5B-A237-CB899226993A}"/>
-              </a:ext>
-            </a:extLst>
-          </p:cNvPr>
+            <a:endParaRPr lang="en-US" dirty="0"/>
+          </a:p>
+        </p:txBody>
+      </p:sp>
+      <p:sp>
+        <p:nvSpPr>
+          <p:cNvPr id="4" name="Date Placeholder 3"/>
           <p:cNvSpPr>
             <a:spLocks noGrp="1"/>
           </p:cNvSpPr>
@@ -823,13 +776,7 @@
       </p:sp>
       <p:sp>
         <p:nvSpPr>
-          <p:cNvPr id="5" name="Footer Placeholder 4">
-            <a:extLst>
-              <a:ext uri="{FF2B5EF4-FFF2-40B4-BE49-F238E27FC236}">
-                <a16:creationId xmlns:a16="http://schemas.microsoft.com/office/drawing/2014/main" id="{EA8E48DA-189D-B711-92C8-65FB0CBBBAA7}"/>
-              </a:ext>
-            </a:extLst>
-          </p:cNvPr>
+          <p:cNvPr id="5" name="Footer Placeholder 4"/>
           <p:cNvSpPr>
             <a:spLocks noGrp="1"/>
           </p:cNvSpPr>
@@ -848,13 +795,7 @@
       </p:sp>
       <p:sp>
         <p:nvSpPr>
-          <p:cNvPr id="6" name="Slide Number Placeholder 5">
-            <a:extLst>
-              <a:ext uri="{FF2B5EF4-FFF2-40B4-BE49-F238E27FC236}">
-                <a16:creationId xmlns:a16="http://schemas.microsoft.com/office/drawing/2014/main" id="{B5CFE988-A33F-A848-6D15-79C60B592B70}"/>
-              </a:ext>
-            </a:extLst>
-          </p:cNvPr>
+          <p:cNvPr id="6" name="Slide Number Placeholder 5"/>
           <p:cNvSpPr>
             <a:spLocks noGrp="1"/>
           </p:cNvSpPr>
@@ -878,7 +819,7 @@
     </p:spTree>
     <p:extLst>
       <p:ext uri="{BB962C8B-B14F-4D97-AF65-F5344CB8AC3E}">
-        <p14:creationId xmlns:p14="http://schemas.microsoft.com/office/powerpoint/2010/main" val="100683703"/>
+        <p14:creationId xmlns:p14="http://schemas.microsoft.com/office/powerpoint/2010/main" val="3747352942"/>
       </p:ext>
     </p:extLst>
   </p:cSld>
@@ -907,13 +848,7 @@
       </p:grpSpPr>
       <p:sp>
         <p:nvSpPr>
-          <p:cNvPr id="2" name="Vertical Title 1">
-            <a:extLst>
-              <a:ext uri="{FF2B5EF4-FFF2-40B4-BE49-F238E27FC236}">
-                <a16:creationId xmlns:a16="http://schemas.microsoft.com/office/drawing/2014/main" id="{96B90F2F-E0F0-A149-556E-516173B8F407}"/>
-              </a:ext>
-            </a:extLst>
-          </p:cNvPr>
+          <p:cNvPr id="2" name="Vertical Title 1"/>
           <p:cNvSpPr>
             <a:spLocks noGrp="1"/>
           </p:cNvSpPr>
@@ -923,8 +858,8 @@
         </p:nvSpPr>
         <p:spPr>
           <a:xfrm>
-            <a:off x="8724900" y="365125"/>
-            <a:ext cx="2628900" cy="5811838"/>
+            <a:off x="8724900" y="384311"/>
+            <a:ext cx="2628900" cy="6117229"/>
           </a:xfrm>
         </p:spPr>
         <p:txBody>
@@ -935,19 +870,13 @@
               <a:rPr lang="en-US"/>
               <a:t>Click to edit Master title style</a:t>
             </a:r>
-            <a:endParaRPr lang="en-IN"/>
-          </a:p>
-        </p:txBody>
-      </p:sp>
-      <p:sp>
-        <p:nvSpPr>
-          <p:cNvPr id="3" name="Vertical Text Placeholder 2">
-            <a:extLst>
-              <a:ext uri="{FF2B5EF4-FFF2-40B4-BE49-F238E27FC236}">
-                <a16:creationId xmlns:a16="http://schemas.microsoft.com/office/drawing/2014/main" id="{DCE0996D-0E0C-7B3A-E00A-18C374FE8CDB}"/>
-              </a:ext>
-            </a:extLst>
-          </p:cNvPr>
+            <a:endParaRPr lang="en-US" dirty="0"/>
+          </a:p>
+        </p:txBody>
+      </p:sp>
+      <p:sp>
+        <p:nvSpPr>
+          <p:cNvPr id="3" name="Vertical Text Placeholder 2"/>
           <p:cNvSpPr>
             <a:spLocks noGrp="1"/>
           </p:cNvSpPr>
@@ -957,8 +886,8 @@
         </p:nvSpPr>
         <p:spPr>
           <a:xfrm>
-            <a:off x="838200" y="365125"/>
-            <a:ext cx="7734300" cy="5811838"/>
+            <a:off x="838200" y="384311"/>
+            <a:ext cx="7734300" cy="6117229"/>
           </a:xfrm>
         </p:spPr>
         <p:txBody>
@@ -998,19 +927,13 @@
               <a:rPr lang="en-US"/>
               <a:t>Fifth level</a:t>
             </a:r>
-            <a:endParaRPr lang="en-IN"/>
-          </a:p>
-        </p:txBody>
-      </p:sp>
-      <p:sp>
-        <p:nvSpPr>
-          <p:cNvPr id="4" name="Date Placeholder 3">
-            <a:extLst>
-              <a:ext uri="{FF2B5EF4-FFF2-40B4-BE49-F238E27FC236}">
-                <a16:creationId xmlns:a16="http://schemas.microsoft.com/office/drawing/2014/main" id="{1311614C-329B-C278-BACA-4D5087D2011C}"/>
-              </a:ext>
-            </a:extLst>
-          </p:cNvPr>
+            <a:endParaRPr lang="en-US" dirty="0"/>
+          </a:p>
+        </p:txBody>
+      </p:sp>
+      <p:sp>
+        <p:nvSpPr>
+          <p:cNvPr id="4" name="Date Placeholder 3"/>
           <p:cNvSpPr>
             <a:spLocks noGrp="1"/>
           </p:cNvSpPr>
@@ -1033,13 +956,7 @@
       </p:sp>
       <p:sp>
         <p:nvSpPr>
-          <p:cNvPr id="5" name="Footer Placeholder 4">
-            <a:extLst>
-              <a:ext uri="{FF2B5EF4-FFF2-40B4-BE49-F238E27FC236}">
-                <a16:creationId xmlns:a16="http://schemas.microsoft.com/office/drawing/2014/main" id="{E2475F54-94E3-37F2-D92F-944B69039F59}"/>
-              </a:ext>
-            </a:extLst>
-          </p:cNvPr>
+          <p:cNvPr id="5" name="Footer Placeholder 4"/>
           <p:cNvSpPr>
             <a:spLocks noGrp="1"/>
           </p:cNvSpPr>
@@ -1058,13 +975,7 @@
       </p:sp>
       <p:sp>
         <p:nvSpPr>
-          <p:cNvPr id="6" name="Slide Number Placeholder 5">
-            <a:extLst>
-              <a:ext uri="{FF2B5EF4-FFF2-40B4-BE49-F238E27FC236}">
-                <a16:creationId xmlns:a16="http://schemas.microsoft.com/office/drawing/2014/main" id="{37F559BC-7C4E-FA63-48CE-E42F402DD953}"/>
-              </a:ext>
-            </a:extLst>
-          </p:cNvPr>
+          <p:cNvPr id="6" name="Slide Number Placeholder 5"/>
           <p:cNvSpPr>
             <a:spLocks noGrp="1"/>
           </p:cNvSpPr>
@@ -1088,7 +999,7 @@
     </p:spTree>
     <p:extLst>
       <p:ext uri="{BB962C8B-B14F-4D97-AF65-F5344CB8AC3E}">
-        <p14:creationId xmlns:p14="http://schemas.microsoft.com/office/powerpoint/2010/main" val="1888863254"/>
+        <p14:creationId xmlns:p14="http://schemas.microsoft.com/office/powerpoint/2010/main" val="1566528382"/>
       </p:ext>
     </p:extLst>
   </p:cSld>
@@ -1117,13 +1028,7 @@
       </p:grpSpPr>
       <p:sp>
         <p:nvSpPr>
-          <p:cNvPr id="2" name="Title 1">
-            <a:extLst>
-              <a:ext uri="{FF2B5EF4-FFF2-40B4-BE49-F238E27FC236}">
-                <a16:creationId xmlns:a16="http://schemas.microsoft.com/office/drawing/2014/main" id="{E23BC93C-5298-9D70-561E-E791007B6E09}"/>
-              </a:ext>
-            </a:extLst>
-          </p:cNvPr>
+          <p:cNvPr id="2" name="Title 1"/>
           <p:cNvSpPr>
             <a:spLocks noGrp="1"/>
           </p:cNvSpPr>
@@ -1140,19 +1045,13 @@
               <a:rPr lang="en-US"/>
               <a:t>Click to edit Master title style</a:t>
             </a:r>
-            <a:endParaRPr lang="en-IN"/>
-          </a:p>
-        </p:txBody>
-      </p:sp>
-      <p:sp>
-        <p:nvSpPr>
-          <p:cNvPr id="3" name="Content Placeholder 2">
-            <a:extLst>
-              <a:ext uri="{FF2B5EF4-FFF2-40B4-BE49-F238E27FC236}">
-                <a16:creationId xmlns:a16="http://schemas.microsoft.com/office/drawing/2014/main" id="{FB2793A6-EEAE-0BDF-32A7-70E0157EA1C8}"/>
-              </a:ext>
-            </a:extLst>
-          </p:cNvPr>
+            <a:endParaRPr lang="en-US" dirty="0"/>
+          </a:p>
+        </p:txBody>
+      </p:sp>
+      <p:sp>
+        <p:nvSpPr>
+          <p:cNvPr id="3" name="Content Placeholder 2"/>
           <p:cNvSpPr>
             <a:spLocks noGrp="1"/>
           </p:cNvSpPr>
@@ -1198,19 +1097,13 @@
               <a:rPr lang="en-US"/>
               <a:t>Fifth level</a:t>
             </a:r>
-            <a:endParaRPr lang="en-IN"/>
-          </a:p>
-        </p:txBody>
-      </p:sp>
-      <p:sp>
-        <p:nvSpPr>
-          <p:cNvPr id="4" name="Date Placeholder 3">
-            <a:extLst>
-              <a:ext uri="{FF2B5EF4-FFF2-40B4-BE49-F238E27FC236}">
-                <a16:creationId xmlns:a16="http://schemas.microsoft.com/office/drawing/2014/main" id="{62CB391A-D822-437C-1475-B07DFF353429}"/>
-              </a:ext>
-            </a:extLst>
-          </p:cNvPr>
+            <a:endParaRPr lang="en-US" dirty="0"/>
+          </a:p>
+        </p:txBody>
+      </p:sp>
+      <p:sp>
+        <p:nvSpPr>
+          <p:cNvPr id="4" name="Date Placeholder 3"/>
           <p:cNvSpPr>
             <a:spLocks noGrp="1"/>
           </p:cNvSpPr>
@@ -1233,13 +1126,7 @@
       </p:sp>
       <p:sp>
         <p:nvSpPr>
-          <p:cNvPr id="5" name="Footer Placeholder 4">
-            <a:extLst>
-              <a:ext uri="{FF2B5EF4-FFF2-40B4-BE49-F238E27FC236}">
-                <a16:creationId xmlns:a16="http://schemas.microsoft.com/office/drawing/2014/main" id="{4ABFE0D6-D0AE-929D-8AE8-7B943535A97F}"/>
-              </a:ext>
-            </a:extLst>
-          </p:cNvPr>
+          <p:cNvPr id="5" name="Footer Placeholder 4"/>
           <p:cNvSpPr>
             <a:spLocks noGrp="1"/>
           </p:cNvSpPr>
@@ -1258,13 +1145,7 @@
       </p:sp>
       <p:sp>
         <p:nvSpPr>
-          <p:cNvPr id="6" name="Slide Number Placeholder 5">
-            <a:extLst>
-              <a:ext uri="{FF2B5EF4-FFF2-40B4-BE49-F238E27FC236}">
-                <a16:creationId xmlns:a16="http://schemas.microsoft.com/office/drawing/2014/main" id="{ECCD7E6E-DF51-9D7C-6F25-9007648DEEF9}"/>
-              </a:ext>
-            </a:extLst>
-          </p:cNvPr>
+          <p:cNvPr id="6" name="Slide Number Placeholder 5"/>
           <p:cNvSpPr>
             <a:spLocks noGrp="1"/>
           </p:cNvSpPr>
@@ -1288,7 +1169,7 @@
     </p:spTree>
     <p:extLst>
       <p:ext uri="{BB962C8B-B14F-4D97-AF65-F5344CB8AC3E}">
-        <p14:creationId xmlns:p14="http://schemas.microsoft.com/office/powerpoint/2010/main" val="1575234213"/>
+        <p14:creationId xmlns:p14="http://schemas.microsoft.com/office/powerpoint/2010/main" val="1151373625"/>
       </p:ext>
     </p:extLst>
   </p:cSld>
@@ -1317,13 +1198,7 @@
       </p:grpSpPr>
       <p:sp>
         <p:nvSpPr>
-          <p:cNvPr id="2" name="Title 1">
-            <a:extLst>
-              <a:ext uri="{FF2B5EF4-FFF2-40B4-BE49-F238E27FC236}">
-                <a16:creationId xmlns:a16="http://schemas.microsoft.com/office/drawing/2014/main" id="{F48F107F-6103-7404-1D47-15E9FF01B5B9}"/>
-              </a:ext>
-            </a:extLst>
-          </p:cNvPr>
+          <p:cNvPr id="2" name="Title 1"/>
           <p:cNvSpPr>
             <a:spLocks noGrp="1"/>
           </p:cNvSpPr>
@@ -1333,8 +1208,8 @@
         </p:nvSpPr>
         <p:spPr>
           <a:xfrm>
-            <a:off x="831850" y="1709738"/>
-            <a:ext cx="10515600" cy="2852737"/>
+            <a:off x="831850" y="1799579"/>
+            <a:ext cx="10515600" cy="3002638"/>
           </a:xfrm>
         </p:spPr>
         <p:txBody>
@@ -1349,19 +1224,13 @@
               <a:rPr lang="en-US"/>
               <a:t>Click to edit Master title style</a:t>
             </a:r>
-            <a:endParaRPr lang="en-IN"/>
-          </a:p>
-        </p:txBody>
-      </p:sp>
-      <p:sp>
-        <p:nvSpPr>
-          <p:cNvPr id="3" name="Text Placeholder 2">
-            <a:extLst>
-              <a:ext uri="{FF2B5EF4-FFF2-40B4-BE49-F238E27FC236}">
-                <a16:creationId xmlns:a16="http://schemas.microsoft.com/office/drawing/2014/main" id="{07911928-8FD1-C89C-76DD-4AC602A46126}"/>
-              </a:ext>
-            </a:extLst>
-          </p:cNvPr>
+            <a:endParaRPr lang="en-US" dirty="0"/>
+          </a:p>
+        </p:txBody>
+      </p:sp>
+      <p:sp>
+        <p:nvSpPr>
+          <p:cNvPr id="3" name="Text Placeholder 2"/>
           <p:cNvSpPr>
             <a:spLocks noGrp="1"/>
           </p:cNvSpPr>
@@ -1371,8 +1240,8 @@
         </p:nvSpPr>
         <p:spPr>
           <a:xfrm>
-            <a:off x="831850" y="4589463"/>
-            <a:ext cx="10515600" cy="1500187"/>
+            <a:off x="831850" y="4830623"/>
+            <a:ext cx="10515600" cy="1579016"/>
           </a:xfrm>
         </p:spPr>
         <p:txBody>
@@ -1480,13 +1349,7 @@
       </p:sp>
       <p:sp>
         <p:nvSpPr>
-          <p:cNvPr id="4" name="Date Placeholder 3">
-            <a:extLst>
-              <a:ext uri="{FF2B5EF4-FFF2-40B4-BE49-F238E27FC236}">
-                <a16:creationId xmlns:a16="http://schemas.microsoft.com/office/drawing/2014/main" id="{0446EA59-51BB-B625-431C-67DF49C25272}"/>
-              </a:ext>
-            </a:extLst>
-          </p:cNvPr>
+          <p:cNvPr id="4" name="Date Placeholder 3"/>
           <p:cNvSpPr>
             <a:spLocks noGrp="1"/>
           </p:cNvSpPr>
@@ -1509,13 +1372,7 @@
       </p:sp>
       <p:sp>
         <p:nvSpPr>
-          <p:cNvPr id="5" name="Footer Placeholder 4">
-            <a:extLst>
-              <a:ext uri="{FF2B5EF4-FFF2-40B4-BE49-F238E27FC236}">
-                <a16:creationId xmlns:a16="http://schemas.microsoft.com/office/drawing/2014/main" id="{0732C178-DB61-8A39-EC3D-8A590649F4A1}"/>
-              </a:ext>
-            </a:extLst>
-          </p:cNvPr>
+          <p:cNvPr id="5" name="Footer Placeholder 4"/>
           <p:cNvSpPr>
             <a:spLocks noGrp="1"/>
           </p:cNvSpPr>
@@ -1534,13 +1391,7 @@
       </p:sp>
       <p:sp>
         <p:nvSpPr>
-          <p:cNvPr id="6" name="Slide Number Placeholder 5">
-            <a:extLst>
-              <a:ext uri="{FF2B5EF4-FFF2-40B4-BE49-F238E27FC236}">
-                <a16:creationId xmlns:a16="http://schemas.microsoft.com/office/drawing/2014/main" id="{2AA54C09-F916-013D-2DC4-5469B3D1849B}"/>
-              </a:ext>
-            </a:extLst>
-          </p:cNvPr>
+          <p:cNvPr id="6" name="Slide Number Placeholder 5"/>
           <p:cNvSpPr>
             <a:spLocks noGrp="1"/>
           </p:cNvSpPr>
@@ -1564,7 +1415,7 @@
     </p:spTree>
     <p:extLst>
       <p:ext uri="{BB962C8B-B14F-4D97-AF65-F5344CB8AC3E}">
-        <p14:creationId xmlns:p14="http://schemas.microsoft.com/office/powerpoint/2010/main" val="2697424635"/>
+        <p14:creationId xmlns:p14="http://schemas.microsoft.com/office/powerpoint/2010/main" val="2508760109"/>
       </p:ext>
     </p:extLst>
   </p:cSld>
@@ -1593,13 +1444,7 @@
       </p:grpSpPr>
       <p:sp>
         <p:nvSpPr>
-          <p:cNvPr id="2" name="Title 1">
-            <a:extLst>
-              <a:ext uri="{FF2B5EF4-FFF2-40B4-BE49-F238E27FC236}">
-                <a16:creationId xmlns:a16="http://schemas.microsoft.com/office/drawing/2014/main" id="{44E080DE-B3B3-536F-C25D-64EAF99FDBC0}"/>
-              </a:ext>
-            </a:extLst>
-          </p:cNvPr>
+          <p:cNvPr id="2" name="Title 1"/>
           <p:cNvSpPr>
             <a:spLocks noGrp="1"/>
           </p:cNvSpPr>
@@ -1616,19 +1461,13 @@
               <a:rPr lang="en-US"/>
               <a:t>Click to edit Master title style</a:t>
             </a:r>
-            <a:endParaRPr lang="en-IN"/>
-          </a:p>
-        </p:txBody>
-      </p:sp>
-      <p:sp>
-        <p:nvSpPr>
-          <p:cNvPr id="3" name="Content Placeholder 2">
-            <a:extLst>
-              <a:ext uri="{FF2B5EF4-FFF2-40B4-BE49-F238E27FC236}">
-                <a16:creationId xmlns:a16="http://schemas.microsoft.com/office/drawing/2014/main" id="{FCC219D4-AAF4-2D4C-A983-75566A1C2A5D}"/>
-              </a:ext>
-            </a:extLst>
-          </p:cNvPr>
+            <a:endParaRPr lang="en-US" dirty="0"/>
+          </a:p>
+        </p:txBody>
+      </p:sp>
+      <p:sp>
+        <p:nvSpPr>
+          <p:cNvPr id="3" name="Content Placeholder 2"/>
           <p:cNvSpPr>
             <a:spLocks noGrp="1"/>
           </p:cNvSpPr>
@@ -1638,8 +1477,8 @@
         </p:nvSpPr>
         <p:spPr>
           <a:xfrm>
-            <a:off x="838200" y="1825625"/>
-            <a:ext cx="5181600" cy="4351338"/>
+            <a:off x="838200" y="1921555"/>
+            <a:ext cx="5181600" cy="4579985"/>
           </a:xfrm>
         </p:spPr>
         <p:txBody>
@@ -1679,19 +1518,13 @@
               <a:rPr lang="en-US"/>
               <a:t>Fifth level</a:t>
             </a:r>
-            <a:endParaRPr lang="en-IN"/>
-          </a:p>
-        </p:txBody>
-      </p:sp>
-      <p:sp>
-        <p:nvSpPr>
-          <p:cNvPr id="4" name="Content Placeholder 3">
-            <a:extLst>
-              <a:ext uri="{FF2B5EF4-FFF2-40B4-BE49-F238E27FC236}">
-                <a16:creationId xmlns:a16="http://schemas.microsoft.com/office/drawing/2014/main" id="{52778077-9AC3-5EBF-5314-CFE86429EBCC}"/>
-              </a:ext>
-            </a:extLst>
-          </p:cNvPr>
+            <a:endParaRPr lang="en-US" dirty="0"/>
+          </a:p>
+        </p:txBody>
+      </p:sp>
+      <p:sp>
+        <p:nvSpPr>
+          <p:cNvPr id="4" name="Content Placeholder 3"/>
           <p:cNvSpPr>
             <a:spLocks noGrp="1"/>
           </p:cNvSpPr>
@@ -1701,8 +1534,8 @@
         </p:nvSpPr>
         <p:spPr>
           <a:xfrm>
-            <a:off x="6172200" y="1825625"/>
-            <a:ext cx="5181600" cy="4351338"/>
+            <a:off x="6172200" y="1921555"/>
+            <a:ext cx="5181600" cy="4579985"/>
           </a:xfrm>
         </p:spPr>
         <p:txBody>
@@ -1742,19 +1575,13 @@
               <a:rPr lang="en-US"/>
               <a:t>Fifth level</a:t>
             </a:r>
-            <a:endParaRPr lang="en-IN"/>
-          </a:p>
-        </p:txBody>
-      </p:sp>
-      <p:sp>
-        <p:nvSpPr>
-          <p:cNvPr id="5" name="Date Placeholder 4">
-            <a:extLst>
-              <a:ext uri="{FF2B5EF4-FFF2-40B4-BE49-F238E27FC236}">
-                <a16:creationId xmlns:a16="http://schemas.microsoft.com/office/drawing/2014/main" id="{7290BD9E-25B0-F940-062A-6F46B90E1612}"/>
-              </a:ext>
-            </a:extLst>
-          </p:cNvPr>
+            <a:endParaRPr lang="en-US" dirty="0"/>
+          </a:p>
+        </p:txBody>
+      </p:sp>
+      <p:sp>
+        <p:nvSpPr>
+          <p:cNvPr id="5" name="Date Placeholder 4"/>
           <p:cNvSpPr>
             <a:spLocks noGrp="1"/>
           </p:cNvSpPr>
@@ -1777,13 +1604,7 @@
       </p:sp>
       <p:sp>
         <p:nvSpPr>
-          <p:cNvPr id="6" name="Footer Placeholder 5">
-            <a:extLst>
-              <a:ext uri="{FF2B5EF4-FFF2-40B4-BE49-F238E27FC236}">
-                <a16:creationId xmlns:a16="http://schemas.microsoft.com/office/drawing/2014/main" id="{A845FC4A-6866-AEB1-CC8B-F357723FD199}"/>
-              </a:ext>
-            </a:extLst>
-          </p:cNvPr>
+          <p:cNvPr id="6" name="Footer Placeholder 5"/>
           <p:cNvSpPr>
             <a:spLocks noGrp="1"/>
           </p:cNvSpPr>
@@ -1802,13 +1623,7 @@
       </p:sp>
       <p:sp>
         <p:nvSpPr>
-          <p:cNvPr id="7" name="Slide Number Placeholder 6">
-            <a:extLst>
-              <a:ext uri="{FF2B5EF4-FFF2-40B4-BE49-F238E27FC236}">
-                <a16:creationId xmlns:a16="http://schemas.microsoft.com/office/drawing/2014/main" id="{1E6070C7-C916-C2C8-B76D-5DBE2DE23130}"/>
-              </a:ext>
-            </a:extLst>
-          </p:cNvPr>
+          <p:cNvPr id="7" name="Slide Number Placeholder 6"/>
           <p:cNvSpPr>
             <a:spLocks noGrp="1"/>
           </p:cNvSpPr>
@@ -1832,7 +1647,7 @@
     </p:spTree>
     <p:extLst>
       <p:ext uri="{BB962C8B-B14F-4D97-AF65-F5344CB8AC3E}">
-        <p14:creationId xmlns:p14="http://schemas.microsoft.com/office/powerpoint/2010/main" val="3543949020"/>
+        <p14:creationId xmlns:p14="http://schemas.microsoft.com/office/powerpoint/2010/main" val="3558100425"/>
       </p:ext>
     </p:extLst>
   </p:cSld>
@@ -1861,13 +1676,7 @@
       </p:grpSpPr>
       <p:sp>
         <p:nvSpPr>
-          <p:cNvPr id="2" name="Title 1">
-            <a:extLst>
-              <a:ext uri="{FF2B5EF4-FFF2-40B4-BE49-F238E27FC236}">
-                <a16:creationId xmlns:a16="http://schemas.microsoft.com/office/drawing/2014/main" id="{274FE630-7427-3D90-F4AA-805F690FA67D}"/>
-              </a:ext>
-            </a:extLst>
-          </p:cNvPr>
+          <p:cNvPr id="2" name="Title 1"/>
           <p:cNvSpPr>
             <a:spLocks noGrp="1"/>
           </p:cNvSpPr>
@@ -1877,8 +1686,8 @@
         </p:nvSpPr>
         <p:spPr>
           <a:xfrm>
-            <a:off x="839788" y="365125"/>
-            <a:ext cx="10515600" cy="1325563"/>
+            <a:off x="839788" y="384311"/>
+            <a:ext cx="10515600" cy="1395217"/>
           </a:xfrm>
         </p:spPr>
         <p:txBody>
@@ -1889,19 +1698,13 @@
               <a:rPr lang="en-US"/>
               <a:t>Click to edit Master title style</a:t>
             </a:r>
-            <a:endParaRPr lang="en-IN"/>
-          </a:p>
-        </p:txBody>
-      </p:sp>
-      <p:sp>
-        <p:nvSpPr>
-          <p:cNvPr id="3" name="Text Placeholder 2">
-            <a:extLst>
-              <a:ext uri="{FF2B5EF4-FFF2-40B4-BE49-F238E27FC236}">
-                <a16:creationId xmlns:a16="http://schemas.microsoft.com/office/drawing/2014/main" id="{E250FC55-32B8-BCB6-D4A0-0A37ED20D8D6}"/>
-              </a:ext>
-            </a:extLst>
-          </p:cNvPr>
+            <a:endParaRPr lang="en-US" dirty="0"/>
+          </a:p>
+        </p:txBody>
+      </p:sp>
+      <p:sp>
+        <p:nvSpPr>
+          <p:cNvPr id="3" name="Text Placeholder 2"/>
           <p:cNvSpPr>
             <a:spLocks noGrp="1"/>
           </p:cNvSpPr>
@@ -1911,8 +1714,8 @@
         </p:nvSpPr>
         <p:spPr>
           <a:xfrm>
-            <a:off x="839788" y="1681163"/>
-            <a:ext cx="5157787" cy="823912"/>
+            <a:off x="839789" y="1769502"/>
+            <a:ext cx="5157787" cy="867206"/>
           </a:xfrm>
         </p:spPr>
         <p:txBody>
@@ -1966,13 +1769,7 @@
       </p:sp>
       <p:sp>
         <p:nvSpPr>
-          <p:cNvPr id="4" name="Content Placeholder 3">
-            <a:extLst>
-              <a:ext uri="{FF2B5EF4-FFF2-40B4-BE49-F238E27FC236}">
-                <a16:creationId xmlns:a16="http://schemas.microsoft.com/office/drawing/2014/main" id="{B0B79D91-D630-2454-1B9F-AD78768E1C8D}"/>
-              </a:ext>
-            </a:extLst>
-          </p:cNvPr>
+          <p:cNvPr id="4" name="Content Placeholder 3"/>
           <p:cNvSpPr>
             <a:spLocks noGrp="1"/>
           </p:cNvSpPr>
@@ -1982,8 +1779,8 @@
         </p:nvSpPr>
         <p:spPr>
           <a:xfrm>
-            <a:off x="839788" y="2505075"/>
-            <a:ext cx="5157787" cy="3684588"/>
+            <a:off x="839789" y="2636707"/>
+            <a:ext cx="5157787" cy="3878200"/>
           </a:xfrm>
         </p:spPr>
         <p:txBody>
@@ -2023,19 +1820,13 @@
               <a:rPr lang="en-US"/>
               <a:t>Fifth level</a:t>
             </a:r>
-            <a:endParaRPr lang="en-IN"/>
-          </a:p>
-        </p:txBody>
-      </p:sp>
-      <p:sp>
-        <p:nvSpPr>
-          <p:cNvPr id="5" name="Text Placeholder 4">
-            <a:extLst>
-              <a:ext uri="{FF2B5EF4-FFF2-40B4-BE49-F238E27FC236}">
-                <a16:creationId xmlns:a16="http://schemas.microsoft.com/office/drawing/2014/main" id="{F7FAE82A-3195-552E-1261-1878B52D32E4}"/>
-              </a:ext>
-            </a:extLst>
-          </p:cNvPr>
+            <a:endParaRPr lang="en-US" dirty="0"/>
+          </a:p>
+        </p:txBody>
+      </p:sp>
+      <p:sp>
+        <p:nvSpPr>
+          <p:cNvPr id="5" name="Text Placeholder 4"/>
           <p:cNvSpPr>
             <a:spLocks noGrp="1"/>
           </p:cNvSpPr>
@@ -2045,8 +1836,8 @@
         </p:nvSpPr>
         <p:spPr>
           <a:xfrm>
-            <a:off x="6172200" y="1681163"/>
-            <a:ext cx="5183188" cy="823912"/>
+            <a:off x="6172200" y="1769502"/>
+            <a:ext cx="5183188" cy="867206"/>
           </a:xfrm>
         </p:spPr>
         <p:txBody>
@@ -2100,13 +1891,7 @@
       </p:sp>
       <p:sp>
         <p:nvSpPr>
-          <p:cNvPr id="6" name="Content Placeholder 5">
-            <a:extLst>
-              <a:ext uri="{FF2B5EF4-FFF2-40B4-BE49-F238E27FC236}">
-                <a16:creationId xmlns:a16="http://schemas.microsoft.com/office/drawing/2014/main" id="{C5C5024A-B12F-5B94-A54F-A94EB995798A}"/>
-              </a:ext>
-            </a:extLst>
-          </p:cNvPr>
+          <p:cNvPr id="6" name="Content Placeholder 5"/>
           <p:cNvSpPr>
             <a:spLocks noGrp="1"/>
           </p:cNvSpPr>
@@ -2116,8 +1901,8 @@
         </p:nvSpPr>
         <p:spPr>
           <a:xfrm>
-            <a:off x="6172200" y="2505075"/>
-            <a:ext cx="5183188" cy="3684588"/>
+            <a:off x="6172200" y="2636707"/>
+            <a:ext cx="5183188" cy="3878200"/>
           </a:xfrm>
         </p:spPr>
         <p:txBody>
@@ -2157,19 +1942,13 @@
               <a:rPr lang="en-US"/>
               <a:t>Fifth level</a:t>
             </a:r>
-            <a:endParaRPr lang="en-IN"/>
-          </a:p>
-        </p:txBody>
-      </p:sp>
-      <p:sp>
-        <p:nvSpPr>
-          <p:cNvPr id="7" name="Date Placeholder 6">
-            <a:extLst>
-              <a:ext uri="{FF2B5EF4-FFF2-40B4-BE49-F238E27FC236}">
-                <a16:creationId xmlns:a16="http://schemas.microsoft.com/office/drawing/2014/main" id="{5E18C9A0-2F45-32A2-4F55-F732D6554843}"/>
-              </a:ext>
-            </a:extLst>
-          </p:cNvPr>
+            <a:endParaRPr lang="en-US" dirty="0"/>
+          </a:p>
+        </p:txBody>
+      </p:sp>
+      <p:sp>
+        <p:nvSpPr>
+          <p:cNvPr id="7" name="Date Placeholder 6"/>
           <p:cNvSpPr>
             <a:spLocks noGrp="1"/>
           </p:cNvSpPr>
@@ -2192,13 +1971,7 @@
       </p:sp>
       <p:sp>
         <p:nvSpPr>
-          <p:cNvPr id="8" name="Footer Placeholder 7">
-            <a:extLst>
-              <a:ext uri="{FF2B5EF4-FFF2-40B4-BE49-F238E27FC236}">
-                <a16:creationId xmlns:a16="http://schemas.microsoft.com/office/drawing/2014/main" id="{4769D1B3-16EA-FBA5-755E-2ABBA8B3F19F}"/>
-              </a:ext>
-            </a:extLst>
-          </p:cNvPr>
+          <p:cNvPr id="8" name="Footer Placeholder 7"/>
           <p:cNvSpPr>
             <a:spLocks noGrp="1"/>
           </p:cNvSpPr>
@@ -2217,13 +1990,7 @@
       </p:sp>
       <p:sp>
         <p:nvSpPr>
-          <p:cNvPr id="9" name="Slide Number Placeholder 8">
-            <a:extLst>
-              <a:ext uri="{FF2B5EF4-FFF2-40B4-BE49-F238E27FC236}">
-                <a16:creationId xmlns:a16="http://schemas.microsoft.com/office/drawing/2014/main" id="{43516016-981B-7FCB-50B2-E238FD6F60ED}"/>
-              </a:ext>
-            </a:extLst>
-          </p:cNvPr>
+          <p:cNvPr id="9" name="Slide Number Placeholder 8"/>
           <p:cNvSpPr>
             <a:spLocks noGrp="1"/>
           </p:cNvSpPr>
@@ -2247,7 +2014,7 @@
     </p:spTree>
     <p:extLst>
       <p:ext uri="{BB962C8B-B14F-4D97-AF65-F5344CB8AC3E}">
-        <p14:creationId xmlns:p14="http://schemas.microsoft.com/office/powerpoint/2010/main" val="2946454838"/>
+        <p14:creationId xmlns:p14="http://schemas.microsoft.com/office/powerpoint/2010/main" val="3222707371"/>
       </p:ext>
     </p:extLst>
   </p:cSld>
@@ -2276,13 +2043,7 @@
       </p:grpSpPr>
       <p:sp>
         <p:nvSpPr>
-          <p:cNvPr id="2" name="Title 1">
-            <a:extLst>
-              <a:ext uri="{FF2B5EF4-FFF2-40B4-BE49-F238E27FC236}">
-                <a16:creationId xmlns:a16="http://schemas.microsoft.com/office/drawing/2014/main" id="{D159BC43-5641-68AF-E717-A8981A8D2311}"/>
-              </a:ext>
-            </a:extLst>
-          </p:cNvPr>
+          <p:cNvPr id="2" name="Title 1"/>
           <p:cNvSpPr>
             <a:spLocks noGrp="1"/>
           </p:cNvSpPr>
@@ -2299,19 +2060,13 @@
               <a:rPr lang="en-US"/>
               <a:t>Click to edit Master title style</a:t>
             </a:r>
-            <a:endParaRPr lang="en-IN"/>
-          </a:p>
-        </p:txBody>
-      </p:sp>
-      <p:sp>
-        <p:nvSpPr>
-          <p:cNvPr id="3" name="Date Placeholder 2">
-            <a:extLst>
-              <a:ext uri="{FF2B5EF4-FFF2-40B4-BE49-F238E27FC236}">
-                <a16:creationId xmlns:a16="http://schemas.microsoft.com/office/drawing/2014/main" id="{3546D6B8-2A1D-4C14-186D-4E68EE621815}"/>
-              </a:ext>
-            </a:extLst>
-          </p:cNvPr>
+            <a:endParaRPr lang="en-US" dirty="0"/>
+          </a:p>
+        </p:txBody>
+      </p:sp>
+      <p:sp>
+        <p:nvSpPr>
+          <p:cNvPr id="3" name="Date Placeholder 2"/>
           <p:cNvSpPr>
             <a:spLocks noGrp="1"/>
           </p:cNvSpPr>
@@ -2334,13 +2089,7 @@
       </p:sp>
       <p:sp>
         <p:nvSpPr>
-          <p:cNvPr id="4" name="Footer Placeholder 3">
-            <a:extLst>
-              <a:ext uri="{FF2B5EF4-FFF2-40B4-BE49-F238E27FC236}">
-                <a16:creationId xmlns:a16="http://schemas.microsoft.com/office/drawing/2014/main" id="{021D57C9-6A8A-A617-1EC4-9B865D9FEA40}"/>
-              </a:ext>
-            </a:extLst>
-          </p:cNvPr>
+          <p:cNvPr id="4" name="Footer Placeholder 3"/>
           <p:cNvSpPr>
             <a:spLocks noGrp="1"/>
           </p:cNvSpPr>
@@ -2359,13 +2108,7 @@
       </p:sp>
       <p:sp>
         <p:nvSpPr>
-          <p:cNvPr id="5" name="Slide Number Placeholder 4">
-            <a:extLst>
-              <a:ext uri="{FF2B5EF4-FFF2-40B4-BE49-F238E27FC236}">
-                <a16:creationId xmlns:a16="http://schemas.microsoft.com/office/drawing/2014/main" id="{3381C659-6473-9506-3196-4F8801B23E1A}"/>
-              </a:ext>
-            </a:extLst>
-          </p:cNvPr>
+          <p:cNvPr id="5" name="Slide Number Placeholder 4"/>
           <p:cNvSpPr>
             <a:spLocks noGrp="1"/>
           </p:cNvSpPr>
@@ -2389,7 +2132,7 @@
     </p:spTree>
     <p:extLst>
       <p:ext uri="{BB962C8B-B14F-4D97-AF65-F5344CB8AC3E}">
-        <p14:creationId xmlns:p14="http://schemas.microsoft.com/office/powerpoint/2010/main" val="429870021"/>
+        <p14:creationId xmlns:p14="http://schemas.microsoft.com/office/powerpoint/2010/main" val="1852501607"/>
       </p:ext>
     </p:extLst>
   </p:cSld>
@@ -2418,13 +2161,7 @@
       </p:grpSpPr>
       <p:sp>
         <p:nvSpPr>
-          <p:cNvPr id="2" name="Date Placeholder 1">
-            <a:extLst>
-              <a:ext uri="{FF2B5EF4-FFF2-40B4-BE49-F238E27FC236}">
-                <a16:creationId xmlns:a16="http://schemas.microsoft.com/office/drawing/2014/main" id="{31D477B3-D441-19C6-CF58-B9C253C2B3A9}"/>
-              </a:ext>
-            </a:extLst>
-          </p:cNvPr>
+          <p:cNvPr id="2" name="Date Placeholder 1"/>
           <p:cNvSpPr>
             <a:spLocks noGrp="1"/>
           </p:cNvSpPr>
@@ -2447,13 +2184,7 @@
       </p:sp>
       <p:sp>
         <p:nvSpPr>
-          <p:cNvPr id="3" name="Footer Placeholder 2">
-            <a:extLst>
-              <a:ext uri="{FF2B5EF4-FFF2-40B4-BE49-F238E27FC236}">
-                <a16:creationId xmlns:a16="http://schemas.microsoft.com/office/drawing/2014/main" id="{C855B9C4-7CFC-08D3-D876-756CAFDA0183}"/>
-              </a:ext>
-            </a:extLst>
-          </p:cNvPr>
+          <p:cNvPr id="3" name="Footer Placeholder 2"/>
           <p:cNvSpPr>
             <a:spLocks noGrp="1"/>
           </p:cNvSpPr>
@@ -2472,13 +2203,7 @@
       </p:sp>
       <p:sp>
         <p:nvSpPr>
-          <p:cNvPr id="4" name="Slide Number Placeholder 3">
-            <a:extLst>
-              <a:ext uri="{FF2B5EF4-FFF2-40B4-BE49-F238E27FC236}">
-                <a16:creationId xmlns:a16="http://schemas.microsoft.com/office/drawing/2014/main" id="{5DEFE5D4-DABC-BD68-B7D0-77D9CFA72728}"/>
-              </a:ext>
-            </a:extLst>
-          </p:cNvPr>
+          <p:cNvPr id="4" name="Slide Number Placeholder 3"/>
           <p:cNvSpPr>
             <a:spLocks noGrp="1"/>
           </p:cNvSpPr>
@@ -2502,7 +2227,7 @@
     </p:spTree>
     <p:extLst>
       <p:ext uri="{BB962C8B-B14F-4D97-AF65-F5344CB8AC3E}">
-        <p14:creationId xmlns:p14="http://schemas.microsoft.com/office/powerpoint/2010/main" val="1856344101"/>
+        <p14:creationId xmlns:p14="http://schemas.microsoft.com/office/powerpoint/2010/main" val="1589647892"/>
       </p:ext>
     </p:extLst>
   </p:cSld>
@@ -2531,13 +2256,7 @@
       </p:grpSpPr>
       <p:sp>
         <p:nvSpPr>
-          <p:cNvPr id="2" name="Title 1">
-            <a:extLst>
-              <a:ext uri="{FF2B5EF4-FFF2-40B4-BE49-F238E27FC236}">
-                <a16:creationId xmlns:a16="http://schemas.microsoft.com/office/drawing/2014/main" id="{107E4A40-4132-A2FD-2944-EBCBA80F2DBC}"/>
-              </a:ext>
-            </a:extLst>
-          </p:cNvPr>
+          <p:cNvPr id="2" name="Title 1"/>
           <p:cNvSpPr>
             <a:spLocks noGrp="1"/>
           </p:cNvSpPr>
@@ -2547,8 +2266,8 @@
         </p:nvSpPr>
         <p:spPr>
           <a:xfrm>
-            <a:off x="839788" y="457200"/>
-            <a:ext cx="3932237" cy="1600200"/>
+            <a:off x="839789" y="481224"/>
+            <a:ext cx="3932237" cy="1684285"/>
           </a:xfrm>
         </p:spPr>
         <p:txBody>
@@ -2563,19 +2282,13 @@
               <a:rPr lang="en-US"/>
               <a:t>Click to edit Master title style</a:t>
             </a:r>
-            <a:endParaRPr lang="en-IN"/>
-          </a:p>
-        </p:txBody>
-      </p:sp>
-      <p:sp>
-        <p:nvSpPr>
-          <p:cNvPr id="3" name="Content Placeholder 2">
-            <a:extLst>
-              <a:ext uri="{FF2B5EF4-FFF2-40B4-BE49-F238E27FC236}">
-                <a16:creationId xmlns:a16="http://schemas.microsoft.com/office/drawing/2014/main" id="{9BC5F464-CB7D-36B7-71B9-AE9A411832C6}"/>
-              </a:ext>
-            </a:extLst>
-          </p:cNvPr>
+            <a:endParaRPr lang="en-US" dirty="0"/>
+          </a:p>
+        </p:txBody>
+      </p:sp>
+      <p:sp>
+        <p:nvSpPr>
+          <p:cNvPr id="3" name="Content Placeholder 2"/>
           <p:cNvSpPr>
             <a:spLocks noGrp="1"/>
           </p:cNvSpPr>
@@ -2585,8 +2298,8 @@
         </p:nvSpPr>
         <p:spPr>
           <a:xfrm>
-            <a:off x="5183188" y="987425"/>
-            <a:ext cx="6172200" cy="4873625"/>
+            <a:off x="5183188" y="1039311"/>
+            <a:ext cx="6172200" cy="5129716"/>
           </a:xfrm>
         </p:spPr>
         <p:txBody>
@@ -2654,19 +2367,13 @@
               <a:rPr lang="en-US"/>
               <a:t>Fifth level</a:t>
             </a:r>
-            <a:endParaRPr lang="en-IN"/>
-          </a:p>
-        </p:txBody>
-      </p:sp>
-      <p:sp>
-        <p:nvSpPr>
-          <p:cNvPr id="4" name="Text Placeholder 3">
-            <a:extLst>
-              <a:ext uri="{FF2B5EF4-FFF2-40B4-BE49-F238E27FC236}">
-                <a16:creationId xmlns:a16="http://schemas.microsoft.com/office/drawing/2014/main" id="{93A0CD86-7DA8-44AF-87DB-F940726F38BA}"/>
-              </a:ext>
-            </a:extLst>
-          </p:cNvPr>
+            <a:endParaRPr lang="en-US" dirty="0"/>
+          </a:p>
+        </p:txBody>
+      </p:sp>
+      <p:sp>
+        <p:nvSpPr>
+          <p:cNvPr id="4" name="Text Placeholder 3"/>
           <p:cNvSpPr>
             <a:spLocks noGrp="1"/>
           </p:cNvSpPr>
@@ -2676,8 +2383,8 @@
         </p:nvSpPr>
         <p:spPr>
           <a:xfrm>
-            <a:off x="839788" y="2057400"/>
-            <a:ext cx="3932237" cy="3811588"/>
+            <a:off x="839789" y="2165509"/>
+            <a:ext cx="3932237" cy="4011873"/>
           </a:xfrm>
         </p:spPr>
         <p:txBody>
@@ -2731,13 +2438,7 @@
       </p:sp>
       <p:sp>
         <p:nvSpPr>
-          <p:cNvPr id="5" name="Date Placeholder 4">
-            <a:extLst>
-              <a:ext uri="{FF2B5EF4-FFF2-40B4-BE49-F238E27FC236}">
-                <a16:creationId xmlns:a16="http://schemas.microsoft.com/office/drawing/2014/main" id="{2284D465-A869-5850-1C5A-29F152544BB2}"/>
-              </a:ext>
-            </a:extLst>
-          </p:cNvPr>
+          <p:cNvPr id="5" name="Date Placeholder 4"/>
           <p:cNvSpPr>
             <a:spLocks noGrp="1"/>
           </p:cNvSpPr>
@@ -2760,13 +2461,7 @@
       </p:sp>
       <p:sp>
         <p:nvSpPr>
-          <p:cNvPr id="6" name="Footer Placeholder 5">
-            <a:extLst>
-              <a:ext uri="{FF2B5EF4-FFF2-40B4-BE49-F238E27FC236}">
-                <a16:creationId xmlns:a16="http://schemas.microsoft.com/office/drawing/2014/main" id="{6FDA7888-8DDF-9E3B-C975-0E1F4869409A}"/>
-              </a:ext>
-            </a:extLst>
-          </p:cNvPr>
+          <p:cNvPr id="6" name="Footer Placeholder 5"/>
           <p:cNvSpPr>
             <a:spLocks noGrp="1"/>
           </p:cNvSpPr>
@@ -2785,13 +2480,7 @@
       </p:sp>
       <p:sp>
         <p:nvSpPr>
-          <p:cNvPr id="7" name="Slide Number Placeholder 6">
-            <a:extLst>
-              <a:ext uri="{FF2B5EF4-FFF2-40B4-BE49-F238E27FC236}">
-                <a16:creationId xmlns:a16="http://schemas.microsoft.com/office/drawing/2014/main" id="{F69B6194-A10B-52A4-A0C7-BD8CF0474607}"/>
-              </a:ext>
-            </a:extLst>
-          </p:cNvPr>
+          <p:cNvPr id="7" name="Slide Number Placeholder 6"/>
           <p:cNvSpPr>
             <a:spLocks noGrp="1"/>
           </p:cNvSpPr>
@@ -2815,7 +2504,7 @@
     </p:spTree>
     <p:extLst>
       <p:ext uri="{BB962C8B-B14F-4D97-AF65-F5344CB8AC3E}">
-        <p14:creationId xmlns:p14="http://schemas.microsoft.com/office/powerpoint/2010/main" val="3009488466"/>
+        <p14:creationId xmlns:p14="http://schemas.microsoft.com/office/powerpoint/2010/main" val="1812063161"/>
       </p:ext>
     </p:extLst>
   </p:cSld>
@@ -2844,13 +2533,7 @@
       </p:grpSpPr>
       <p:sp>
         <p:nvSpPr>
-          <p:cNvPr id="2" name="Title 1">
-            <a:extLst>
-              <a:ext uri="{FF2B5EF4-FFF2-40B4-BE49-F238E27FC236}">
-                <a16:creationId xmlns:a16="http://schemas.microsoft.com/office/drawing/2014/main" id="{C033621A-F8B7-B0B9-54CD-451428929360}"/>
-              </a:ext>
-            </a:extLst>
-          </p:cNvPr>
+          <p:cNvPr id="2" name="Title 1"/>
           <p:cNvSpPr>
             <a:spLocks noGrp="1"/>
           </p:cNvSpPr>
@@ -2860,8 +2543,8 @@
         </p:nvSpPr>
         <p:spPr>
           <a:xfrm>
-            <a:off x="839788" y="457200"/>
-            <a:ext cx="3932237" cy="1600200"/>
+            <a:off x="839789" y="481224"/>
+            <a:ext cx="3932237" cy="1684285"/>
           </a:xfrm>
         </p:spPr>
         <p:txBody>
@@ -2876,21 +2559,15 @@
               <a:rPr lang="en-US"/>
               <a:t>Click to edit Master title style</a:t>
             </a:r>
-            <a:endParaRPr lang="en-IN"/>
-          </a:p>
-        </p:txBody>
-      </p:sp>
-      <p:sp>
-        <p:nvSpPr>
-          <p:cNvPr id="3" name="Picture Placeholder 2">
-            <a:extLst>
-              <a:ext uri="{FF2B5EF4-FFF2-40B4-BE49-F238E27FC236}">
-                <a16:creationId xmlns:a16="http://schemas.microsoft.com/office/drawing/2014/main" id="{BB53D44A-2378-141D-BA52-A89054D9E41C}"/>
-              </a:ext>
-            </a:extLst>
-          </p:cNvPr>
-          <p:cNvSpPr>
-            <a:spLocks noGrp="1"/>
+            <a:endParaRPr lang="en-US" dirty="0"/>
+          </a:p>
+        </p:txBody>
+      </p:sp>
+      <p:sp>
+        <p:nvSpPr>
+          <p:cNvPr id="3" name="Picture Placeholder 2"/>
+          <p:cNvSpPr>
+            <a:spLocks noGrp="1" noChangeAspect="1"/>
           </p:cNvSpPr>
           <p:nvPr>
             <p:ph type="pic" idx="1"/>
@@ -2898,8 +2575,73 @@
         </p:nvSpPr>
         <p:spPr>
           <a:xfrm>
-            <a:off x="5183188" y="987425"/>
-            <a:ext cx="6172200" cy="4873625"/>
+            <a:off x="5183188" y="1039311"/>
+            <a:ext cx="6172200" cy="5129716"/>
+          </a:xfrm>
+        </p:spPr>
+        <p:txBody>
+          <a:bodyPr anchor="t"/>
+          <a:lstStyle>
+            <a:lvl1pPr marL="0" indent="0">
+              <a:buNone/>
+              <a:defRPr sz="3200"/>
+            </a:lvl1pPr>
+            <a:lvl2pPr marL="457200" indent="0">
+              <a:buNone/>
+              <a:defRPr sz="2800"/>
+            </a:lvl2pPr>
+            <a:lvl3pPr marL="914400" indent="0">
+              <a:buNone/>
+              <a:defRPr sz="2400"/>
+            </a:lvl3pPr>
+            <a:lvl4pPr marL="1371600" indent="0">
+              <a:buNone/>
+              <a:defRPr sz="2000"/>
+            </a:lvl4pPr>
+            <a:lvl5pPr marL="1828800" indent="0">
+              <a:buNone/>
+              <a:defRPr sz="2000"/>
+            </a:lvl5pPr>
+            <a:lvl6pPr marL="2286000" indent="0">
+              <a:buNone/>
+              <a:defRPr sz="2000"/>
+            </a:lvl6pPr>
+            <a:lvl7pPr marL="2743200" indent="0">
+              <a:buNone/>
+              <a:defRPr sz="2000"/>
+            </a:lvl7pPr>
+            <a:lvl8pPr marL="3200400" indent="0">
+              <a:buNone/>
+              <a:defRPr sz="2000"/>
+            </a:lvl8pPr>
+            <a:lvl9pPr marL="3657600" indent="0">
+              <a:buNone/>
+              <a:defRPr sz="2000"/>
+            </a:lvl9pPr>
+          </a:lstStyle>
+          <a:p>
+            <a:r>
+              <a:rPr lang="en-US"/>
+              <a:t>Click icon to add picture</a:t>
+            </a:r>
+            <a:endParaRPr lang="en-US" dirty="0"/>
+          </a:p>
+        </p:txBody>
+      </p:sp>
+      <p:sp>
+        <p:nvSpPr>
+          <p:cNvPr id="4" name="Text Placeholder 3"/>
+          <p:cNvSpPr>
+            <a:spLocks noGrp="1"/>
+          </p:cNvSpPr>
+          <p:nvPr>
+            <p:ph type="body" sz="half" idx="2"/>
+          </p:nvPr>
+        </p:nvSpPr>
+        <p:spPr>
+          <a:xfrm>
+            <a:off x="839789" y="2165509"/>
+            <a:ext cx="3932237" cy="4011873"/>
           </a:xfrm>
         </p:spPr>
         <p:txBody>
@@ -2907,73 +2649,6 @@
           <a:lstStyle>
             <a:lvl1pPr marL="0" indent="0">
               <a:buNone/>
-              <a:defRPr sz="3200"/>
-            </a:lvl1pPr>
-            <a:lvl2pPr marL="457200" indent="0">
-              <a:buNone/>
-              <a:defRPr sz="2800"/>
-            </a:lvl2pPr>
-            <a:lvl3pPr marL="914400" indent="0">
-              <a:buNone/>
-              <a:defRPr sz="2400"/>
-            </a:lvl3pPr>
-            <a:lvl4pPr marL="1371600" indent="0">
-              <a:buNone/>
-              <a:defRPr sz="2000"/>
-            </a:lvl4pPr>
-            <a:lvl5pPr marL="1828800" indent="0">
-              <a:buNone/>
-              <a:defRPr sz="2000"/>
-            </a:lvl5pPr>
-            <a:lvl6pPr marL="2286000" indent="0">
-              <a:buNone/>
-              <a:defRPr sz="2000"/>
-            </a:lvl6pPr>
-            <a:lvl7pPr marL="2743200" indent="0">
-              <a:buNone/>
-              <a:defRPr sz="2000"/>
-            </a:lvl7pPr>
-            <a:lvl8pPr marL="3200400" indent="0">
-              <a:buNone/>
-              <a:defRPr sz="2000"/>
-            </a:lvl8pPr>
-            <a:lvl9pPr marL="3657600" indent="0">
-              <a:buNone/>
-              <a:defRPr sz="2000"/>
-            </a:lvl9pPr>
-          </a:lstStyle>
-          <a:p>
-            <a:endParaRPr lang="en-IN"/>
-          </a:p>
-        </p:txBody>
-      </p:sp>
-      <p:sp>
-        <p:nvSpPr>
-          <p:cNvPr id="4" name="Text Placeholder 3">
-            <a:extLst>
-              <a:ext uri="{FF2B5EF4-FFF2-40B4-BE49-F238E27FC236}">
-                <a16:creationId xmlns:a16="http://schemas.microsoft.com/office/drawing/2014/main" id="{A4F47DFD-935A-8E71-D75D-3224AAB2CE84}"/>
-              </a:ext>
-            </a:extLst>
-          </p:cNvPr>
-          <p:cNvSpPr>
-            <a:spLocks noGrp="1"/>
-          </p:cNvSpPr>
-          <p:nvPr>
-            <p:ph type="body" sz="half" idx="2"/>
-          </p:nvPr>
-        </p:nvSpPr>
-        <p:spPr>
-          <a:xfrm>
-            <a:off x="839788" y="2057400"/>
-            <a:ext cx="3932237" cy="3811588"/>
-          </a:xfrm>
-        </p:spPr>
-        <p:txBody>
-          <a:bodyPr/>
-          <a:lstStyle>
-            <a:lvl1pPr marL="0" indent="0">
-              <a:buNone/>
               <a:defRPr sz="1600"/>
             </a:lvl1pPr>
             <a:lvl2pPr marL="457200" indent="0">
@@ -3020,13 +2695,7 @@
       </p:sp>
       <p:sp>
         <p:nvSpPr>
-          <p:cNvPr id="5" name="Date Placeholder 4">
-            <a:extLst>
-              <a:ext uri="{FF2B5EF4-FFF2-40B4-BE49-F238E27FC236}">
-                <a16:creationId xmlns:a16="http://schemas.microsoft.com/office/drawing/2014/main" id="{19B3DCA5-9584-C0AB-21F5-D3DD694F3C11}"/>
-              </a:ext>
-            </a:extLst>
-          </p:cNvPr>
+          <p:cNvPr id="5" name="Date Placeholder 4"/>
           <p:cNvSpPr>
             <a:spLocks noGrp="1"/>
           </p:cNvSpPr>
@@ -3049,13 +2718,7 @@
       </p:sp>
       <p:sp>
         <p:nvSpPr>
-          <p:cNvPr id="6" name="Footer Placeholder 5">
-            <a:extLst>
-              <a:ext uri="{FF2B5EF4-FFF2-40B4-BE49-F238E27FC236}">
-                <a16:creationId xmlns:a16="http://schemas.microsoft.com/office/drawing/2014/main" id="{AA1EDD37-161D-C76F-3255-8040B9B5ED44}"/>
-              </a:ext>
-            </a:extLst>
-          </p:cNvPr>
+          <p:cNvPr id="6" name="Footer Placeholder 5"/>
           <p:cNvSpPr>
             <a:spLocks noGrp="1"/>
           </p:cNvSpPr>
@@ -3074,13 +2737,7 @@
       </p:sp>
       <p:sp>
         <p:nvSpPr>
-          <p:cNvPr id="7" name="Slide Number Placeholder 6">
-            <a:extLst>
-              <a:ext uri="{FF2B5EF4-FFF2-40B4-BE49-F238E27FC236}">
-                <a16:creationId xmlns:a16="http://schemas.microsoft.com/office/drawing/2014/main" id="{37E7B281-AA10-82FC-538D-A5A776A9BD3F}"/>
-              </a:ext>
-            </a:extLst>
-          </p:cNvPr>
+          <p:cNvPr id="7" name="Slide Number Placeholder 6"/>
           <p:cNvSpPr>
             <a:spLocks noGrp="1"/>
           </p:cNvSpPr>
@@ -3104,7 +2761,7 @@
     </p:spTree>
     <p:extLst>
       <p:ext uri="{BB962C8B-B14F-4D97-AF65-F5344CB8AC3E}">
-        <p14:creationId xmlns:p14="http://schemas.microsoft.com/office/powerpoint/2010/main" val="2142357039"/>
+        <p14:creationId xmlns:p14="http://schemas.microsoft.com/office/powerpoint/2010/main" val="2018122734"/>
       </p:ext>
     </p:extLst>
   </p:cSld>
@@ -3138,13 +2795,7 @@
       </p:grpSpPr>
       <p:sp>
         <p:nvSpPr>
-          <p:cNvPr id="2" name="Title Placeholder 1">
-            <a:extLst>
-              <a:ext uri="{FF2B5EF4-FFF2-40B4-BE49-F238E27FC236}">
-                <a16:creationId xmlns:a16="http://schemas.microsoft.com/office/drawing/2014/main" id="{89EDE675-34CF-91AE-B77B-C564F64C78D8}"/>
-              </a:ext>
-            </a:extLst>
-          </p:cNvPr>
+          <p:cNvPr id="2" name="Title Placeholder 1"/>
           <p:cNvSpPr>
             <a:spLocks noGrp="1"/>
           </p:cNvSpPr>
@@ -3154,8 +2805,8 @@
         </p:nvSpPr>
         <p:spPr>
           <a:xfrm>
-            <a:off x="838200" y="365125"/>
-            <a:ext cx="10515600" cy="1325563"/>
+            <a:off x="838200" y="384311"/>
+            <a:ext cx="10515600" cy="1395217"/>
           </a:xfrm>
           <a:prstGeom prst="rect">
             <a:avLst/>
@@ -3171,19 +2822,13 @@
               <a:rPr lang="en-US"/>
               <a:t>Click to edit Master title style</a:t>
             </a:r>
-            <a:endParaRPr lang="en-IN"/>
-          </a:p>
-        </p:txBody>
-      </p:sp>
-      <p:sp>
-        <p:nvSpPr>
-          <p:cNvPr id="3" name="Text Placeholder 2">
-            <a:extLst>
-              <a:ext uri="{FF2B5EF4-FFF2-40B4-BE49-F238E27FC236}">
-                <a16:creationId xmlns:a16="http://schemas.microsoft.com/office/drawing/2014/main" id="{00DCCEB2-62FD-7211-68EA-D3AFD1644985}"/>
-              </a:ext>
-            </a:extLst>
-          </p:cNvPr>
+            <a:endParaRPr lang="en-US" dirty="0"/>
+          </a:p>
+        </p:txBody>
+      </p:sp>
+      <p:sp>
+        <p:nvSpPr>
+          <p:cNvPr id="3" name="Text Placeholder 2"/>
           <p:cNvSpPr>
             <a:spLocks noGrp="1"/>
           </p:cNvSpPr>
@@ -3193,8 +2838,8 @@
         </p:nvSpPr>
         <p:spPr>
           <a:xfrm>
-            <a:off x="838200" y="1825625"/>
-            <a:ext cx="10515600" cy="4351338"/>
+            <a:off x="838200" y="1921555"/>
+            <a:ext cx="10515600" cy="4579985"/>
           </a:xfrm>
           <a:prstGeom prst="rect">
             <a:avLst/>
@@ -3239,19 +2884,13 @@
               <a:rPr lang="en-US"/>
               <a:t>Fifth level</a:t>
             </a:r>
-            <a:endParaRPr lang="en-IN"/>
-          </a:p>
-        </p:txBody>
-      </p:sp>
-      <p:sp>
-        <p:nvSpPr>
-          <p:cNvPr id="4" name="Date Placeholder 3">
-            <a:extLst>
-              <a:ext uri="{FF2B5EF4-FFF2-40B4-BE49-F238E27FC236}">
-                <a16:creationId xmlns:a16="http://schemas.microsoft.com/office/drawing/2014/main" id="{49B0696A-96EC-5567-DEDD-F25B8C6E0C6B}"/>
-              </a:ext>
-            </a:extLst>
-          </p:cNvPr>
+            <a:endParaRPr lang="en-US" dirty="0"/>
+          </a:p>
+        </p:txBody>
+      </p:sp>
+      <p:sp>
+        <p:nvSpPr>
+          <p:cNvPr id="4" name="Date Placeholder 3"/>
           <p:cNvSpPr>
             <a:spLocks noGrp="1"/>
           </p:cNvSpPr>
@@ -3261,8 +2900,8 @@
         </p:nvSpPr>
         <p:spPr>
           <a:xfrm>
-            <a:off x="838200" y="6356350"/>
-            <a:ext cx="2743200" cy="365125"/>
+            <a:off x="838200" y="6690354"/>
+            <a:ext cx="2743200" cy="384311"/>
           </a:xfrm>
           <a:prstGeom prst="rect">
             <a:avLst/>
@@ -3292,13 +2931,7 @@
       </p:sp>
       <p:sp>
         <p:nvSpPr>
-          <p:cNvPr id="5" name="Footer Placeholder 4">
-            <a:extLst>
-              <a:ext uri="{FF2B5EF4-FFF2-40B4-BE49-F238E27FC236}">
-                <a16:creationId xmlns:a16="http://schemas.microsoft.com/office/drawing/2014/main" id="{C2AF01CE-6B8E-BD21-AE3B-A378E0A38B40}"/>
-              </a:ext>
-            </a:extLst>
-          </p:cNvPr>
+          <p:cNvPr id="5" name="Footer Placeholder 4"/>
           <p:cNvSpPr>
             <a:spLocks noGrp="1"/>
           </p:cNvSpPr>
@@ -3308,8 +2941,8 @@
         </p:nvSpPr>
         <p:spPr>
           <a:xfrm>
-            <a:off x="4038600" y="6356350"/>
-            <a:ext cx="4114800" cy="365125"/>
+            <a:off x="4038600" y="6690354"/>
+            <a:ext cx="4114800" cy="384311"/>
           </a:xfrm>
           <a:prstGeom prst="rect">
             <a:avLst/>
@@ -3335,13 +2968,7 @@
       </p:sp>
       <p:sp>
         <p:nvSpPr>
-          <p:cNvPr id="6" name="Slide Number Placeholder 5">
-            <a:extLst>
-              <a:ext uri="{FF2B5EF4-FFF2-40B4-BE49-F238E27FC236}">
-                <a16:creationId xmlns:a16="http://schemas.microsoft.com/office/drawing/2014/main" id="{5685F9CE-4630-3EDE-DC5B-B34B9D6999D3}"/>
-              </a:ext>
-            </a:extLst>
-          </p:cNvPr>
+          <p:cNvPr id="6" name="Slide Number Placeholder 5"/>
           <p:cNvSpPr>
             <a:spLocks noGrp="1"/>
           </p:cNvSpPr>
@@ -3351,8 +2978,8 @@
         </p:nvSpPr>
         <p:spPr>
           <a:xfrm>
-            <a:off x="8610600" y="6356350"/>
-            <a:ext cx="2743200" cy="365125"/>
+            <a:off x="8610600" y="6690354"/>
+            <a:ext cx="2743200" cy="384311"/>
           </a:xfrm>
           <a:prstGeom prst="rect">
             <a:avLst/>
@@ -3383,23 +3010,23 @@
     </p:spTree>
     <p:extLst>
       <p:ext uri="{BB962C8B-B14F-4D97-AF65-F5344CB8AC3E}">
-        <p14:creationId xmlns:p14="http://schemas.microsoft.com/office/powerpoint/2010/main" val="561175197"/>
+        <p14:creationId xmlns:p14="http://schemas.microsoft.com/office/powerpoint/2010/main" val="4174471730"/>
       </p:ext>
     </p:extLst>
   </p:cSld>
   <p:clrMap bg1="lt1" tx1="dk1" bg2="lt2" tx2="dk2" accent1="accent1" accent2="accent2" accent3="accent3" accent4="accent4" accent5="accent5" accent6="accent6" hlink="hlink" folHlink="folHlink"/>
   <p:sldLayoutIdLst>
-    <p:sldLayoutId id="2147483649" r:id="rId1"/>
-    <p:sldLayoutId id="2147483650" r:id="rId2"/>
-    <p:sldLayoutId id="2147483651" r:id="rId3"/>
-    <p:sldLayoutId id="2147483652" r:id="rId4"/>
-    <p:sldLayoutId id="2147483653" r:id="rId5"/>
-    <p:sldLayoutId id="2147483654" r:id="rId6"/>
-    <p:sldLayoutId id="2147483655" r:id="rId7"/>
-    <p:sldLayoutId id="2147483656" r:id="rId8"/>
-    <p:sldLayoutId id="2147483657" r:id="rId9"/>
-    <p:sldLayoutId id="2147483658" r:id="rId10"/>
-    <p:sldLayoutId id="2147483659" r:id="rId11"/>
+    <p:sldLayoutId id="2147483661" r:id="rId1"/>
+    <p:sldLayoutId id="2147483662" r:id="rId2"/>
+    <p:sldLayoutId id="2147483663" r:id="rId3"/>
+    <p:sldLayoutId id="2147483664" r:id="rId4"/>
+    <p:sldLayoutId id="2147483665" r:id="rId5"/>
+    <p:sldLayoutId id="2147483666" r:id="rId6"/>
+    <p:sldLayoutId id="2147483667" r:id="rId7"/>
+    <p:sldLayoutId id="2147483668" r:id="rId8"/>
+    <p:sldLayoutId id="2147483669" r:id="rId9"/>
+    <p:sldLayoutId id="2147483670" r:id="rId10"/>
+    <p:sldLayoutId id="2147483671" r:id="rId11"/>
   </p:sldLayoutIdLst>
   <p:txStyles>
     <p:titleStyle>
@@ -3721,8 +3348,8 @@
         </p:nvSpPr>
         <p:spPr>
           <a:xfrm>
-            <a:off x="2176208" y="186786"/>
-            <a:ext cx="7839581" cy="461665"/>
+            <a:off x="2176210" y="366969"/>
+            <a:ext cx="7839581" cy="457368"/>
           </a:xfrm>
           <a:prstGeom prst="rect">
             <a:avLst/>
@@ -3737,7 +3364,7 @@
           <a:p>
             <a:pPr algn="ctr"/>
             <a:r>
-              <a:rPr lang="en-US" sz="2400" b="1" cap="small" dirty="0">
+              <a:rPr lang="en-US" sz="2401" b="1" cap="small" dirty="0">
                 <a:latin typeface="Oxygen" panose="02000503000000000000" pitchFamily="2" charset="0"/>
               </a:rPr>
               <a:t>Contents</a:t>
@@ -3773,7 +3400,7 @@
         </p:blipFill>
         <p:spPr>
           <a:xfrm>
-            <a:off x="315242" y="186786"/>
+            <a:off x="315244" y="366969"/>
             <a:ext cx="725875" cy="725875"/>
           </a:xfrm>
           <a:prstGeom prst="rect">
@@ -3795,8 +3422,8 @@
         </p:nvSpPr>
         <p:spPr>
           <a:xfrm>
-            <a:off x="2176208" y="1435510"/>
-            <a:ext cx="6436850" cy="5078313"/>
+            <a:off x="2176208" y="1615693"/>
+            <a:ext cx="6436850" cy="4524315"/>
           </a:xfrm>
           <a:prstGeom prst="rect">
             <a:avLst/>
@@ -3809,13 +3436,13 @@
           </a:bodyPr>
           <a:lstStyle/>
           <a:p>
-            <a:pPr marL="342900" indent="-342900">
+            <a:pPr marL="342913" indent="-342913">
               <a:buAutoNum type="arabicPeriod"/>
             </a:pPr>
             <a:endParaRPr lang="en-US" dirty="0"/>
           </a:p>
           <a:p>
-            <a:pPr marL="342900" indent="-342900">
+            <a:pPr marL="342913" indent="-342913">
               <a:buAutoNum type="arabicPeriod"/>
             </a:pPr>
             <a:r>
@@ -3824,69 +3451,16 @@
             </a:r>
           </a:p>
           <a:p>
-            <a:pPr marL="342900" indent="-342900">
+            <a:pPr marL="342913" indent="-342913">
               <a:buAutoNum type="arabicPeriod"/>
             </a:pPr>
             <a:endParaRPr lang="en-US" dirty="0"/>
           </a:p>
           <a:p>
-            <a:pPr marL="342900" indent="-342900">
-              <a:buAutoNum type="arabicPeriod"/>
-            </a:pPr>
-            <a:r>
-              <a:rPr lang="en-US" dirty="0"/>
-              <a:t>User Management</a:t>
-            </a:r>
-          </a:p>
-          <a:p>
-            <a:pPr marL="342900" indent="-342900">
-              <a:buAutoNum type="arabicPeriod"/>
-            </a:pPr>
-            <a:endParaRPr lang="en-US" dirty="0"/>
-          </a:p>
-          <a:p>
-            <a:pPr marL="342900" indent="-342900">
-              <a:buAutoNum type="arabicPeriod"/>
-            </a:pPr>
-            <a:r>
-              <a:rPr lang="en-IN" i="0">
-                <a:solidFill>
-                  <a:srgbClr val="111111"/>
-                </a:solidFill>
-                <a:effectLst/>
-                <a:latin typeface="-apple-system"/>
-              </a:rPr>
-              <a:t>Database handling</a:t>
-            </a:r>
-            <a:endParaRPr lang="en-IN" i="0" dirty="0">
-              <a:solidFill>
-                <a:srgbClr val="111111"/>
-              </a:solidFill>
-              <a:effectLst/>
-              <a:latin typeface="-apple-system"/>
-            </a:endParaRPr>
-          </a:p>
-          <a:p>
-            <a:pPr marL="342900" indent="-342900">
-              <a:buAutoNum type="arabicPeriod"/>
-            </a:pPr>
-            <a:endParaRPr lang="en-US" dirty="0"/>
-          </a:p>
-          <a:p>
-            <a:pPr marL="342900" indent="-342900">
+            <a:pPr marL="342913" indent="-342913">
               <a:buFontTx/>
               <a:buAutoNum type="arabicPeriod"/>
             </a:pPr>
-            <a:r>
-              <a:rPr lang="en-IN" i="0" dirty="0">
-                <a:solidFill>
-                  <a:srgbClr val="111111"/>
-                </a:solidFill>
-                <a:effectLst/>
-                <a:latin typeface="-apple-system"/>
-              </a:rPr>
-              <a:t>Tables ,Keys, Views</a:t>
-            </a:r>
             <a:r>
               <a:rPr lang="en-IN" dirty="0">
                 <a:solidFill>
@@ -3894,11 +3468,11 @@
                 </a:solidFill>
                 <a:latin typeface="-apple-system"/>
               </a:rPr>
-              <a:t> ,Queries &amp; Indexes</a:t>
-            </a:r>
-          </a:p>
-          <a:p>
-            <a:pPr marL="342900" indent="-342900">
+              <a:t>Database, Tables ,Keys, Views ,Queries &amp; Indexes</a:t>
+            </a:r>
+          </a:p>
+          <a:p>
+            <a:pPr marL="342913" indent="-342913">
               <a:buFontTx/>
               <a:buAutoNum type="arabicPeriod"/>
             </a:pPr>
@@ -3910,7 +3484,7 @@
             </a:endParaRPr>
           </a:p>
           <a:p>
-            <a:pPr marL="342900" indent="-342900">
+            <a:pPr marL="342913" indent="-342913">
               <a:buFontTx/>
               <a:buAutoNum type="arabicPeriod"/>
             </a:pPr>
@@ -3925,14 +3499,14 @@
             </a:r>
           </a:p>
           <a:p>
-            <a:pPr marL="342900" indent="-342900">
+            <a:pPr marL="342913" indent="-342913">
               <a:buFontTx/>
               <a:buAutoNum type="arabicPeriod"/>
             </a:pPr>
             <a:endParaRPr lang="en-US" dirty="0"/>
           </a:p>
           <a:p>
-            <a:pPr marL="342900" indent="-342900">
+            <a:pPr marL="342913" indent="-342913">
               <a:buAutoNum type="arabicPeriod"/>
             </a:pPr>
             <a:r>
@@ -3941,13 +3515,13 @@
             </a:r>
           </a:p>
           <a:p>
-            <a:pPr marL="342900" indent="-342900">
+            <a:pPr marL="342913" indent="-342913">
               <a:buAutoNum type="arabicPeriod"/>
             </a:pPr>
             <a:endParaRPr lang="en-US" dirty="0"/>
           </a:p>
           <a:p>
-            <a:pPr marL="342900" indent="-342900">
+            <a:pPr marL="342913" indent="-342913">
               <a:buAutoNum type="arabicPeriod"/>
             </a:pPr>
             <a:r>
@@ -3956,28 +3530,43 @@
             </a:r>
           </a:p>
           <a:p>
-            <a:pPr marL="342900" indent="-342900">
+            <a:pPr marL="342913" indent="-342913">
               <a:buAutoNum type="arabicPeriod"/>
             </a:pPr>
             <a:endParaRPr lang="en-US" dirty="0"/>
           </a:p>
           <a:p>
-            <a:pPr marL="342900" indent="-342900">
+            <a:pPr marL="342913" indent="-342913">
               <a:buAutoNum type="arabicPeriod"/>
             </a:pPr>
             <a:r>
               <a:rPr lang="en-US" dirty="0"/>
-              <a:t>MySQL Backup &amp; Restore</a:t>
-            </a:r>
-          </a:p>
-          <a:p>
-            <a:pPr marL="342900" indent="-342900">
+              <a:t>User Management</a:t>
+            </a:r>
+          </a:p>
+          <a:p>
+            <a:pPr marL="342913" indent="-342913">
               <a:buAutoNum type="arabicPeriod"/>
             </a:pPr>
             <a:endParaRPr lang="en-US" dirty="0"/>
           </a:p>
           <a:p>
-            <a:pPr marL="342900" indent="-342900">
+            <a:pPr marL="342913" indent="-342913">
+              <a:buAutoNum type="arabicPeriod"/>
+            </a:pPr>
+            <a:r>
+              <a:rPr lang="en-US" dirty="0"/>
+              <a:t>MySQL Backup &amp; Restore</a:t>
+            </a:r>
+          </a:p>
+          <a:p>
+            <a:pPr marL="342913" indent="-342913">
+              <a:buAutoNum type="arabicPeriod"/>
+            </a:pPr>
+            <a:endParaRPr lang="en-US" dirty="0"/>
+          </a:p>
+          <a:p>
+            <a:pPr marL="342913" indent="-342913">
               <a:buAutoNum type="arabicPeriod"/>
             </a:pPr>
             <a:endParaRPr lang="en-IN" dirty="0"/>
@@ -4034,8 +3623,8 @@
         </p:nvSpPr>
         <p:spPr>
           <a:xfrm>
-            <a:off x="1930401" y="186786"/>
-            <a:ext cx="7839581" cy="461665"/>
+            <a:off x="1930403" y="366969"/>
+            <a:ext cx="7839581" cy="457368"/>
           </a:xfrm>
           <a:prstGeom prst="rect">
             <a:avLst/>
@@ -4050,7 +3639,7 @@
           <a:p>
             <a:pPr algn="ctr"/>
             <a:r>
-              <a:rPr lang="en-US" sz="2400" b="1" cap="small" dirty="0">
+              <a:rPr lang="en-US" sz="2401" b="1" cap="small" dirty="0">
                 <a:latin typeface="Oxygen" panose="02000503000000000000" pitchFamily="2" charset="0"/>
               </a:rPr>
               <a:t>Introduction</a:t>
@@ -4086,7 +3675,7 @@
         </p:blipFill>
         <p:spPr>
           <a:xfrm>
-            <a:off x="315242" y="186786"/>
+            <a:off x="315244" y="366969"/>
             <a:ext cx="725875" cy="725875"/>
           </a:xfrm>
           <a:prstGeom prst="rect">
@@ -4108,8 +3697,8 @@
         </p:nvSpPr>
         <p:spPr>
           <a:xfrm>
-            <a:off x="2176208" y="1435510"/>
-            <a:ext cx="6436850" cy="923330"/>
+            <a:off x="1474841" y="1114243"/>
+            <a:ext cx="8652387" cy="2893100"/>
           </a:xfrm>
           <a:prstGeom prst="rect">
             <a:avLst/>
@@ -4122,22 +3711,103 @@
           </a:bodyPr>
           <a:lstStyle/>
           <a:p>
-            <a:pPr marL="342900" indent="-342900">
+            <a:pPr marL="342913" indent="-342913">
               <a:buAutoNum type="arabicPeriod"/>
             </a:pPr>
             <a:endParaRPr lang="en-US" dirty="0"/>
           </a:p>
           <a:p>
             <a:r>
-              <a:rPr lang="en-IN" dirty="0"/>
+              <a:rPr lang="en-IN" sz="1400" dirty="0">
+                <a:latin typeface="Oxygen" panose="02000503000000000000" pitchFamily="2" charset="0"/>
+              </a:rPr>
               <a:t>MySQL is relational database management system.</a:t>
             </a:r>
           </a:p>
           <a:p>
             <a:r>
-              <a:rPr lang="en-IN" dirty="0"/>
-              <a:t>It is free and open source</a:t>
-            </a:r>
+              <a:rPr lang="en-IN" sz="1400" dirty="0">
+                <a:latin typeface="Oxygen" panose="02000503000000000000" pitchFamily="2" charset="0"/>
+              </a:rPr>
+              <a:t>It is free and open source.</a:t>
+            </a:r>
+          </a:p>
+          <a:p>
+            <a:r>
+              <a:rPr lang="en-US" sz="1400" dirty="0">
+                <a:solidFill>
+                  <a:srgbClr val="000000"/>
+                </a:solidFill>
+                <a:latin typeface="Oxygen" panose="02000503000000000000" pitchFamily="2" charset="0"/>
+              </a:rPr>
+              <a:t>It is very fast, reliable, scalable, easy to use and cross platform.</a:t>
+            </a:r>
+          </a:p>
+          <a:p>
+            <a:r>
+              <a:rPr lang="en-US" sz="1400" dirty="0">
+                <a:solidFill>
+                  <a:srgbClr val="000000"/>
+                </a:solidFill>
+                <a:latin typeface="Oxygen" panose="02000503000000000000" pitchFamily="2" charset="0"/>
+              </a:rPr>
+              <a:t>MySQL is ideal for both small and large applications.</a:t>
+            </a:r>
+          </a:p>
+          <a:p>
+            <a:r>
+              <a:rPr lang="en-US" sz="1400" dirty="0">
+                <a:solidFill>
+                  <a:srgbClr val="000000"/>
+                </a:solidFill>
+                <a:latin typeface="Oxygen" panose="02000503000000000000" pitchFamily="2" charset="0"/>
+              </a:rPr>
+              <a:t>MySQL is developed, distributed, and supported by Oracle Corporation</a:t>
+            </a:r>
+          </a:p>
+          <a:p>
+            <a:endParaRPr lang="en-US" sz="1400" dirty="0">
+              <a:solidFill>
+                <a:srgbClr val="000000"/>
+              </a:solidFill>
+              <a:latin typeface="Oxygen" panose="02000503000000000000" pitchFamily="2" charset="0"/>
+            </a:endParaRPr>
+          </a:p>
+          <a:p>
+            <a:r>
+              <a:rPr lang="en-US" sz="1400" dirty="0">
+                <a:solidFill>
+                  <a:srgbClr val="000000"/>
+                </a:solidFill>
+                <a:latin typeface="Oxygen" panose="02000503000000000000" pitchFamily="2" charset="0"/>
+              </a:rPr>
+              <a:t>For installation of MySQL in your computer, please click the below link</a:t>
+            </a:r>
+          </a:p>
+          <a:p>
+            <a:r>
+              <a:rPr lang="en-IN" sz="1600" dirty="0">
+                <a:latin typeface="Oxygen" panose="02000503000000000000" pitchFamily="2" charset="0"/>
+                <a:hlinkClick r:id="rId3"/>
+              </a:rPr>
+              <a:t>https://www.javatpoint.com/how-to-install-mysql</a:t>
+            </a:r>
+            <a:endParaRPr lang="en-IN" sz="1600" dirty="0">
+              <a:latin typeface="Oxygen" panose="02000503000000000000" pitchFamily="2" charset="0"/>
+            </a:endParaRPr>
+          </a:p>
+          <a:p>
+            <a:endParaRPr lang="en-IN" sz="1600" dirty="0">
+              <a:latin typeface="Oxygen" panose="02000503000000000000" pitchFamily="2" charset="0"/>
+            </a:endParaRPr>
+          </a:p>
+          <a:p>
+            <a:endParaRPr lang="en-IN" sz="1600" dirty="0">
+              <a:latin typeface="Oxygen" panose="02000503000000000000" pitchFamily="2" charset="0"/>
+            </a:endParaRPr>
+          </a:p>
+          <a:p>
+            <a:endParaRPr lang="en-IN" dirty="0"/>
           </a:p>
         </p:txBody>
       </p:sp>
@@ -4154,10 +3824,450 @@
 </p:sld>
 </file>
 
+<file path=ppt/slides/slide3.xml><?xml version="1.0" encoding="utf-8"?>
+<p:sld xmlns:a="http://schemas.openxmlformats.org/drawingml/2006/main" xmlns:r="http://schemas.openxmlformats.org/officeDocument/2006/relationships" xmlns:p="http://schemas.openxmlformats.org/presentationml/2006/main">
+  <p:cSld>
+    <p:spTree>
+      <p:nvGrpSpPr>
+        <p:cNvPr id="1" name="">
+          <a:extLst>
+            <a:ext uri="{FF2B5EF4-FFF2-40B4-BE49-F238E27FC236}">
+              <a16:creationId xmlns:a16="http://schemas.microsoft.com/office/drawing/2014/main" id="{E59799FF-1E01-84D8-85A2-6B34BB96FEC7}"/>
+            </a:ext>
+          </a:extLst>
+        </p:cNvPr>
+        <p:cNvGrpSpPr/>
+        <p:nvPr/>
+      </p:nvGrpSpPr>
+      <p:grpSpPr>
+        <a:xfrm>
+          <a:off x="0" y="0"/>
+          <a:ext cx="0" cy="0"/>
+          <a:chOff x="0" y="0"/>
+          <a:chExt cx="0" cy="0"/>
+        </a:xfrm>
+      </p:grpSpPr>
+      <p:sp>
+        <p:nvSpPr>
+          <p:cNvPr id="7" name="TextBox 6">
+            <a:extLst>
+              <a:ext uri="{FF2B5EF4-FFF2-40B4-BE49-F238E27FC236}">
+                <a16:creationId xmlns:a16="http://schemas.microsoft.com/office/drawing/2014/main" id="{722B7F5F-1F8E-13F9-7452-ADFE5F9663B3}"/>
+              </a:ext>
+            </a:extLst>
+          </p:cNvPr>
+          <p:cNvSpPr txBox="1"/>
+          <p:nvPr/>
+        </p:nvSpPr>
+        <p:spPr>
+          <a:xfrm>
+            <a:off x="1930403" y="366969"/>
+            <a:ext cx="7839581" cy="457368"/>
+          </a:xfrm>
+          <a:prstGeom prst="rect">
+            <a:avLst/>
+          </a:prstGeom>
+          <a:noFill/>
+        </p:spPr>
+        <p:txBody>
+          <a:bodyPr wrap="square" rtlCol="0">
+            <a:spAutoFit/>
+          </a:bodyPr>
+          <a:lstStyle/>
+          <a:p>
+            <a:pPr algn="ctr"/>
+            <a:r>
+              <a:rPr lang="en-US" sz="2401" b="1" cap="small" dirty="0">
+                <a:latin typeface="Oxygen" panose="02000503000000000000" pitchFamily="2" charset="0"/>
+              </a:rPr>
+              <a:t>Database handling</a:t>
+            </a:r>
+          </a:p>
+        </p:txBody>
+      </p:sp>
+      <p:pic>
+        <p:nvPicPr>
+          <p:cNvPr id="15" name="Picture 14">
+            <a:extLst>
+              <a:ext uri="{FF2B5EF4-FFF2-40B4-BE49-F238E27FC236}">
+                <a16:creationId xmlns:a16="http://schemas.microsoft.com/office/drawing/2014/main" id="{26A65876-724E-1783-C423-50CBA505EE9C}"/>
+              </a:ext>
+            </a:extLst>
+          </p:cNvPr>
+          <p:cNvPicPr>
+            <a:picLocks noChangeAspect="1"/>
+          </p:cNvPicPr>
+          <p:nvPr/>
+        </p:nvPicPr>
+        <p:blipFill>
+          <a:blip r:embed="rId2">
+            <a:extLst>
+              <a:ext uri="{28A0092B-C50C-407E-A947-70E740481C1C}">
+                <a14:useLocalDpi xmlns:a14="http://schemas.microsoft.com/office/drawing/2010/main" val="0"/>
+              </a:ext>
+            </a:extLst>
+          </a:blip>
+          <a:stretch>
+            <a:fillRect/>
+          </a:stretch>
+        </p:blipFill>
+        <p:spPr>
+          <a:xfrm>
+            <a:off x="315244" y="366969"/>
+            <a:ext cx="725875" cy="725875"/>
+          </a:xfrm>
+          <a:prstGeom prst="rect">
+            <a:avLst/>
+          </a:prstGeom>
+        </p:spPr>
+      </p:pic>
+      <p:sp>
+        <p:nvSpPr>
+          <p:cNvPr id="2" name="TextBox 1">
+            <a:extLst>
+              <a:ext uri="{FF2B5EF4-FFF2-40B4-BE49-F238E27FC236}">
+                <a16:creationId xmlns:a16="http://schemas.microsoft.com/office/drawing/2014/main" id="{008F97AD-1DE8-22B9-1A36-9644532E124E}"/>
+              </a:ext>
+            </a:extLst>
+          </p:cNvPr>
+          <p:cNvSpPr txBox="1"/>
+          <p:nvPr/>
+        </p:nvSpPr>
+        <p:spPr>
+          <a:xfrm>
+            <a:off x="1474841" y="1114245"/>
+            <a:ext cx="8652387" cy="6032421"/>
+          </a:xfrm>
+          <a:prstGeom prst="rect">
+            <a:avLst/>
+          </a:prstGeom>
+          <a:noFill/>
+        </p:spPr>
+        <p:txBody>
+          <a:bodyPr wrap="square" rtlCol="0">
+            <a:spAutoFit/>
+          </a:bodyPr>
+          <a:lstStyle/>
+          <a:p>
+            <a:r>
+              <a:rPr lang="en-IN" sz="1600" dirty="0">
+                <a:latin typeface="Oxygen" panose="02000503000000000000" pitchFamily="2" charset="0"/>
+              </a:rPr>
+              <a:t>MySQL create database statement  </a:t>
+            </a:r>
+            <a:r>
+              <a:rPr lang="en-IN" sz="1600" dirty="0">
+                <a:latin typeface="Oxygen" panose="02000503000000000000" pitchFamily="2" charset="0"/>
+                <a:sym typeface="Wingdings" panose="05000000000000000000" pitchFamily="2" charset="2"/>
+              </a:rPr>
+              <a:t></a:t>
+            </a:r>
+            <a:r>
+              <a:rPr lang="en-IN" sz="1600" dirty="0">
+                <a:latin typeface="Oxygen" panose="02000503000000000000" pitchFamily="2" charset="0"/>
+              </a:rPr>
+              <a:t> create database testDB.</a:t>
+            </a:r>
+          </a:p>
+          <a:p>
+            <a:r>
+              <a:rPr lang="en-IN" sz="1600" dirty="0">
+                <a:latin typeface="Oxygen" panose="02000503000000000000" pitchFamily="2" charset="0"/>
+              </a:rPr>
+              <a:t>The above statement creates database named as testDB.</a:t>
+            </a:r>
+          </a:p>
+          <a:p>
+            <a:endParaRPr lang="en-IN" sz="1600" dirty="0">
+              <a:latin typeface="Oxygen" panose="02000503000000000000" pitchFamily="2" charset="0"/>
+            </a:endParaRPr>
+          </a:p>
+          <a:p>
+            <a:r>
+              <a:rPr lang="en-IN" sz="1400" dirty="0">
+                <a:solidFill>
+                  <a:srgbClr val="000000"/>
+                </a:solidFill>
+                <a:latin typeface="Oxygen" panose="02000503000000000000" pitchFamily="2" charset="0"/>
+              </a:rPr>
+              <a:t>MySQL DROP DATABASE Statement </a:t>
+            </a:r>
+            <a:r>
+              <a:rPr lang="en-IN" sz="1400" dirty="0">
+                <a:solidFill>
+                  <a:srgbClr val="000000"/>
+                </a:solidFill>
+                <a:latin typeface="Oxygen" panose="02000503000000000000" pitchFamily="2" charset="0"/>
+                <a:sym typeface="Wingdings" panose="05000000000000000000" pitchFamily="2" charset="2"/>
+              </a:rPr>
+              <a:t> </a:t>
+            </a:r>
+            <a:r>
+              <a:rPr lang="en-IN" sz="1600" dirty="0">
+                <a:latin typeface="Oxygen" panose="02000503000000000000" pitchFamily="2" charset="0"/>
+              </a:rPr>
+              <a:t>drop database testDB.</a:t>
+            </a:r>
+          </a:p>
+          <a:p>
+            <a:r>
+              <a:rPr lang="en-IN" sz="1600" dirty="0">
+                <a:latin typeface="Oxygen" panose="02000503000000000000" pitchFamily="2" charset="0"/>
+              </a:rPr>
+              <a:t>The above statement drops database named as testDB.</a:t>
+            </a:r>
+          </a:p>
+          <a:p>
+            <a:endParaRPr lang="en-IN" sz="1600" dirty="0">
+              <a:latin typeface="Oxygen" panose="02000503000000000000" pitchFamily="2" charset="0"/>
+            </a:endParaRPr>
+          </a:p>
+          <a:p>
+            <a:r>
+              <a:rPr lang="en-IN" sz="1600" dirty="0">
+                <a:latin typeface="Oxygen" panose="02000503000000000000" pitchFamily="2" charset="0"/>
+              </a:rPr>
+              <a:t>Inside the database following objects can be created</a:t>
+            </a:r>
+          </a:p>
+          <a:p>
+            <a:pPr marL="342913" indent="-342913">
+              <a:buAutoNum type="alphaLcParenR"/>
+            </a:pPr>
+            <a:r>
+              <a:rPr lang="en-IN" sz="1600" dirty="0">
+                <a:latin typeface="Oxygen" panose="02000503000000000000" pitchFamily="2" charset="0"/>
+              </a:rPr>
+              <a:t>Tables</a:t>
+            </a:r>
+          </a:p>
+          <a:p>
+            <a:pPr marL="342913" indent="-342913">
+              <a:buAutoNum type="alphaLcParenR"/>
+            </a:pPr>
+            <a:r>
+              <a:rPr lang="en-IN" sz="1600" dirty="0">
+                <a:latin typeface="Oxygen" panose="02000503000000000000" pitchFamily="2" charset="0"/>
+              </a:rPr>
+              <a:t>Views </a:t>
+            </a:r>
+          </a:p>
+          <a:p>
+            <a:pPr marL="342913" indent="-342913">
+              <a:buAutoNum type="alphaLcParenR"/>
+            </a:pPr>
+            <a:r>
+              <a:rPr lang="en-IN" sz="1600" dirty="0">
+                <a:latin typeface="Oxygen" panose="02000503000000000000" pitchFamily="2" charset="0"/>
+              </a:rPr>
+              <a:t>Procedures</a:t>
+            </a:r>
+          </a:p>
+          <a:p>
+            <a:pPr marL="342913" indent="-342913">
+              <a:buAutoNum type="alphaLcParenR"/>
+            </a:pPr>
+            <a:r>
+              <a:rPr lang="en-IN" sz="1600" dirty="0">
+                <a:latin typeface="Oxygen" panose="02000503000000000000" pitchFamily="2" charset="0"/>
+              </a:rPr>
+              <a:t>Triggers</a:t>
+            </a:r>
+          </a:p>
+          <a:p>
+            <a:endParaRPr lang="en-IN" sz="1400" dirty="0">
+              <a:solidFill>
+                <a:srgbClr val="000000"/>
+              </a:solidFill>
+              <a:latin typeface="Oxygen" panose="02000503000000000000" pitchFamily="2" charset="0"/>
+            </a:endParaRPr>
+          </a:p>
+          <a:p>
+            <a:r>
+              <a:rPr lang="en-IN" sz="1600" dirty="0">
+                <a:latin typeface="Oxygen" panose="02000503000000000000" pitchFamily="2" charset="0"/>
+              </a:rPr>
+              <a:t>MySQL create table statement </a:t>
+            </a:r>
+            <a:r>
+              <a:rPr lang="en-IN" sz="1600" dirty="0">
+                <a:latin typeface="Oxygen" panose="02000503000000000000" pitchFamily="2" charset="0"/>
+                <a:sym typeface="Wingdings" panose="05000000000000000000" pitchFamily="2" charset="2"/>
+              </a:rPr>
+              <a:t></a:t>
+            </a:r>
+          </a:p>
+          <a:p>
+            <a:r>
+              <a:rPr lang="en-IN" sz="1600" dirty="0">
+                <a:latin typeface="Oxygen" panose="02000503000000000000" pitchFamily="2" charset="0"/>
+                <a:sym typeface="Wingdings" panose="05000000000000000000" pitchFamily="2" charset="2"/>
+              </a:rPr>
+              <a:t>Use </a:t>
+            </a:r>
+            <a:r>
+              <a:rPr lang="en-IN" sz="1600" dirty="0">
+                <a:latin typeface="Oxygen" panose="02000503000000000000" pitchFamily="2" charset="0"/>
+              </a:rPr>
+              <a:t>testDB</a:t>
+            </a:r>
+            <a:endParaRPr lang="en-IN" sz="1600" dirty="0">
+              <a:latin typeface="Oxygen" panose="02000503000000000000" pitchFamily="2" charset="0"/>
+              <a:sym typeface="Wingdings" panose="05000000000000000000" pitchFamily="2" charset="2"/>
+            </a:endParaRPr>
+          </a:p>
+          <a:p>
+            <a:r>
+              <a:rPr lang="en-IN" sz="1600" dirty="0">
+                <a:latin typeface="Oxygen" panose="02000503000000000000" pitchFamily="2" charset="0"/>
+                <a:sym typeface="Wingdings" panose="05000000000000000000" pitchFamily="2" charset="2"/>
+              </a:rPr>
+              <a:t>Create table employee (</a:t>
+            </a:r>
+          </a:p>
+          <a:p>
+            <a:r>
+              <a:rPr lang="en-IN" sz="1600" dirty="0">
+                <a:latin typeface="Oxygen" panose="02000503000000000000" pitchFamily="2" charset="0"/>
+                <a:sym typeface="Wingdings" panose="05000000000000000000" pitchFamily="2" charset="2"/>
+              </a:rPr>
+              <a:t>	</a:t>
+            </a:r>
+            <a:r>
+              <a:rPr lang="en-IN" sz="1600" dirty="0" err="1">
+                <a:latin typeface="Oxygen" panose="02000503000000000000" pitchFamily="2" charset="0"/>
+                <a:sym typeface="Wingdings" panose="05000000000000000000" pitchFamily="2" charset="2"/>
+              </a:rPr>
+              <a:t>emp_id</a:t>
+            </a:r>
+            <a:r>
+              <a:rPr lang="en-IN" sz="1600" dirty="0">
+                <a:latin typeface="Oxygen" panose="02000503000000000000" pitchFamily="2" charset="0"/>
+                <a:sym typeface="Wingdings" panose="05000000000000000000" pitchFamily="2" charset="2"/>
+              </a:rPr>
+              <a:t> int,</a:t>
+            </a:r>
+          </a:p>
+          <a:p>
+            <a:r>
+              <a:rPr lang="en-IN" sz="1600" dirty="0">
+                <a:latin typeface="Oxygen" panose="02000503000000000000" pitchFamily="2" charset="0"/>
+                <a:sym typeface="Wingdings" panose="05000000000000000000" pitchFamily="2" charset="2"/>
+              </a:rPr>
+              <a:t>	</a:t>
+            </a:r>
+            <a:r>
+              <a:rPr lang="en-IN" sz="1600" dirty="0" err="1">
+                <a:latin typeface="Oxygen" panose="02000503000000000000" pitchFamily="2" charset="0"/>
+                <a:sym typeface="Wingdings" panose="05000000000000000000" pitchFamily="2" charset="2"/>
+              </a:rPr>
+              <a:t>emp_name</a:t>
+            </a:r>
+            <a:r>
+              <a:rPr lang="en-IN" sz="1600" dirty="0">
+                <a:latin typeface="Oxygen" panose="02000503000000000000" pitchFamily="2" charset="0"/>
+                <a:sym typeface="Wingdings" panose="05000000000000000000" pitchFamily="2" charset="2"/>
+              </a:rPr>
+              <a:t> varchar(50),</a:t>
+            </a:r>
+          </a:p>
+          <a:p>
+            <a:r>
+              <a:rPr lang="en-IN" sz="1600" dirty="0">
+                <a:latin typeface="Oxygen" panose="02000503000000000000" pitchFamily="2" charset="0"/>
+                <a:sym typeface="Wingdings" panose="05000000000000000000" pitchFamily="2" charset="2"/>
+              </a:rPr>
+              <a:t>	salary double )</a:t>
+            </a:r>
+          </a:p>
+          <a:p>
+            <a:r>
+              <a:rPr lang="en-IN" sz="1600" dirty="0">
+                <a:latin typeface="Oxygen" panose="02000503000000000000" pitchFamily="2" charset="0"/>
+              </a:rPr>
+              <a:t>The above statement creates table named as </a:t>
+            </a:r>
+            <a:r>
+              <a:rPr lang="en-IN" sz="1600" dirty="0">
+                <a:latin typeface="Oxygen" panose="02000503000000000000" pitchFamily="2" charset="0"/>
+                <a:sym typeface="Wingdings" panose="05000000000000000000" pitchFamily="2" charset="2"/>
+              </a:rPr>
+              <a:t>employee inside testDB database.</a:t>
+            </a:r>
+            <a:endParaRPr lang="en-IN" sz="1600" dirty="0">
+              <a:latin typeface="Oxygen" panose="02000503000000000000" pitchFamily="2" charset="0"/>
+            </a:endParaRPr>
+          </a:p>
+          <a:p>
+            <a:endParaRPr lang="en-IN" sz="1600" dirty="0">
+              <a:latin typeface="Oxygen" panose="02000503000000000000" pitchFamily="2" charset="0"/>
+              <a:sym typeface="Wingdings" panose="05000000000000000000" pitchFamily="2" charset="2"/>
+            </a:endParaRPr>
+          </a:p>
+          <a:p>
+            <a:r>
+              <a:rPr lang="en-IN" sz="1600" dirty="0">
+                <a:latin typeface="Oxygen" panose="02000503000000000000" pitchFamily="2" charset="0"/>
+              </a:rPr>
+              <a:t>The employee table consists of 3 fields</a:t>
+            </a:r>
+          </a:p>
+          <a:p>
+            <a:r>
+              <a:rPr lang="en-IN" sz="1600" dirty="0">
+                <a:latin typeface="Oxygen" panose="02000503000000000000" pitchFamily="2" charset="0"/>
+              </a:rPr>
+              <a:t>a) </a:t>
+            </a:r>
+            <a:r>
+              <a:rPr lang="en-IN" sz="1600" dirty="0" err="1">
+                <a:latin typeface="Oxygen" panose="02000503000000000000" pitchFamily="2" charset="0"/>
+              </a:rPr>
+              <a:t>emp_id</a:t>
+            </a:r>
+            <a:r>
+              <a:rPr lang="en-IN" sz="1600" dirty="0">
+                <a:latin typeface="Oxygen" panose="02000503000000000000" pitchFamily="2" charset="0"/>
+              </a:rPr>
+              <a:t> </a:t>
+            </a:r>
+          </a:p>
+          <a:p>
+            <a:r>
+              <a:rPr lang="en-IN" dirty="0"/>
+              <a:t>b) </a:t>
+            </a:r>
+            <a:r>
+              <a:rPr lang="en-IN" dirty="0" err="1"/>
+              <a:t>emp_name</a:t>
+            </a:r>
+            <a:endParaRPr lang="en-IN" dirty="0"/>
+          </a:p>
+          <a:p>
+            <a:r>
+              <a:rPr lang="en-IN" dirty="0"/>
+              <a:t>c) salary</a:t>
+            </a:r>
+          </a:p>
+        </p:txBody>
+      </p:sp>
+    </p:spTree>
+    <p:extLst>
+      <p:ext uri="{BB962C8B-B14F-4D97-AF65-F5344CB8AC3E}">
+        <p14:creationId xmlns:p14="http://schemas.microsoft.com/office/powerpoint/2010/main" val="2517225604"/>
+      </p:ext>
+    </p:extLst>
+  </p:cSld>
+  <p:clrMapOvr>
+    <a:masterClrMapping/>
+  </p:clrMapOvr>
+</p:sld>
+</file>
+
 <file path=ppt/theme/theme1.xml><?xml version="1.0" encoding="utf-8"?>
 <a:theme xmlns:a="http://schemas.openxmlformats.org/drawingml/2006/main" name="Office Theme">
   <a:themeElements>
-    <a:clrScheme name="Office">
+    <a:clrScheme name="Office Theme">
       <a:dk1>
         <a:sysClr val="windowText" lastClr="000000"/>
       </a:dk1>
@@ -4195,7 +4305,7 @@
         <a:srgbClr val="954F72"/>
       </a:folHlink>
     </a:clrScheme>
-    <a:fontScheme name="Office">
+    <a:fontScheme name="Office Theme">
       <a:majorFont>
         <a:latin typeface="Calibri Light" panose="020F0302020204030204"/>
         <a:ea typeface=""/>
@@ -4230,23 +4340,6 @@
         <a:font script="Viet" typeface="Times New Roman"/>
         <a:font script="Uigh" typeface="Microsoft Uighur"/>
         <a:font script="Geor" typeface="Sylfaen"/>
-        <a:font script="Armn" typeface="Arial"/>
-        <a:font script="Bugi" typeface="Leelawadee UI"/>
-        <a:font script="Bopo" typeface="Microsoft JhengHei"/>
-        <a:font script="Java" typeface="Javanese Text"/>
-        <a:font script="Lisu" typeface="Segoe UI"/>
-        <a:font script="Mymr" typeface="Myanmar Text"/>
-        <a:font script="Nkoo" typeface="Ebrima"/>
-        <a:font script="Olck" typeface="Nirmala UI"/>
-        <a:font script="Osma" typeface="Ebrima"/>
-        <a:font script="Phag" typeface="Phagspa"/>
-        <a:font script="Syrn" typeface="Estrangelo Edessa"/>
-        <a:font script="Syrj" typeface="Estrangelo Edessa"/>
-        <a:font script="Syre" typeface="Estrangelo Edessa"/>
-        <a:font script="Sora" typeface="Nirmala UI"/>
-        <a:font script="Tale" typeface="Microsoft Tai Le"/>
-        <a:font script="Talu" typeface="Microsoft New Tai Lue"/>
-        <a:font script="Tfng" typeface="Ebrima"/>
       </a:majorFont>
       <a:minorFont>
         <a:latin typeface="Calibri" panose="020F0502020204030204"/>
@@ -4282,26 +4375,9 @@
         <a:font script="Viet" typeface="Arial"/>
         <a:font script="Uigh" typeface="Microsoft Uighur"/>
         <a:font script="Geor" typeface="Sylfaen"/>
-        <a:font script="Armn" typeface="Arial"/>
-        <a:font script="Bugi" typeface="Leelawadee UI"/>
-        <a:font script="Bopo" typeface="Microsoft JhengHei"/>
-        <a:font script="Java" typeface="Javanese Text"/>
-        <a:font script="Lisu" typeface="Segoe UI"/>
-        <a:font script="Mymr" typeface="Myanmar Text"/>
-        <a:font script="Nkoo" typeface="Ebrima"/>
-        <a:font script="Olck" typeface="Nirmala UI"/>
-        <a:font script="Osma" typeface="Ebrima"/>
-        <a:font script="Phag" typeface="Phagspa"/>
-        <a:font script="Syrn" typeface="Estrangelo Edessa"/>
-        <a:font script="Syrj" typeface="Estrangelo Edessa"/>
-        <a:font script="Syre" typeface="Estrangelo Edessa"/>
-        <a:font script="Sora" typeface="Nirmala UI"/>
-        <a:font script="Tale" typeface="Microsoft Tai Le"/>
-        <a:font script="Talu" typeface="Microsoft New Tai Lue"/>
-        <a:font script="Tfng" typeface="Ebrima"/>
       </a:minorFont>
     </a:fontScheme>
-    <a:fmtScheme name="Office">
+    <a:fmtScheme name="Office Theme">
       <a:fillStyleLst>
         <a:solidFill>
           <a:schemeClr val="phClr"/>
@@ -4443,7 +4519,7 @@
   <a:extraClrSchemeLst/>
   <a:extLst>
     <a:ext uri="{05A4C25C-085E-4340-85A3-A5531E510DB2}">
-      <thm15:themeFamily xmlns:thm15="http://schemas.microsoft.com/office/thememl/2012/main" name="Office Theme" id="{62F939B6-93AF-4DB8-9C6B-D6C7DFDC589F}" vid="{4A3C46E8-61CC-4603-A589-7422A47A8E4A}"/>
+      <thm15:themeFamily xmlns:thm15="http://schemas.microsoft.com/office/thememl/2012/main" name="Office 2013 - 2022 Theme" id="{62F939B6-93AF-4DB8-9C6B-D6C7DFDC589F}" vid="{4A3C46E8-61CC-4603-A589-7422A47A8E4A}"/>
     </a:ext>
   </a:extLst>
 </a:theme>

</xml_diff>

<commit_message>
MySQL PPT checked in
MySQL PPT checked in
</commit_message>
<xml_diff>
--- a/Offline/BusinessManagement/Teach_Tech@anodiam/IT/CourseMaterials/MySQL/MySQL.pptx
+++ b/Offline/BusinessManagement/Teach_Tech@anodiam/IT/CourseMaterials/MySQL/MySQL.pptx
@@ -5,13 +5,15 @@
     <p:sldMasterId id="2147483672" r:id="rId1"/>
   </p:sldMasterIdLst>
   <p:notesMasterIdLst>
-    <p:notesMasterId r:id="rId6"/>
+    <p:notesMasterId r:id="rId8"/>
   </p:notesMasterIdLst>
   <p:sldIdLst>
     <p:sldId id="259" r:id="rId2"/>
     <p:sldId id="260" r:id="rId3"/>
     <p:sldId id="261" r:id="rId4"/>
     <p:sldId id="262" r:id="rId5"/>
+    <p:sldId id="263" r:id="rId6"/>
+    <p:sldId id="264" r:id="rId7"/>
   </p:sldIdLst>
   <p:sldSz cx="12192000" cy="7289800"/>
   <p:notesSz cx="6858000" cy="9144000"/>
@@ -3699,7 +3701,7 @@
         <p:spPr>
           <a:xfrm>
             <a:off x="1474842" y="1149962"/>
-            <a:ext cx="8652387" cy="2893100"/>
+            <a:ext cx="8652387" cy="3600986"/>
           </a:xfrm>
           <a:prstGeom prst="rect">
             <a:avLst/>
@@ -3775,6 +3777,14 @@
             </a:endParaRPr>
           </a:p>
           <a:p>
+            <a:endParaRPr lang="en-US" sz="1400" dirty="0">
+              <a:solidFill>
+                <a:srgbClr val="000000"/>
+              </a:solidFill>
+              <a:latin typeface="Oxygen" panose="02000503000000000000" pitchFamily="2" charset="0"/>
+            </a:endParaRPr>
+          </a:p>
+          <a:p>
             <a:r>
               <a:rPr lang="en-US" sz="1400" dirty="0">
                 <a:solidFill>
@@ -3793,6 +3803,16 @@
               </a:rPr>
               <a:t>https://www.javatpoint.com/how-to-install-mysql</a:t>
             </a:r>
+            <a:endParaRPr lang="en-IN" sz="1600" dirty="0">
+              <a:latin typeface="Oxygen" panose="02000503000000000000" pitchFamily="2" charset="0"/>
+            </a:endParaRPr>
+          </a:p>
+          <a:p>
+            <a:endParaRPr lang="en-IN" sz="1600" dirty="0">
+              <a:latin typeface="Oxygen" panose="02000503000000000000" pitchFamily="2" charset="0"/>
+            </a:endParaRPr>
+          </a:p>
+          <a:p>
             <a:endParaRPr lang="en-IN" sz="1600" dirty="0">
               <a:latin typeface="Oxygen" panose="02000503000000000000" pitchFamily="2" charset="0"/>
             </a:endParaRPr>
@@ -4657,6 +4677,826 @@
     <p:extLst>
       <p:ext uri="{BB962C8B-B14F-4D97-AF65-F5344CB8AC3E}">
         <p14:creationId xmlns:p14="http://schemas.microsoft.com/office/powerpoint/2010/main" val="3294426540"/>
+      </p:ext>
+    </p:extLst>
+  </p:cSld>
+  <p:clrMapOvr>
+    <a:masterClrMapping/>
+  </p:clrMapOvr>
+</p:sld>
+</file>
+
+<file path=ppt/slides/slide5.xml><?xml version="1.0" encoding="utf-8"?>
+<p:sld xmlns:a="http://schemas.openxmlformats.org/drawingml/2006/main" xmlns:r="http://schemas.openxmlformats.org/officeDocument/2006/relationships" xmlns:p="http://schemas.openxmlformats.org/presentationml/2006/main">
+  <p:cSld>
+    <p:spTree>
+      <p:nvGrpSpPr>
+        <p:cNvPr id="1" name="">
+          <a:extLst>
+            <a:ext uri="{FF2B5EF4-FFF2-40B4-BE49-F238E27FC236}">
+              <a16:creationId xmlns:a16="http://schemas.microsoft.com/office/drawing/2014/main" id="{ECEC2F0E-15BB-08CF-E926-81A51713EFD8}"/>
+            </a:ext>
+          </a:extLst>
+        </p:cNvPr>
+        <p:cNvGrpSpPr/>
+        <p:nvPr/>
+      </p:nvGrpSpPr>
+      <p:grpSpPr>
+        <a:xfrm>
+          <a:off x="0" y="0"/>
+          <a:ext cx="0" cy="0"/>
+          <a:chOff x="0" y="0"/>
+          <a:chExt cx="0" cy="0"/>
+        </a:xfrm>
+      </p:grpSpPr>
+      <p:pic>
+        <p:nvPicPr>
+          <p:cNvPr id="15" name="Picture 14">
+            <a:extLst>
+              <a:ext uri="{FF2B5EF4-FFF2-40B4-BE49-F238E27FC236}">
+                <a16:creationId xmlns:a16="http://schemas.microsoft.com/office/drawing/2014/main" id="{675DF82F-8FE5-A7CC-A9B3-7364DE381715}"/>
+              </a:ext>
+            </a:extLst>
+          </p:cNvPr>
+          <p:cNvPicPr>
+            <a:picLocks noChangeAspect="1"/>
+          </p:cNvPicPr>
+          <p:nvPr/>
+        </p:nvPicPr>
+        <p:blipFill>
+          <a:blip r:embed="rId2">
+            <a:extLst>
+              <a:ext uri="{28A0092B-C50C-407E-A947-70E740481C1C}">
+                <a14:useLocalDpi xmlns:a14="http://schemas.microsoft.com/office/drawing/2010/main" val="0"/>
+              </a:ext>
+            </a:extLst>
+          </a:blip>
+          <a:stretch>
+            <a:fillRect/>
+          </a:stretch>
+        </p:blipFill>
+        <p:spPr>
+          <a:xfrm>
+            <a:off x="315245" y="108772"/>
+            <a:ext cx="725875" cy="725875"/>
+          </a:xfrm>
+          <a:prstGeom prst="rect">
+            <a:avLst/>
+          </a:prstGeom>
+        </p:spPr>
+      </p:pic>
+      <p:sp>
+        <p:nvSpPr>
+          <p:cNvPr id="2" name="TextBox 1">
+            <a:extLst>
+              <a:ext uri="{FF2B5EF4-FFF2-40B4-BE49-F238E27FC236}">
+                <a16:creationId xmlns:a16="http://schemas.microsoft.com/office/drawing/2014/main" id="{9815D881-AF94-6719-F1A3-499999A080FC}"/>
+              </a:ext>
+            </a:extLst>
+          </p:cNvPr>
+          <p:cNvSpPr txBox="1"/>
+          <p:nvPr/>
+        </p:nvSpPr>
+        <p:spPr>
+          <a:xfrm>
+            <a:off x="1474842" y="845166"/>
+            <a:ext cx="8652387" cy="6247864"/>
+          </a:xfrm>
+          <a:prstGeom prst="rect">
+            <a:avLst/>
+          </a:prstGeom>
+          <a:noFill/>
+        </p:spPr>
+        <p:txBody>
+          <a:bodyPr wrap="square" rtlCol="0">
+            <a:spAutoFit/>
+          </a:bodyPr>
+          <a:lstStyle/>
+          <a:p>
+            <a:r>
+              <a:rPr lang="en-IN" sz="1600" b="1" dirty="0">
+                <a:latin typeface="Oxygen" panose="02000503000000000000" pitchFamily="2" charset="0"/>
+              </a:rPr>
+              <a:t>MySQL Data Types can be of various types</a:t>
+            </a:r>
+          </a:p>
+          <a:p>
+            <a:pPr marL="342900" indent="-342900">
+              <a:buAutoNum type="alphaLcParenR"/>
+            </a:pPr>
+            <a:r>
+              <a:rPr lang="en-IN" sz="1600" b="1" dirty="0">
+                <a:latin typeface="Oxygen" panose="02000503000000000000" pitchFamily="2" charset="0"/>
+              </a:rPr>
+              <a:t>String</a:t>
+            </a:r>
+          </a:p>
+          <a:p>
+            <a:pPr marL="342900" indent="-342900">
+              <a:buAutoNum type="alphaLcParenR"/>
+            </a:pPr>
+            <a:r>
+              <a:rPr lang="en-IN" sz="1600" b="1" dirty="0">
+                <a:latin typeface="Oxygen" panose="02000503000000000000" pitchFamily="2" charset="0"/>
+              </a:rPr>
+              <a:t>Numeric</a:t>
+            </a:r>
+          </a:p>
+          <a:p>
+            <a:pPr marL="342900" indent="-342900">
+              <a:buAutoNum type="alphaLcParenR"/>
+            </a:pPr>
+            <a:r>
+              <a:rPr lang="en-IN" sz="1600" b="1" dirty="0">
+                <a:latin typeface="Oxygen" panose="02000503000000000000" pitchFamily="2" charset="0"/>
+              </a:rPr>
+              <a:t>Date and Time</a:t>
+            </a:r>
+          </a:p>
+          <a:p>
+            <a:endParaRPr lang="en-IN" sz="1600" dirty="0">
+              <a:latin typeface="Oxygen" panose="02000503000000000000" pitchFamily="2" charset="0"/>
+              <a:sym typeface="Wingdings" panose="05000000000000000000" pitchFamily="2" charset="2"/>
+            </a:endParaRPr>
+          </a:p>
+          <a:p>
+            <a:r>
+              <a:rPr lang="en-IN" sz="1600" b="1" dirty="0">
+                <a:latin typeface="Oxygen" panose="02000503000000000000" pitchFamily="2" charset="0"/>
+                <a:sym typeface="Wingdings" panose="05000000000000000000" pitchFamily="2" charset="2"/>
+              </a:rPr>
+              <a:t>String Data Type</a:t>
+            </a:r>
+          </a:p>
+          <a:p>
+            <a:pPr marL="342900" indent="-342900">
+              <a:buAutoNum type="alphaLcParenR"/>
+            </a:pPr>
+            <a:r>
+              <a:rPr lang="en-IN" sz="1600" dirty="0">
+                <a:latin typeface="Oxygen" panose="02000503000000000000" pitchFamily="2" charset="0"/>
+                <a:sym typeface="Wingdings" panose="05000000000000000000" pitchFamily="2" charset="2"/>
+              </a:rPr>
+              <a:t>Char</a:t>
+            </a:r>
+          </a:p>
+          <a:p>
+            <a:pPr marL="342900" indent="-342900">
+              <a:buAutoNum type="alphaLcParenR"/>
+            </a:pPr>
+            <a:r>
+              <a:rPr lang="en-IN" sz="1600" dirty="0">
+                <a:latin typeface="Oxygen" panose="02000503000000000000" pitchFamily="2" charset="0"/>
+                <a:sym typeface="Wingdings" panose="05000000000000000000" pitchFamily="2" charset="2"/>
+              </a:rPr>
+              <a:t>Varchar</a:t>
+            </a:r>
+          </a:p>
+          <a:p>
+            <a:pPr marL="342900" indent="-342900">
+              <a:buAutoNum type="alphaLcParenR"/>
+            </a:pPr>
+            <a:r>
+              <a:rPr lang="en-IN" sz="1600" dirty="0">
+                <a:latin typeface="Oxygen" panose="02000503000000000000" pitchFamily="2" charset="0"/>
+                <a:sym typeface="Wingdings" panose="05000000000000000000" pitchFamily="2" charset="2"/>
+              </a:rPr>
+              <a:t>Text</a:t>
+            </a:r>
+          </a:p>
+          <a:p>
+            <a:endParaRPr lang="en-IN" sz="1600" dirty="0">
+              <a:latin typeface="Oxygen" panose="02000503000000000000" pitchFamily="2" charset="0"/>
+              <a:sym typeface="Wingdings" panose="05000000000000000000" pitchFamily="2" charset="2"/>
+            </a:endParaRPr>
+          </a:p>
+          <a:p>
+            <a:r>
+              <a:rPr lang="en-IN" sz="1600" b="1" dirty="0">
+                <a:latin typeface="Oxygen" panose="02000503000000000000" pitchFamily="2" charset="0"/>
+                <a:sym typeface="Wingdings" panose="05000000000000000000" pitchFamily="2" charset="2"/>
+              </a:rPr>
+              <a:t>Numeric Data Type</a:t>
+            </a:r>
+          </a:p>
+          <a:p>
+            <a:pPr marL="342900" indent="-342900">
+              <a:buAutoNum type="alphaLcParenR"/>
+            </a:pPr>
+            <a:r>
+              <a:rPr lang="en-IN" sz="1600" dirty="0">
+                <a:latin typeface="Oxygen" panose="02000503000000000000" pitchFamily="2" charset="0"/>
+                <a:sym typeface="Wingdings" panose="05000000000000000000" pitchFamily="2" charset="2"/>
+              </a:rPr>
+              <a:t>Int</a:t>
+            </a:r>
+          </a:p>
+          <a:p>
+            <a:pPr marL="342900" indent="-342900">
+              <a:buAutoNum type="alphaLcParenR"/>
+            </a:pPr>
+            <a:r>
+              <a:rPr lang="en-IN" sz="1600" dirty="0">
+                <a:latin typeface="Oxygen" panose="02000503000000000000" pitchFamily="2" charset="0"/>
+                <a:sym typeface="Wingdings" panose="05000000000000000000" pitchFamily="2" charset="2"/>
+              </a:rPr>
+              <a:t>Float</a:t>
+            </a:r>
+          </a:p>
+          <a:p>
+            <a:pPr marL="342900" indent="-342900">
+              <a:buAutoNum type="alphaLcParenR"/>
+            </a:pPr>
+            <a:r>
+              <a:rPr lang="en-IN" sz="1600" dirty="0">
+                <a:latin typeface="Oxygen" panose="02000503000000000000" pitchFamily="2" charset="0"/>
+                <a:sym typeface="Wingdings" panose="05000000000000000000" pitchFamily="2" charset="2"/>
+              </a:rPr>
+              <a:t>Double</a:t>
+            </a:r>
+          </a:p>
+          <a:p>
+            <a:pPr marL="342900" indent="-342900">
+              <a:buAutoNum type="alphaLcParenR"/>
+            </a:pPr>
+            <a:r>
+              <a:rPr lang="en-IN" sz="1600" dirty="0">
+                <a:latin typeface="Oxygen" panose="02000503000000000000" pitchFamily="2" charset="0"/>
+                <a:sym typeface="Wingdings" panose="05000000000000000000" pitchFamily="2" charset="2"/>
+              </a:rPr>
+              <a:t>Decimal</a:t>
+            </a:r>
+          </a:p>
+          <a:p>
+            <a:pPr marL="342900" indent="-342900">
+              <a:buAutoNum type="alphaLcParenR"/>
+            </a:pPr>
+            <a:r>
+              <a:rPr lang="en-IN" sz="1600" dirty="0">
+                <a:latin typeface="Oxygen" panose="02000503000000000000" pitchFamily="2" charset="0"/>
+                <a:sym typeface="Wingdings" panose="05000000000000000000" pitchFamily="2" charset="2"/>
+              </a:rPr>
+              <a:t>Bit</a:t>
+            </a:r>
+          </a:p>
+          <a:p>
+            <a:pPr marL="342900" indent="-342900">
+              <a:buAutoNum type="alphaLcParenR"/>
+            </a:pPr>
+            <a:r>
+              <a:rPr lang="en-IN" sz="1600" dirty="0">
+                <a:latin typeface="Oxygen" panose="02000503000000000000" pitchFamily="2" charset="0"/>
+                <a:sym typeface="Wingdings" panose="05000000000000000000" pitchFamily="2" charset="2"/>
+              </a:rPr>
+              <a:t>Bool</a:t>
+            </a:r>
+          </a:p>
+          <a:p>
+            <a:pPr marL="342900" indent="-342900">
+              <a:buAutoNum type="alphaLcParenR"/>
+            </a:pPr>
+            <a:r>
+              <a:rPr lang="en-IN" sz="1600" dirty="0">
+                <a:latin typeface="Oxygen" panose="02000503000000000000" pitchFamily="2" charset="0"/>
+                <a:sym typeface="Wingdings" panose="05000000000000000000" pitchFamily="2" charset="2"/>
+              </a:rPr>
+              <a:t>Boolean</a:t>
+            </a:r>
+          </a:p>
+          <a:p>
+            <a:endParaRPr lang="en-IN" sz="1600" dirty="0">
+              <a:latin typeface="Oxygen" panose="02000503000000000000" pitchFamily="2" charset="0"/>
+              <a:sym typeface="Wingdings" panose="05000000000000000000" pitchFamily="2" charset="2"/>
+            </a:endParaRPr>
+          </a:p>
+          <a:p>
+            <a:r>
+              <a:rPr lang="en-US" sz="1600" b="1" i="0" dirty="0">
+                <a:solidFill>
+                  <a:srgbClr val="000000"/>
+                </a:solidFill>
+                <a:effectLst/>
+                <a:latin typeface="Segoe UI" panose="020B0502040204020203" pitchFamily="34" charset="0"/>
+              </a:rPr>
+              <a:t>Date and Time Data Types</a:t>
+            </a:r>
+          </a:p>
+          <a:p>
+            <a:pPr marL="342900" indent="-342900">
+              <a:buAutoNum type="alphaLcParenR"/>
+            </a:pPr>
+            <a:r>
+              <a:rPr lang="en-IN" sz="1600" dirty="0">
+                <a:latin typeface="Oxygen" panose="02000503000000000000" pitchFamily="2" charset="0"/>
+                <a:sym typeface="Wingdings" panose="05000000000000000000" pitchFamily="2" charset="2"/>
+              </a:rPr>
+              <a:t>Date</a:t>
+            </a:r>
+          </a:p>
+          <a:p>
+            <a:pPr marL="342900" indent="-342900">
+              <a:buAutoNum type="alphaLcParenR"/>
+            </a:pPr>
+            <a:r>
+              <a:rPr lang="en-IN" sz="1600" dirty="0">
+                <a:latin typeface="Oxygen" panose="02000503000000000000" pitchFamily="2" charset="0"/>
+                <a:sym typeface="Wingdings" panose="05000000000000000000" pitchFamily="2" charset="2"/>
+              </a:rPr>
+              <a:t>Time</a:t>
+            </a:r>
+          </a:p>
+          <a:p>
+            <a:pPr marL="342900" indent="-342900">
+              <a:buAutoNum type="alphaLcParenR"/>
+            </a:pPr>
+            <a:r>
+              <a:rPr lang="en-IN" sz="1600" dirty="0">
+                <a:latin typeface="Oxygen" panose="02000503000000000000" pitchFamily="2" charset="0"/>
+                <a:sym typeface="Wingdings" panose="05000000000000000000" pitchFamily="2" charset="2"/>
+              </a:rPr>
+              <a:t>Datetime</a:t>
+            </a:r>
+          </a:p>
+          <a:p>
+            <a:pPr marL="342900" indent="-342900">
+              <a:buAutoNum type="alphaLcParenR"/>
+            </a:pPr>
+            <a:r>
+              <a:rPr lang="en-IN" sz="1600" dirty="0">
+                <a:latin typeface="Oxygen" panose="02000503000000000000" pitchFamily="2" charset="0"/>
+                <a:sym typeface="Wingdings" panose="05000000000000000000" pitchFamily="2" charset="2"/>
+              </a:rPr>
+              <a:t>TimeStamp</a:t>
+            </a:r>
+          </a:p>
+          <a:p>
+            <a:pPr marL="342900" indent="-342900">
+              <a:buAutoNum type="alphaLcParenR"/>
+            </a:pPr>
+            <a:r>
+              <a:rPr lang="en-IN" sz="1600" dirty="0">
+                <a:latin typeface="Oxygen" panose="02000503000000000000" pitchFamily="2" charset="0"/>
+                <a:sym typeface="Wingdings" panose="05000000000000000000" pitchFamily="2" charset="2"/>
+              </a:rPr>
+              <a:t>Year</a:t>
+            </a:r>
+          </a:p>
+        </p:txBody>
+      </p:sp>
+      <p:sp>
+        <p:nvSpPr>
+          <p:cNvPr id="5" name="TextBox 4">
+            <a:extLst>
+              <a:ext uri="{FF2B5EF4-FFF2-40B4-BE49-F238E27FC236}">
+                <a16:creationId xmlns:a16="http://schemas.microsoft.com/office/drawing/2014/main" id="{F50CEADD-6566-BEF5-E9C4-96502BA45522}"/>
+              </a:ext>
+            </a:extLst>
+          </p:cNvPr>
+          <p:cNvSpPr txBox="1"/>
+          <p:nvPr/>
+        </p:nvSpPr>
+        <p:spPr>
+          <a:xfrm>
+            <a:off x="4245428" y="377279"/>
+            <a:ext cx="2699657" cy="457368"/>
+          </a:xfrm>
+          <a:prstGeom prst="rect">
+            <a:avLst/>
+          </a:prstGeom>
+          <a:noFill/>
+        </p:spPr>
+        <p:txBody>
+          <a:bodyPr wrap="square" rtlCol="0">
+            <a:spAutoFit/>
+          </a:bodyPr>
+          <a:lstStyle/>
+          <a:p>
+            <a:pPr algn="ctr"/>
+            <a:r>
+              <a:rPr lang="en-US" sz="2401" b="1" cap="small" dirty="0">
+                <a:latin typeface="Oxygen" panose="02000503000000000000" pitchFamily="2" charset="0"/>
+              </a:rPr>
+              <a:t>Data Type</a:t>
+            </a:r>
+          </a:p>
+        </p:txBody>
+      </p:sp>
+    </p:spTree>
+    <p:extLst>
+      <p:ext uri="{BB962C8B-B14F-4D97-AF65-F5344CB8AC3E}">
+        <p14:creationId xmlns:p14="http://schemas.microsoft.com/office/powerpoint/2010/main" val="1584387444"/>
+      </p:ext>
+    </p:extLst>
+  </p:cSld>
+  <p:clrMapOvr>
+    <a:masterClrMapping/>
+  </p:clrMapOvr>
+</p:sld>
+</file>
+
+<file path=ppt/slides/slide6.xml><?xml version="1.0" encoding="utf-8"?>
+<p:sld xmlns:a="http://schemas.openxmlformats.org/drawingml/2006/main" xmlns:r="http://schemas.openxmlformats.org/officeDocument/2006/relationships" xmlns:p="http://schemas.openxmlformats.org/presentationml/2006/main">
+  <p:cSld>
+    <p:spTree>
+      <p:nvGrpSpPr>
+        <p:cNvPr id="1" name="">
+          <a:extLst>
+            <a:ext uri="{FF2B5EF4-FFF2-40B4-BE49-F238E27FC236}">
+              <a16:creationId xmlns:a16="http://schemas.microsoft.com/office/drawing/2014/main" id="{B93EC1F9-2C99-245F-8B9D-B0A2B3E15C84}"/>
+            </a:ext>
+          </a:extLst>
+        </p:cNvPr>
+        <p:cNvGrpSpPr/>
+        <p:nvPr/>
+      </p:nvGrpSpPr>
+      <p:grpSpPr>
+        <a:xfrm>
+          <a:off x="0" y="0"/>
+          <a:ext cx="0" cy="0"/>
+          <a:chOff x="0" y="0"/>
+          <a:chExt cx="0" cy="0"/>
+        </a:xfrm>
+      </p:grpSpPr>
+      <p:pic>
+        <p:nvPicPr>
+          <p:cNvPr id="15" name="Picture 14">
+            <a:extLst>
+              <a:ext uri="{FF2B5EF4-FFF2-40B4-BE49-F238E27FC236}">
+                <a16:creationId xmlns:a16="http://schemas.microsoft.com/office/drawing/2014/main" id="{AA0C7BA4-7ABC-0E5F-C25B-F44E09096801}"/>
+              </a:ext>
+            </a:extLst>
+          </p:cNvPr>
+          <p:cNvPicPr>
+            <a:picLocks noChangeAspect="1"/>
+          </p:cNvPicPr>
+          <p:nvPr/>
+        </p:nvPicPr>
+        <p:blipFill>
+          <a:blip r:embed="rId2">
+            <a:extLst>
+              <a:ext uri="{28A0092B-C50C-407E-A947-70E740481C1C}">
+                <a14:useLocalDpi xmlns:a14="http://schemas.microsoft.com/office/drawing/2010/main" val="0"/>
+              </a:ext>
+            </a:extLst>
+          </a:blip>
+          <a:stretch>
+            <a:fillRect/>
+          </a:stretch>
+        </p:blipFill>
+        <p:spPr>
+          <a:xfrm>
+            <a:off x="315245" y="108772"/>
+            <a:ext cx="725875" cy="725875"/>
+          </a:xfrm>
+          <a:prstGeom prst="rect">
+            <a:avLst/>
+          </a:prstGeom>
+        </p:spPr>
+      </p:pic>
+      <p:sp>
+        <p:nvSpPr>
+          <p:cNvPr id="5" name="TextBox 4">
+            <a:extLst>
+              <a:ext uri="{FF2B5EF4-FFF2-40B4-BE49-F238E27FC236}">
+                <a16:creationId xmlns:a16="http://schemas.microsoft.com/office/drawing/2014/main" id="{EF9253C6-C4DC-4670-20BC-AE08D9DE3400}"/>
+              </a:ext>
+            </a:extLst>
+          </p:cNvPr>
+          <p:cNvSpPr txBox="1"/>
+          <p:nvPr/>
+        </p:nvSpPr>
+        <p:spPr>
+          <a:xfrm>
+            <a:off x="4245428" y="377279"/>
+            <a:ext cx="2699657" cy="457368"/>
+          </a:xfrm>
+          <a:prstGeom prst="rect">
+            <a:avLst/>
+          </a:prstGeom>
+          <a:noFill/>
+        </p:spPr>
+        <p:txBody>
+          <a:bodyPr wrap="square" rtlCol="0">
+            <a:spAutoFit/>
+          </a:bodyPr>
+          <a:lstStyle/>
+          <a:p>
+            <a:pPr algn="ctr"/>
+            <a:r>
+              <a:rPr lang="en-US" sz="2401" b="1" cap="small" dirty="0">
+                <a:latin typeface="Oxygen" panose="02000503000000000000" pitchFamily="2" charset="0"/>
+              </a:rPr>
+              <a:t>Constraints</a:t>
+            </a:r>
+          </a:p>
+        </p:txBody>
+      </p:sp>
+      <p:graphicFrame>
+        <p:nvGraphicFramePr>
+          <p:cNvPr id="4" name="Table 3">
+            <a:extLst>
+              <a:ext uri="{FF2B5EF4-FFF2-40B4-BE49-F238E27FC236}">
+                <a16:creationId xmlns:a16="http://schemas.microsoft.com/office/drawing/2014/main" id="{BA458D93-B990-8D69-D684-23CD07DF2761}"/>
+              </a:ext>
+            </a:extLst>
+          </p:cNvPr>
+          <p:cNvGraphicFramePr>
+            <a:graphicFrameLocks noGrp="1"/>
+          </p:cNvGraphicFramePr>
+          <p:nvPr>
+            <p:extLst>
+              <p:ext uri="{D42A27DB-BD31-4B8C-83A1-F6EECF244321}">
+                <p14:modId xmlns:p14="http://schemas.microsoft.com/office/powerpoint/2010/main" val="1632450290"/>
+              </p:ext>
+            </p:extLst>
+          </p:nvPr>
+        </p:nvGraphicFramePr>
+        <p:xfrm>
+          <a:off x="1531256" y="1014443"/>
+          <a:ext cx="8081825" cy="1854200"/>
+        </p:xfrm>
+        <a:graphic>
+          <a:graphicData uri="http://schemas.openxmlformats.org/drawingml/2006/table">
+            <a:tbl>
+              <a:tblPr firstRow="1" bandRow="1">
+                <a:tableStyleId>{5C22544A-7EE6-4342-B048-85BDC9FD1C3A}</a:tableStyleId>
+              </a:tblPr>
+              <a:tblGrid>
+                <a:gridCol w="643255">
+                  <a:extLst>
+                    <a:ext uri="{9D8B030D-6E8A-4147-A177-3AD203B41FA5}">
+                      <a16:colId xmlns:a16="http://schemas.microsoft.com/office/drawing/2014/main" val="2849890663"/>
+                    </a:ext>
+                  </a:extLst>
+                </a:gridCol>
+                <a:gridCol w="1632858">
+                  <a:extLst>
+                    <a:ext uri="{9D8B030D-6E8A-4147-A177-3AD203B41FA5}">
+                      <a16:colId xmlns:a16="http://schemas.microsoft.com/office/drawing/2014/main" val="3026583182"/>
+                    </a:ext>
+                  </a:extLst>
+                </a:gridCol>
+                <a:gridCol w="5805712">
+                  <a:extLst>
+                    <a:ext uri="{9D8B030D-6E8A-4147-A177-3AD203B41FA5}">
+                      <a16:colId xmlns:a16="http://schemas.microsoft.com/office/drawing/2014/main" val="623962936"/>
+                    </a:ext>
+                  </a:extLst>
+                </a:gridCol>
+              </a:tblGrid>
+              <a:tr h="370840">
+                <a:tc>
+                  <a:txBody>
+                    <a:bodyPr/>
+                    <a:lstStyle/>
+                    <a:p>
+                      <a:r>
+                        <a:rPr lang="en-US" dirty="0" err="1"/>
+                        <a:t>Slno</a:t>
+                      </a:r>
+                      <a:endParaRPr lang="en-IN" dirty="0"/>
+                    </a:p>
+                  </a:txBody>
+                  <a:tcPr/>
+                </a:tc>
+                <a:tc>
+                  <a:txBody>
+                    <a:bodyPr/>
+                    <a:lstStyle/>
+                    <a:p>
+                      <a:r>
+                        <a:rPr lang="en-US" dirty="0"/>
+                        <a:t>Constraints</a:t>
+                      </a:r>
+                      <a:endParaRPr lang="en-IN" dirty="0"/>
+                    </a:p>
+                  </a:txBody>
+                  <a:tcPr/>
+                </a:tc>
+                <a:tc>
+                  <a:txBody>
+                    <a:bodyPr/>
+                    <a:lstStyle/>
+                    <a:p>
+                      <a:r>
+                        <a:rPr lang="en-US" dirty="0"/>
+                        <a:t>Meaning</a:t>
+                      </a:r>
+                      <a:endParaRPr lang="en-IN" dirty="0"/>
+                    </a:p>
+                  </a:txBody>
+                  <a:tcPr/>
+                </a:tc>
+                <a:extLst>
+                  <a:ext uri="{0D108BD9-81ED-4DB2-BD59-A6C34878D82A}">
+                    <a16:rowId xmlns:a16="http://schemas.microsoft.com/office/drawing/2014/main" val="1216375311"/>
+                  </a:ext>
+                </a:extLst>
+              </a:tr>
+              <a:tr h="370840">
+                <a:tc>
+                  <a:txBody>
+                    <a:bodyPr/>
+                    <a:lstStyle/>
+                    <a:p>
+                      <a:r>
+                        <a:rPr lang="en-US" dirty="0"/>
+                        <a:t>1</a:t>
+                      </a:r>
+                      <a:endParaRPr lang="en-IN" dirty="0"/>
+                    </a:p>
+                  </a:txBody>
+                  <a:tcPr/>
+                </a:tc>
+                <a:tc>
+                  <a:txBody>
+                    <a:bodyPr/>
+                    <a:lstStyle/>
+                    <a:p>
+                      <a:r>
+                        <a:rPr lang="en-US" dirty="0"/>
+                        <a:t>Not Null</a:t>
+                      </a:r>
+                      <a:endParaRPr lang="en-IN" dirty="0"/>
+                    </a:p>
+                  </a:txBody>
+                  <a:tcPr/>
+                </a:tc>
+                <a:tc>
+                  <a:txBody>
+                    <a:bodyPr/>
+                    <a:lstStyle/>
+                    <a:p>
+                      <a:r>
+                        <a:rPr lang="en-US" dirty="0"/>
+                        <a:t>Ensures a column cannot have null value</a:t>
+                      </a:r>
+                      <a:endParaRPr lang="en-IN" dirty="0"/>
+                    </a:p>
+                  </a:txBody>
+                  <a:tcPr/>
+                </a:tc>
+                <a:extLst>
+                  <a:ext uri="{0D108BD9-81ED-4DB2-BD59-A6C34878D82A}">
+                    <a16:rowId xmlns:a16="http://schemas.microsoft.com/office/drawing/2014/main" val="3660877910"/>
+                  </a:ext>
+                </a:extLst>
+              </a:tr>
+              <a:tr h="370840">
+                <a:tc>
+                  <a:txBody>
+                    <a:bodyPr/>
+                    <a:lstStyle/>
+                    <a:p>
+                      <a:r>
+                        <a:rPr lang="en-US" dirty="0"/>
+                        <a:t>2</a:t>
+                      </a:r>
+                      <a:endParaRPr lang="en-IN" dirty="0"/>
+                    </a:p>
+                  </a:txBody>
+                  <a:tcPr/>
+                </a:tc>
+                <a:tc>
+                  <a:txBody>
+                    <a:bodyPr/>
+                    <a:lstStyle/>
+                    <a:p>
+                      <a:r>
+                        <a:rPr lang="en-US" dirty="0"/>
+                        <a:t>Unique</a:t>
+                      </a:r>
+                      <a:endParaRPr lang="en-IN" dirty="0"/>
+                    </a:p>
+                  </a:txBody>
+                  <a:tcPr/>
+                </a:tc>
+                <a:tc>
+                  <a:txBody>
+                    <a:bodyPr/>
+                    <a:lstStyle/>
+                    <a:p>
+                      <a:r>
+                        <a:rPr lang="en-US" dirty="0"/>
+                        <a:t>Ensures each and every column contains unique value</a:t>
+                      </a:r>
+                      <a:endParaRPr lang="en-IN" dirty="0"/>
+                    </a:p>
+                  </a:txBody>
+                  <a:tcPr/>
+                </a:tc>
+                <a:extLst>
+                  <a:ext uri="{0D108BD9-81ED-4DB2-BD59-A6C34878D82A}">
+                    <a16:rowId xmlns:a16="http://schemas.microsoft.com/office/drawing/2014/main" val="2852096107"/>
+                  </a:ext>
+                </a:extLst>
+              </a:tr>
+              <a:tr h="370840">
+                <a:tc>
+                  <a:txBody>
+                    <a:bodyPr/>
+                    <a:lstStyle/>
+                    <a:p>
+                      <a:r>
+                        <a:rPr lang="en-US" dirty="0"/>
+                        <a:t>3</a:t>
+                      </a:r>
+                      <a:endParaRPr lang="en-IN" dirty="0"/>
+                    </a:p>
+                  </a:txBody>
+                  <a:tcPr/>
+                </a:tc>
+                <a:tc>
+                  <a:txBody>
+                    <a:bodyPr/>
+                    <a:lstStyle/>
+                    <a:p>
+                      <a:r>
+                        <a:rPr lang="en-US" dirty="0"/>
+                        <a:t>Primary Key</a:t>
+                      </a:r>
+                      <a:endParaRPr lang="en-IN" dirty="0"/>
+                    </a:p>
+                  </a:txBody>
+                  <a:tcPr/>
+                </a:tc>
+                <a:tc>
+                  <a:txBody>
+                    <a:bodyPr/>
+                    <a:lstStyle/>
+                    <a:p>
+                      <a:r>
+                        <a:rPr lang="en-US" dirty="0"/>
+                        <a:t>Uniquely identifies a row in a table</a:t>
+                      </a:r>
+                      <a:endParaRPr lang="en-IN" dirty="0"/>
+                    </a:p>
+                  </a:txBody>
+                  <a:tcPr/>
+                </a:tc>
+                <a:extLst>
+                  <a:ext uri="{0D108BD9-81ED-4DB2-BD59-A6C34878D82A}">
+                    <a16:rowId xmlns:a16="http://schemas.microsoft.com/office/drawing/2014/main" val="2778785378"/>
+                  </a:ext>
+                </a:extLst>
+              </a:tr>
+              <a:tr h="370840">
+                <a:tc>
+                  <a:txBody>
+                    <a:bodyPr/>
+                    <a:lstStyle/>
+                    <a:p>
+                      <a:r>
+                        <a:rPr lang="en-US" dirty="0"/>
+                        <a:t>4</a:t>
+                      </a:r>
+                      <a:endParaRPr lang="en-IN" dirty="0"/>
+                    </a:p>
+                  </a:txBody>
+                  <a:tcPr/>
+                </a:tc>
+                <a:tc>
+                  <a:txBody>
+                    <a:bodyPr/>
+                    <a:lstStyle/>
+                    <a:p>
+                      <a:r>
+                        <a:rPr lang="en-US" dirty="0"/>
+                        <a:t>Foreign Key</a:t>
+                      </a:r>
+                      <a:endParaRPr lang="en-IN" dirty="0"/>
+                    </a:p>
+                  </a:txBody>
+                  <a:tcPr/>
+                </a:tc>
+                <a:tc>
+                  <a:txBody>
+                    <a:bodyPr/>
+                    <a:lstStyle/>
+                    <a:p>
+                      <a:r>
+                        <a:rPr lang="en-US" dirty="0"/>
+                        <a:t>Establishes relation between two tables through a column</a:t>
+                      </a:r>
+                      <a:endParaRPr lang="en-IN" dirty="0"/>
+                    </a:p>
+                  </a:txBody>
+                  <a:tcPr/>
+                </a:tc>
+                <a:extLst>
+                  <a:ext uri="{0D108BD9-81ED-4DB2-BD59-A6C34878D82A}">
+                    <a16:rowId xmlns:a16="http://schemas.microsoft.com/office/drawing/2014/main" val="3337727037"/>
+                  </a:ext>
+                </a:extLst>
+              </a:tr>
+            </a:tbl>
+          </a:graphicData>
+        </a:graphic>
+      </p:graphicFrame>
+    </p:spTree>
+    <p:extLst>
+      <p:ext uri="{BB962C8B-B14F-4D97-AF65-F5344CB8AC3E}">
+        <p14:creationId xmlns:p14="http://schemas.microsoft.com/office/powerpoint/2010/main" val="4131376772"/>
       </p:ext>
     </p:extLst>
   </p:cSld>

</xml_diff>

<commit_message>
Updated MySQL ppt is in progress
Updated MySQL ppt is in progress
</commit_message>
<xml_diff>
--- a/Offline/BusinessManagement/Teach_Tech@anodiam/IT/CourseMaterials/MySQL/MySQL.pptx
+++ b/Offline/BusinessManagement/Teach_Tech@anodiam/IT/CourseMaterials/MySQL/MySQL.pptx
@@ -5,7 +5,7 @@
     <p:sldMasterId id="2147483696" r:id="rId1"/>
   </p:sldMasterIdLst>
   <p:notesMasterIdLst>
-    <p:notesMasterId r:id="rId12"/>
+    <p:notesMasterId r:id="rId14"/>
   </p:notesMasterIdLst>
   <p:sldIdLst>
     <p:sldId id="259" r:id="rId2"/>
@@ -16,8 +16,10 @@
     <p:sldId id="265" r:id="rId7"/>
     <p:sldId id="266" r:id="rId8"/>
     <p:sldId id="267" r:id="rId9"/>
-    <p:sldId id="268" r:id="rId10"/>
-    <p:sldId id="269" r:id="rId11"/>
+    <p:sldId id="269" r:id="rId10"/>
+    <p:sldId id="268" r:id="rId11"/>
+    <p:sldId id="270" r:id="rId12"/>
+    <p:sldId id="271" r:id="rId13"/>
   </p:sldIdLst>
   <p:sldSz cx="12192000" cy="8010525"/>
   <p:notesSz cx="6858000" cy="9144000"/>
@@ -3619,7 +3621,7 @@
         <p:cNvPr id="1" name="">
           <a:extLst>
             <a:ext uri="{FF2B5EF4-FFF2-40B4-BE49-F238E27FC236}">
-              <a16:creationId xmlns:a16="http://schemas.microsoft.com/office/drawing/2014/main" id="{3EA6FA98-1D7C-FA09-C210-8DAF497AFE52}"/>
+              <a16:creationId xmlns:a16="http://schemas.microsoft.com/office/drawing/2014/main" id="{6BEDA106-3D21-31E3-4BF7-25E332300305}"/>
             </a:ext>
           </a:extLst>
         </p:cNvPr>
@@ -3639,7 +3641,7 @@
           <p:cNvPr id="15" name="Picture 14">
             <a:extLst>
               <a:ext uri="{FF2B5EF4-FFF2-40B4-BE49-F238E27FC236}">
-                <a16:creationId xmlns:a16="http://schemas.microsoft.com/office/drawing/2014/main" id="{5C4F78F3-A0E6-2A69-BEA0-90FE79B8AD0B}"/>
+                <a16:creationId xmlns:a16="http://schemas.microsoft.com/office/drawing/2014/main" id="{5AF0C8E7-FC2A-7F5F-5C79-B3C65F4A2D38}"/>
               </a:ext>
             </a:extLst>
           </p:cNvPr>
@@ -3662,7 +3664,7 @@
         </p:blipFill>
         <p:spPr>
           <a:xfrm>
-            <a:off x="330371" y="275619"/>
+            <a:off x="280522" y="275619"/>
             <a:ext cx="725875" cy="725875"/>
           </a:xfrm>
           <a:prstGeom prst="rect">
@@ -3675,7 +3677,7 @@
           <p:cNvPr id="2" name="TextBox 1">
             <a:extLst>
               <a:ext uri="{FF2B5EF4-FFF2-40B4-BE49-F238E27FC236}">
-                <a16:creationId xmlns:a16="http://schemas.microsoft.com/office/drawing/2014/main" id="{2EE67381-FDCA-C718-C129-F09B79DE7712}"/>
+                <a16:creationId xmlns:a16="http://schemas.microsoft.com/office/drawing/2014/main" id="{C0F9FB86-CFAA-FB66-A69E-3B41C3979D86}"/>
               </a:ext>
             </a:extLst>
           </p:cNvPr>
@@ -3684,8 +3686,8 @@
         </p:nvSpPr>
         <p:spPr>
           <a:xfrm>
-            <a:off x="1122745" y="1647670"/>
-            <a:ext cx="10504577" cy="5324535"/>
+            <a:off x="1122745" y="1001494"/>
+            <a:ext cx="10504577" cy="7478970"/>
           </a:xfrm>
           <a:prstGeom prst="rect">
             <a:avLst/>
@@ -3699,173 +3701,291 @@
           <a:lstStyle/>
           <a:p>
             <a:r>
-              <a:rPr lang="en-US" sz="2000" dirty="0">
-                <a:latin typeface="Oxygen" panose="02000503000000000000" pitchFamily="2" charset="0"/>
-                <a:sym typeface="Wingdings" panose="05000000000000000000" pitchFamily="2" charset="2"/>
-              </a:rPr>
-              <a:t>Indexes are used to retrieve data from databases.</a:t>
-            </a:r>
-          </a:p>
-          <a:p>
-            <a:r>
-              <a:rPr lang="en-US" sz="2000" dirty="0">
-                <a:latin typeface="Oxygen" panose="02000503000000000000" pitchFamily="2" charset="0"/>
-                <a:sym typeface="Wingdings" panose="05000000000000000000" pitchFamily="2" charset="2"/>
-              </a:rPr>
-              <a:t>Users cannot see the indexes, they are used to speed up the searches/queries.</a:t>
-            </a:r>
-          </a:p>
-          <a:p>
-            <a:endParaRPr lang="en-US" sz="2000" dirty="0">
+              <a:rPr lang="en-US" sz="1600" dirty="0">
+                <a:latin typeface="Oxygen" panose="02000503000000000000" pitchFamily="2" charset="0"/>
+                <a:sym typeface="Wingdings" panose="05000000000000000000" pitchFamily="2" charset="2"/>
+              </a:rPr>
+              <a:t>In MySQL, a view is a virtual table which is created by SQL query by joining one or more tables.</a:t>
+            </a:r>
+          </a:p>
+          <a:p>
+            <a:r>
+              <a:rPr lang="en-US" sz="1600" dirty="0">
+                <a:latin typeface="Oxygen" panose="02000503000000000000" pitchFamily="2" charset="0"/>
+                <a:sym typeface="Wingdings" panose="05000000000000000000" pitchFamily="2" charset="2"/>
+              </a:rPr>
+              <a:t>It is operated like a table but does not contain any data of its own.</a:t>
+            </a:r>
+          </a:p>
+          <a:p>
+            <a:r>
+              <a:rPr lang="en-US" sz="1600" dirty="0">
+                <a:solidFill>
+                  <a:srgbClr val="333333"/>
+                </a:solidFill>
+                <a:latin typeface="Oxygen" panose="02000503000000000000" pitchFamily="2" charset="0"/>
+              </a:rPr>
+              <a:t>Views are definitions built on top of other tables (or views). </a:t>
+            </a:r>
+            <a:endParaRPr lang="en-US" sz="1600" dirty="0">
               <a:latin typeface="Oxygen" panose="02000503000000000000" pitchFamily="2" charset="0"/>
               <a:sym typeface="Wingdings" panose="05000000000000000000" pitchFamily="2" charset="2"/>
             </a:endParaRPr>
           </a:p>
           <a:p>
-            <a:endParaRPr lang="en-US" sz="2000" dirty="0">
+            <a:r>
+              <a:rPr lang="en-US" sz="1600" dirty="0">
+                <a:latin typeface="Oxygen" panose="02000503000000000000" pitchFamily="2" charset="0"/>
+                <a:sym typeface="Wingdings" panose="05000000000000000000" pitchFamily="2" charset="2"/>
+              </a:rPr>
+              <a:t>If the underlying table or tables data changes, the view gets reflected.</a:t>
+            </a:r>
+          </a:p>
+          <a:p>
+            <a:endParaRPr lang="en-US" sz="1600" dirty="0">
               <a:latin typeface="Oxygen" panose="02000503000000000000" pitchFamily="2" charset="0"/>
               <a:sym typeface="Wingdings" panose="05000000000000000000" pitchFamily="2" charset="2"/>
             </a:endParaRPr>
           </a:p>
           <a:p>
             <a:r>
-              <a:rPr lang="en-US" sz="2000" dirty="0">
-                <a:latin typeface="Oxygen" panose="02000503000000000000" pitchFamily="2" charset="0"/>
-                <a:sym typeface="Wingdings" panose="05000000000000000000" pitchFamily="2" charset="2"/>
-              </a:rPr>
-              <a:t>Below statement creates an index </a:t>
-            </a:r>
-            <a:r>
-              <a:rPr lang="en-US" sz="2000" b="0" i="0" dirty="0">
+              <a:rPr lang="en-US" sz="1600" b="1" dirty="0">
+                <a:latin typeface="Oxygen" panose="02000503000000000000" pitchFamily="2" charset="0"/>
+                <a:sym typeface="Wingdings" panose="05000000000000000000" pitchFamily="2" charset="2"/>
+              </a:rPr>
+              <a:t>Create View</a:t>
+            </a:r>
+          </a:p>
+          <a:p>
+            <a:pPr algn="just"/>
+            <a:r>
+              <a:rPr lang="en-US" sz="1600" dirty="0">
+                <a:latin typeface="Oxygen" panose="02000503000000000000" pitchFamily="2" charset="0"/>
+              </a:rPr>
+              <a:t>CREATE VIEW product_details AS    </a:t>
+            </a:r>
+          </a:p>
+          <a:p>
+            <a:pPr algn="just"/>
+            <a:r>
+              <a:rPr lang="en-US" sz="1600" dirty="0">
+                <a:latin typeface="Oxygen" panose="02000503000000000000" pitchFamily="2" charset="0"/>
+              </a:rPr>
+              <a:t>SELECT product_name,product_price,product_weight</a:t>
+            </a:r>
+          </a:p>
+          <a:p>
+            <a:pPr algn="just"/>
+            <a:r>
+              <a:rPr lang="en-US" sz="1600" dirty="0">
+                <a:latin typeface="Oxygen" panose="02000503000000000000" pitchFamily="2" charset="0"/>
+              </a:rPr>
+              <a:t>FROM mst_product;    </a:t>
+            </a:r>
+          </a:p>
+          <a:p>
+            <a:endParaRPr lang="en-US" sz="1600" dirty="0">
+              <a:latin typeface="Oxygen" panose="02000503000000000000" pitchFamily="2" charset="0"/>
+              <a:sym typeface="Wingdings" panose="05000000000000000000" pitchFamily="2" charset="2"/>
+            </a:endParaRPr>
+          </a:p>
+          <a:p>
+            <a:r>
+              <a:rPr lang="en-US" sz="1600" b="1" dirty="0">
+                <a:latin typeface="Oxygen" panose="02000503000000000000" pitchFamily="2" charset="0"/>
+                <a:sym typeface="Wingdings" panose="05000000000000000000" pitchFamily="2" charset="2"/>
+              </a:rPr>
+              <a:t>Update View</a:t>
+            </a:r>
+          </a:p>
+          <a:p>
+            <a:pPr algn="just"/>
+            <a:r>
+              <a:rPr lang="en-US" sz="1600" dirty="0">
+                <a:latin typeface="Oxygen" panose="02000503000000000000" pitchFamily="2" charset="0"/>
+              </a:rPr>
+              <a:t>ALTER</a:t>
+            </a:r>
+            <a:r>
+              <a:rPr lang="en-US" sz="1600" dirty="0">
                 <a:solidFill>
                   <a:srgbClr val="000000"/>
                 </a:solidFill>
-                <a:effectLst/>
-                <a:latin typeface="Oxygen" panose="02000503000000000000" pitchFamily="2" charset="0"/>
-              </a:rPr>
-              <a:t>on a table. Duplicate values are allowed.</a:t>
-            </a:r>
-          </a:p>
-          <a:p>
-            <a:r>
-              <a:rPr lang="en-US" sz="2000" b="0" i="0" dirty="0">
-                <a:effectLst/>
-                <a:latin typeface="Oxygen" panose="02000503000000000000" pitchFamily="2" charset="0"/>
-              </a:rPr>
-              <a:t>CREATE INDEX idx_product</a:t>
-            </a:r>
-            <a:br>
-              <a:rPr lang="en-US" sz="2000" dirty="0">
-                <a:latin typeface="Oxygen" panose="02000503000000000000" pitchFamily="2" charset="0"/>
-              </a:rPr>
-            </a:br>
-            <a:r>
-              <a:rPr lang="en-US" sz="2000" b="0" i="0" dirty="0">
-                <a:effectLst/>
-                <a:latin typeface="Oxygen" panose="02000503000000000000" pitchFamily="2" charset="0"/>
-              </a:rPr>
-              <a:t>ON mst_product (product_name);</a:t>
-            </a:r>
-          </a:p>
-          <a:p>
-            <a:endParaRPr lang="en-US" sz="2000" b="0" i="0" dirty="0">
-              <a:effectLst/>
-              <a:latin typeface="Oxygen" panose="02000503000000000000" pitchFamily="2" charset="0"/>
+                <a:latin typeface="inter-regular"/>
+              </a:rPr>
+              <a:t> </a:t>
+            </a:r>
+            <a:r>
+              <a:rPr lang="en-US" sz="1600" dirty="0">
+                <a:latin typeface="Oxygen" panose="02000503000000000000" pitchFamily="2" charset="0"/>
+              </a:rPr>
+              <a:t>VIEW product_details AS    </a:t>
+            </a:r>
+          </a:p>
+          <a:p>
+            <a:pPr algn="just"/>
+            <a:r>
+              <a:rPr lang="en-US" sz="1600" dirty="0">
+                <a:latin typeface="Oxygen" panose="02000503000000000000" pitchFamily="2" charset="0"/>
+              </a:rPr>
+              <a:t>SELECT product_name,product_price,product_weight</a:t>
+            </a:r>
+          </a:p>
+          <a:p>
+            <a:pPr algn="just"/>
+            <a:r>
+              <a:rPr lang="en-US" sz="1600" dirty="0">
+                <a:latin typeface="Oxygen" panose="02000503000000000000" pitchFamily="2" charset="0"/>
+              </a:rPr>
+              <a:t>FROM mst_product</a:t>
+            </a:r>
+          </a:p>
+          <a:p>
+            <a:pPr algn="just"/>
+            <a:r>
+              <a:rPr lang="en-US" sz="1600" dirty="0">
+                <a:solidFill>
+                  <a:srgbClr val="000000"/>
+                </a:solidFill>
+                <a:latin typeface="Oxygen" panose="02000503000000000000" pitchFamily="2" charset="0"/>
+              </a:rPr>
+              <a:t>WHERE product_price &gt; 100</a:t>
+            </a:r>
+            <a:endParaRPr lang="en-US" sz="1600" dirty="0">
+              <a:solidFill>
+                <a:srgbClr val="000000"/>
+              </a:solidFill>
+              <a:latin typeface="inter-regular"/>
             </a:endParaRPr>
           </a:p>
           <a:p>
-            <a:endParaRPr lang="en-US" sz="2000" dirty="0">
+            <a:pPr algn="just"/>
+            <a:r>
+              <a:rPr lang="en-US" sz="1600" dirty="0">
+                <a:solidFill>
+                  <a:srgbClr val="000000"/>
+                </a:solidFill>
+                <a:latin typeface="inter-regular"/>
+              </a:rPr>
+              <a:t> </a:t>
+            </a:r>
+          </a:p>
+          <a:p>
+            <a:pPr algn="just"/>
+            <a:r>
+              <a:rPr lang="en-US" sz="1600" b="1" dirty="0">
+                <a:solidFill>
+                  <a:srgbClr val="000000"/>
+                </a:solidFill>
+                <a:latin typeface="Oxygen" panose="02000503000000000000" pitchFamily="2" charset="0"/>
+              </a:rPr>
+              <a:t>Drop View</a:t>
+            </a:r>
+          </a:p>
+          <a:p>
+            <a:pPr algn="just"/>
+            <a:r>
+              <a:rPr lang="en-US" sz="1600" dirty="0">
+                <a:latin typeface="Oxygen" panose="02000503000000000000" pitchFamily="2" charset="0"/>
+              </a:rPr>
+              <a:t>DROP VIEW product_details ;    </a:t>
+            </a:r>
+          </a:p>
+          <a:p>
+            <a:pPr algn="just"/>
+            <a:endParaRPr lang="en-US" sz="1600" dirty="0">
+              <a:solidFill>
+                <a:srgbClr val="000000"/>
+              </a:solidFill>
+              <a:latin typeface="inter-regular"/>
+            </a:endParaRPr>
+          </a:p>
+          <a:p>
+            <a:r>
+              <a:rPr lang="en-US" sz="1600" b="1" dirty="0">
+                <a:latin typeface="Oxygen" panose="02000503000000000000" pitchFamily="2" charset="0"/>
+                <a:sym typeface="Wingdings" panose="05000000000000000000" pitchFamily="2" charset="2"/>
+              </a:rPr>
+              <a:t>Creating view from multiple tables</a:t>
+            </a:r>
+          </a:p>
+          <a:p>
+            <a:r>
+              <a:rPr lang="en-US" sz="1600" dirty="0">
+                <a:latin typeface="Oxygen" panose="02000503000000000000" pitchFamily="2" charset="0"/>
+              </a:rPr>
+              <a:t>CREATE VIEW product_details AS    </a:t>
+            </a:r>
+          </a:p>
+          <a:p>
+            <a:r>
+              <a:rPr lang="en-US" sz="1600" dirty="0">
+                <a:latin typeface="Oxygen" panose="02000503000000000000" pitchFamily="2" charset="0"/>
+                <a:sym typeface="Wingdings" panose="05000000000000000000" pitchFamily="2" charset="2"/>
+              </a:rPr>
+              <a:t>SELECT 	pg.product_group_name,</a:t>
+            </a:r>
+          </a:p>
+          <a:p>
+            <a:r>
+              <a:rPr lang="en-US" sz="1600" dirty="0">
+                <a:latin typeface="Oxygen" panose="02000503000000000000" pitchFamily="2" charset="0"/>
+                <a:sym typeface="Wingdings" panose="05000000000000000000" pitchFamily="2" charset="2"/>
+              </a:rPr>
+              <a:t>		p.product_name,</a:t>
+            </a:r>
+          </a:p>
+          <a:p>
+            <a:r>
+              <a:rPr lang="en-US" sz="1600" dirty="0">
+                <a:latin typeface="Oxygen" panose="02000503000000000000" pitchFamily="2" charset="0"/>
+                <a:sym typeface="Wingdings" panose="05000000000000000000" pitchFamily="2" charset="2"/>
+              </a:rPr>
+              <a:t>		p.product_price,</a:t>
+            </a:r>
+          </a:p>
+          <a:p>
+            <a:r>
+              <a:rPr lang="en-US" sz="1600" dirty="0">
+                <a:latin typeface="Oxygen" panose="02000503000000000000" pitchFamily="2" charset="0"/>
+                <a:sym typeface="Wingdings" panose="05000000000000000000" pitchFamily="2" charset="2"/>
+              </a:rPr>
+              <a:t>        		p.product_weight</a:t>
+            </a:r>
+          </a:p>
+          <a:p>
+            <a:r>
+              <a:rPr lang="en-US" sz="1600" dirty="0">
+                <a:latin typeface="Oxygen" panose="02000503000000000000" pitchFamily="2" charset="0"/>
+                <a:sym typeface="Wingdings" panose="05000000000000000000" pitchFamily="2" charset="2"/>
+              </a:rPr>
+              <a:t>FROM mst_product p</a:t>
+            </a:r>
+          </a:p>
+          <a:p>
+            <a:r>
+              <a:rPr lang="en-US" sz="1600" dirty="0">
+                <a:latin typeface="Oxygen" panose="02000503000000000000" pitchFamily="2" charset="0"/>
+                <a:sym typeface="Wingdings" panose="05000000000000000000" pitchFamily="2" charset="2"/>
+              </a:rPr>
+              <a:t>INNER JOIN mst_product_group pg</a:t>
+            </a:r>
+          </a:p>
+          <a:p>
+            <a:r>
+              <a:rPr lang="en-US" sz="1600" dirty="0">
+                <a:latin typeface="Oxygen" panose="02000503000000000000" pitchFamily="2" charset="0"/>
+                <a:sym typeface="Wingdings" panose="05000000000000000000" pitchFamily="2" charset="2"/>
+              </a:rPr>
+              <a:t>ON p.product_group_id=pg.product_group_id;</a:t>
+            </a:r>
+          </a:p>
+          <a:p>
+            <a:endParaRPr lang="en-US" sz="1600" b="1" dirty="0">
               <a:latin typeface="Oxygen" panose="02000503000000000000" pitchFamily="2" charset="0"/>
               <a:sym typeface="Wingdings" panose="05000000000000000000" pitchFamily="2" charset="2"/>
             </a:endParaRPr>
           </a:p>
-          <a:p>
-            <a:r>
-              <a:rPr lang="en-US" sz="2000" dirty="0">
-                <a:latin typeface="Oxygen" panose="02000503000000000000" pitchFamily="2" charset="0"/>
-                <a:sym typeface="Wingdings" panose="05000000000000000000" pitchFamily="2" charset="2"/>
-              </a:rPr>
-              <a:t>Below statement creates an index </a:t>
-            </a:r>
-            <a:r>
-              <a:rPr lang="en-US" sz="2000" b="0" i="0" dirty="0">
-                <a:solidFill>
-                  <a:srgbClr val="000000"/>
-                </a:solidFill>
-                <a:effectLst/>
-                <a:latin typeface="Oxygen" panose="02000503000000000000" pitchFamily="2" charset="0"/>
-              </a:rPr>
-              <a:t>on a table. Duplicate values are not allowed.</a:t>
-            </a:r>
-          </a:p>
-          <a:p>
-            <a:r>
-              <a:rPr lang="en-US" sz="2000" b="0" i="0" dirty="0">
-                <a:effectLst/>
-                <a:latin typeface="Oxygen" panose="02000503000000000000" pitchFamily="2" charset="0"/>
-              </a:rPr>
-              <a:t>CREATE UNIQUE INDEX idx_product</a:t>
-            </a:r>
-            <a:br>
-              <a:rPr lang="en-US" sz="2000" dirty="0">
-                <a:latin typeface="Oxygen" panose="02000503000000000000" pitchFamily="2" charset="0"/>
-              </a:rPr>
-            </a:br>
-            <a:r>
-              <a:rPr lang="en-US" sz="2000" b="0" i="0" dirty="0">
-                <a:effectLst/>
-                <a:latin typeface="Oxygen" panose="02000503000000000000" pitchFamily="2" charset="0"/>
-              </a:rPr>
-              <a:t>ON mst_product (product_name);</a:t>
-            </a:r>
-          </a:p>
-          <a:p>
-            <a:endParaRPr lang="en-US" sz="2000" dirty="0">
-              <a:latin typeface="Oxygen" panose="02000503000000000000" pitchFamily="2" charset="0"/>
-              <a:sym typeface="Wingdings" panose="05000000000000000000" pitchFamily="2" charset="2"/>
-            </a:endParaRPr>
-          </a:p>
-          <a:p>
-            <a:endParaRPr lang="en-US" sz="2000" dirty="0">
-              <a:latin typeface="Oxygen" panose="02000503000000000000" pitchFamily="2" charset="0"/>
-              <a:sym typeface="Wingdings" panose="05000000000000000000" pitchFamily="2" charset="2"/>
-            </a:endParaRPr>
-          </a:p>
-          <a:p>
-            <a:r>
-              <a:rPr lang="en-US" sz="2000" dirty="0">
-                <a:latin typeface="Oxygen" panose="02000503000000000000" pitchFamily="2" charset="0"/>
-                <a:sym typeface="Wingdings" panose="05000000000000000000" pitchFamily="2" charset="2"/>
-              </a:rPr>
-              <a:t>Below statement drops an index on a table.</a:t>
-            </a:r>
-          </a:p>
-          <a:p>
-            <a:r>
-              <a:rPr lang="en-US" sz="2000" b="0" dirty="0">
-                <a:effectLst/>
-                <a:latin typeface="Oxygen" panose="02000503000000000000" pitchFamily="2" charset="0"/>
-              </a:rPr>
-              <a:t>ALTER TABLE mst_product</a:t>
-            </a:r>
-            <a:br>
-              <a:rPr lang="en-US" sz="2000" b="0" dirty="0">
-                <a:effectLst/>
-                <a:latin typeface="Oxygen" panose="02000503000000000000" pitchFamily="2" charset="0"/>
-              </a:rPr>
-            </a:br>
-            <a:r>
-              <a:rPr lang="en-US" sz="2000" b="0" dirty="0">
-                <a:effectLst/>
-                <a:latin typeface="Oxygen" panose="02000503000000000000" pitchFamily="2" charset="0"/>
-              </a:rPr>
-              <a:t>DROP INDEX idx_product;</a:t>
-            </a:r>
-            <a:endParaRPr lang="en-US" sz="2000" dirty="0">
-              <a:latin typeface="Oxygen" panose="02000503000000000000" pitchFamily="2" charset="0"/>
-              <a:sym typeface="Wingdings" panose="05000000000000000000" pitchFamily="2" charset="2"/>
-            </a:endParaRPr>
-          </a:p>
         </p:txBody>
       </p:sp>
       <p:sp>
@@ -3873,7 +3993,7 @@
           <p:cNvPr id="5" name="TextBox 4">
             <a:extLst>
               <a:ext uri="{FF2B5EF4-FFF2-40B4-BE49-F238E27FC236}">
-                <a16:creationId xmlns:a16="http://schemas.microsoft.com/office/drawing/2014/main" id="{08289569-A618-3EB1-93ED-5A81B146B280}"/>
+                <a16:creationId xmlns:a16="http://schemas.microsoft.com/office/drawing/2014/main" id="{3ED218C8-093D-55F1-0F58-CDD4A03D4D22}"/>
               </a:ext>
             </a:extLst>
           </p:cNvPr>
@@ -3883,7 +4003,7 @@
         <p:spPr>
           <a:xfrm>
             <a:off x="4245430" y="409871"/>
-            <a:ext cx="3009612" cy="461793"/>
+            <a:ext cx="2699657" cy="457368"/>
           </a:xfrm>
           <a:prstGeom prst="rect">
             <a:avLst/>
@@ -3901,7 +4021,7 @@
               <a:rPr lang="en-US" sz="2401" b="1" cap="small" dirty="0">
                 <a:latin typeface="Oxygen" panose="02000503000000000000" pitchFamily="2" charset="0"/>
               </a:rPr>
-              <a:t>MySQL - INDEXES</a:t>
+              <a:t>MySQL - Views</a:t>
             </a:r>
           </a:p>
         </p:txBody>
@@ -3909,7 +4029,661 @@
     </p:spTree>
     <p:extLst>
       <p:ext uri="{BB962C8B-B14F-4D97-AF65-F5344CB8AC3E}">
-        <p14:creationId xmlns:p14="http://schemas.microsoft.com/office/powerpoint/2010/main" val="1385800701"/>
+        <p14:creationId xmlns:p14="http://schemas.microsoft.com/office/powerpoint/2010/main" val="2132937242"/>
+      </p:ext>
+    </p:extLst>
+  </p:cSld>
+  <p:clrMapOvr>
+    <a:masterClrMapping/>
+  </p:clrMapOvr>
+</p:sld>
+</file>
+
+<file path=ppt/slides/slide11.xml><?xml version="1.0" encoding="utf-8"?>
+<p:sld xmlns:a="http://schemas.openxmlformats.org/drawingml/2006/main" xmlns:r="http://schemas.openxmlformats.org/officeDocument/2006/relationships" xmlns:p="http://schemas.openxmlformats.org/presentationml/2006/main">
+  <p:cSld>
+    <p:spTree>
+      <p:nvGrpSpPr>
+        <p:cNvPr id="1" name="">
+          <a:extLst>
+            <a:ext uri="{FF2B5EF4-FFF2-40B4-BE49-F238E27FC236}">
+              <a16:creationId xmlns:a16="http://schemas.microsoft.com/office/drawing/2014/main" id="{CFB7602E-8804-DCB8-4032-698305B27ADA}"/>
+            </a:ext>
+          </a:extLst>
+        </p:cNvPr>
+        <p:cNvGrpSpPr/>
+        <p:nvPr/>
+      </p:nvGrpSpPr>
+      <p:grpSpPr>
+        <a:xfrm>
+          <a:off x="0" y="0"/>
+          <a:ext cx="0" cy="0"/>
+          <a:chOff x="0" y="0"/>
+          <a:chExt cx="0" cy="0"/>
+        </a:xfrm>
+      </p:grpSpPr>
+      <p:pic>
+        <p:nvPicPr>
+          <p:cNvPr id="15" name="Picture 14">
+            <a:extLst>
+              <a:ext uri="{FF2B5EF4-FFF2-40B4-BE49-F238E27FC236}">
+                <a16:creationId xmlns:a16="http://schemas.microsoft.com/office/drawing/2014/main" id="{E4A70D3D-3BAD-4959-BC46-14B2C618D602}"/>
+              </a:ext>
+            </a:extLst>
+          </p:cNvPr>
+          <p:cNvPicPr>
+            <a:picLocks noChangeAspect="1"/>
+          </p:cNvPicPr>
+          <p:nvPr/>
+        </p:nvPicPr>
+        <p:blipFill>
+          <a:blip r:embed="rId2">
+            <a:extLst>
+              <a:ext uri="{28A0092B-C50C-407E-A947-70E740481C1C}">
+                <a14:useLocalDpi xmlns:a14="http://schemas.microsoft.com/office/drawing/2010/main" val="0"/>
+              </a:ext>
+            </a:extLst>
+          </a:blip>
+          <a:stretch>
+            <a:fillRect/>
+          </a:stretch>
+        </p:blipFill>
+        <p:spPr>
+          <a:xfrm>
+            <a:off x="280522" y="275619"/>
+            <a:ext cx="725875" cy="725875"/>
+          </a:xfrm>
+          <a:prstGeom prst="rect">
+            <a:avLst/>
+          </a:prstGeom>
+        </p:spPr>
+      </p:pic>
+      <p:sp>
+        <p:nvSpPr>
+          <p:cNvPr id="2" name="TextBox 1">
+            <a:extLst>
+              <a:ext uri="{FF2B5EF4-FFF2-40B4-BE49-F238E27FC236}">
+                <a16:creationId xmlns:a16="http://schemas.microsoft.com/office/drawing/2014/main" id="{9A108297-59FA-B916-0494-16A1ACE7C609}"/>
+              </a:ext>
+            </a:extLst>
+          </p:cNvPr>
+          <p:cNvSpPr txBox="1"/>
+          <p:nvPr/>
+        </p:nvSpPr>
+        <p:spPr>
+          <a:xfrm>
+            <a:off x="1122745" y="1001494"/>
+            <a:ext cx="10504577" cy="6986528"/>
+          </a:xfrm>
+          <a:prstGeom prst="rect">
+            <a:avLst/>
+          </a:prstGeom>
+          <a:noFill/>
+        </p:spPr>
+        <p:txBody>
+          <a:bodyPr wrap="square" rtlCol="0">
+            <a:spAutoFit/>
+          </a:bodyPr>
+          <a:lstStyle/>
+          <a:p>
+            <a:r>
+              <a:rPr lang="en-US" sz="1600" dirty="0">
+                <a:latin typeface="Oxygen" panose="02000503000000000000" pitchFamily="2" charset="0"/>
+                <a:sym typeface="Wingdings" panose="05000000000000000000" pitchFamily="2" charset="2"/>
+              </a:rPr>
+              <a:t>DML means Data Manipulation Language.</a:t>
+            </a:r>
+          </a:p>
+          <a:p>
+            <a:r>
+              <a:rPr lang="en-US" sz="1600" dirty="0">
+                <a:latin typeface="Oxygen" panose="02000503000000000000" pitchFamily="2" charset="0"/>
+                <a:sym typeface="Wingdings" panose="05000000000000000000" pitchFamily="2" charset="2"/>
+              </a:rPr>
+              <a:t>In any database CRUD operation happens.</a:t>
+            </a:r>
+          </a:p>
+          <a:p>
+            <a:endParaRPr lang="en-US" sz="1600" dirty="0">
+              <a:latin typeface="Oxygen" panose="02000503000000000000" pitchFamily="2" charset="0"/>
+              <a:sym typeface="Wingdings" panose="05000000000000000000" pitchFamily="2" charset="2"/>
+            </a:endParaRPr>
+          </a:p>
+          <a:p>
+            <a:r>
+              <a:rPr lang="en-US" sz="1600" dirty="0">
+                <a:latin typeface="Oxygen" panose="02000503000000000000" pitchFamily="2" charset="0"/>
+                <a:sym typeface="Wingdings" panose="05000000000000000000" pitchFamily="2" charset="2"/>
+              </a:rPr>
+              <a:t>CRUD means</a:t>
+            </a:r>
+          </a:p>
+          <a:p>
+            <a:pPr marL="285750" indent="-285750">
+              <a:buFont typeface="Wingdings" panose="05000000000000000000" pitchFamily="2" charset="2"/>
+              <a:buChar char="Ø"/>
+            </a:pPr>
+            <a:r>
+              <a:rPr lang="en-US" sz="1600" dirty="0">
+                <a:latin typeface="Oxygen" panose="02000503000000000000" pitchFamily="2" charset="0"/>
+                <a:sym typeface="Wingdings" panose="05000000000000000000" pitchFamily="2" charset="2"/>
+              </a:rPr>
+              <a:t>Create  add new record to the table</a:t>
+            </a:r>
+          </a:p>
+          <a:p>
+            <a:pPr marL="285750" indent="-285750">
+              <a:buFont typeface="Wingdings" panose="05000000000000000000" pitchFamily="2" charset="2"/>
+              <a:buChar char="Ø"/>
+            </a:pPr>
+            <a:endParaRPr lang="en-US" sz="1600" dirty="0">
+              <a:latin typeface="Oxygen" panose="02000503000000000000" pitchFamily="2" charset="0"/>
+              <a:sym typeface="Wingdings" panose="05000000000000000000" pitchFamily="2" charset="2"/>
+            </a:endParaRPr>
+          </a:p>
+          <a:p>
+            <a:pPr marL="285750" indent="-285750">
+              <a:buFont typeface="Wingdings" panose="05000000000000000000" pitchFamily="2" charset="2"/>
+              <a:buChar char="Ø"/>
+            </a:pPr>
+            <a:r>
+              <a:rPr lang="en-US" sz="1600" dirty="0">
+                <a:latin typeface="Oxygen" panose="02000503000000000000" pitchFamily="2" charset="0"/>
+                <a:sym typeface="Wingdings" panose="05000000000000000000" pitchFamily="2" charset="2"/>
+              </a:rPr>
+              <a:t>Read  read existing record(s) from the table</a:t>
+            </a:r>
+          </a:p>
+          <a:p>
+            <a:pPr marL="285750" indent="-285750">
+              <a:buFont typeface="Wingdings" panose="05000000000000000000" pitchFamily="2" charset="2"/>
+              <a:buChar char="Ø"/>
+            </a:pPr>
+            <a:endParaRPr lang="en-US" sz="1600" dirty="0">
+              <a:latin typeface="Oxygen" panose="02000503000000000000" pitchFamily="2" charset="0"/>
+              <a:sym typeface="Wingdings" panose="05000000000000000000" pitchFamily="2" charset="2"/>
+            </a:endParaRPr>
+          </a:p>
+          <a:p>
+            <a:pPr marL="285750" indent="-285750">
+              <a:buFont typeface="Wingdings" panose="05000000000000000000" pitchFamily="2" charset="2"/>
+              <a:buChar char="Ø"/>
+            </a:pPr>
+            <a:r>
+              <a:rPr lang="en-US" sz="1600" dirty="0">
+                <a:latin typeface="Oxygen" panose="02000503000000000000" pitchFamily="2" charset="0"/>
+                <a:sym typeface="Wingdings" panose="05000000000000000000" pitchFamily="2" charset="2"/>
+              </a:rPr>
+              <a:t>Update  update existing record(s) from the table</a:t>
+            </a:r>
+          </a:p>
+          <a:p>
+            <a:pPr marL="285750" indent="-285750">
+              <a:buFont typeface="Wingdings" panose="05000000000000000000" pitchFamily="2" charset="2"/>
+              <a:buChar char="Ø"/>
+            </a:pPr>
+            <a:endParaRPr lang="en-US" sz="1600" dirty="0">
+              <a:latin typeface="Oxygen" panose="02000503000000000000" pitchFamily="2" charset="0"/>
+              <a:sym typeface="Wingdings" panose="05000000000000000000" pitchFamily="2" charset="2"/>
+            </a:endParaRPr>
+          </a:p>
+          <a:p>
+            <a:pPr marL="285750" indent="-285750">
+              <a:buFont typeface="Wingdings" panose="05000000000000000000" pitchFamily="2" charset="2"/>
+              <a:buChar char="Ø"/>
+            </a:pPr>
+            <a:r>
+              <a:rPr lang="en-US" sz="1600" dirty="0">
+                <a:latin typeface="Oxygen" panose="02000503000000000000" pitchFamily="2" charset="0"/>
+                <a:sym typeface="Wingdings" panose="05000000000000000000" pitchFamily="2" charset="2"/>
+              </a:rPr>
+              <a:t>Delete  delete existing record(s) from the table</a:t>
+            </a:r>
+          </a:p>
+          <a:p>
+            <a:endParaRPr lang="en-US" sz="1600" b="1" dirty="0">
+              <a:latin typeface="Oxygen" panose="02000503000000000000" pitchFamily="2" charset="0"/>
+              <a:sym typeface="Wingdings" panose="05000000000000000000" pitchFamily="2" charset="2"/>
+            </a:endParaRPr>
+          </a:p>
+          <a:p>
+            <a:r>
+              <a:rPr lang="en-US" sz="1600" dirty="0">
+                <a:latin typeface="Oxygen" panose="02000503000000000000" pitchFamily="2" charset="0"/>
+                <a:sym typeface="Wingdings" panose="05000000000000000000" pitchFamily="2" charset="2"/>
+              </a:rPr>
+              <a:t>Create  To add new record inside the table, insert statement is used.</a:t>
+            </a:r>
+          </a:p>
+          <a:p>
+            <a:r>
+              <a:rPr lang="en-US" sz="1600" dirty="0">
+                <a:latin typeface="Oxygen" panose="02000503000000000000" pitchFamily="2" charset="0"/>
+                <a:sym typeface="Wingdings" panose="05000000000000000000" pitchFamily="2" charset="2"/>
+              </a:rPr>
+              <a:t>INSERT INTO mst_product </a:t>
+            </a:r>
+          </a:p>
+          <a:p>
+            <a:r>
+              <a:rPr lang="en-US" sz="1600" dirty="0">
+                <a:latin typeface="Oxygen" panose="02000503000000000000" pitchFamily="2" charset="0"/>
+                <a:sym typeface="Wingdings" panose="05000000000000000000" pitchFamily="2" charset="2"/>
+              </a:rPr>
+              <a:t>(</a:t>
+            </a:r>
+          </a:p>
+          <a:p>
+            <a:r>
+              <a:rPr lang="en-US" sz="1600" dirty="0">
+                <a:latin typeface="Oxygen" panose="02000503000000000000" pitchFamily="2" charset="0"/>
+                <a:sym typeface="Wingdings" panose="05000000000000000000" pitchFamily="2" charset="2"/>
+              </a:rPr>
+              <a:t>	`product_id`,</a:t>
+            </a:r>
+          </a:p>
+          <a:p>
+            <a:r>
+              <a:rPr lang="en-US" sz="1600" dirty="0">
+                <a:latin typeface="Oxygen" panose="02000503000000000000" pitchFamily="2" charset="0"/>
+                <a:sym typeface="Wingdings" panose="05000000000000000000" pitchFamily="2" charset="2"/>
+              </a:rPr>
+              <a:t>	`product_group_id`,</a:t>
+            </a:r>
+          </a:p>
+          <a:p>
+            <a:r>
+              <a:rPr lang="en-US" sz="1600" dirty="0">
+                <a:latin typeface="Oxygen" panose="02000503000000000000" pitchFamily="2" charset="0"/>
+                <a:sym typeface="Wingdings" panose="05000000000000000000" pitchFamily="2" charset="2"/>
+              </a:rPr>
+              <a:t>	`product_name`,</a:t>
+            </a:r>
+          </a:p>
+          <a:p>
+            <a:r>
+              <a:rPr lang="en-US" sz="1600" dirty="0">
+                <a:latin typeface="Oxygen" panose="02000503000000000000" pitchFamily="2" charset="0"/>
+                <a:sym typeface="Wingdings" panose="05000000000000000000" pitchFamily="2" charset="2"/>
+              </a:rPr>
+              <a:t>	`product_price`,</a:t>
+            </a:r>
+          </a:p>
+          <a:p>
+            <a:r>
+              <a:rPr lang="en-US" sz="1600" dirty="0">
+                <a:latin typeface="Oxygen" panose="02000503000000000000" pitchFamily="2" charset="0"/>
+                <a:sym typeface="Wingdings" panose="05000000000000000000" pitchFamily="2" charset="2"/>
+              </a:rPr>
+              <a:t>	`product_weight`</a:t>
+            </a:r>
+          </a:p>
+          <a:p>
+            <a:r>
+              <a:rPr lang="en-US" sz="1600" dirty="0">
+                <a:latin typeface="Oxygen" panose="02000503000000000000" pitchFamily="2" charset="0"/>
+                <a:sym typeface="Wingdings" panose="05000000000000000000" pitchFamily="2" charset="2"/>
+              </a:rPr>
+              <a:t>) VALUES</a:t>
+            </a:r>
+          </a:p>
+          <a:p>
+            <a:r>
+              <a:rPr lang="en-US" sz="1600" dirty="0">
+                <a:latin typeface="Oxygen" panose="02000503000000000000" pitchFamily="2" charset="0"/>
+                <a:sym typeface="Wingdings" panose="05000000000000000000" pitchFamily="2" charset="2"/>
+              </a:rPr>
+              <a:t>(	1,</a:t>
+            </a:r>
+          </a:p>
+          <a:p>
+            <a:r>
+              <a:rPr lang="en-US" sz="1600" dirty="0">
+                <a:latin typeface="Oxygen" panose="02000503000000000000" pitchFamily="2" charset="0"/>
+                <a:sym typeface="Wingdings" panose="05000000000000000000" pitchFamily="2" charset="2"/>
+              </a:rPr>
+              <a:t>	1,</a:t>
+            </a:r>
+          </a:p>
+          <a:p>
+            <a:r>
+              <a:rPr lang="en-US" sz="1600" dirty="0">
+                <a:latin typeface="Oxygen" panose="02000503000000000000" pitchFamily="2" charset="0"/>
+                <a:sym typeface="Wingdings" panose="05000000000000000000" pitchFamily="2" charset="2"/>
+              </a:rPr>
+              <a:t>	’Shirt’,</a:t>
+            </a:r>
+          </a:p>
+          <a:p>
+            <a:r>
+              <a:rPr lang="en-US" sz="1600" dirty="0">
+                <a:latin typeface="Oxygen" panose="02000503000000000000" pitchFamily="2" charset="0"/>
+                <a:sym typeface="Wingdings" panose="05000000000000000000" pitchFamily="2" charset="2"/>
+              </a:rPr>
+              <a:t>	100,</a:t>
+            </a:r>
+          </a:p>
+          <a:p>
+            <a:r>
+              <a:rPr lang="en-US" sz="1600" dirty="0">
+                <a:latin typeface="Oxygen" panose="02000503000000000000" pitchFamily="2" charset="0"/>
+                <a:sym typeface="Wingdings" panose="05000000000000000000" pitchFamily="2" charset="2"/>
+              </a:rPr>
+              <a:t>	2</a:t>
+            </a:r>
+          </a:p>
+          <a:p>
+            <a:r>
+              <a:rPr lang="en-US" sz="1600" dirty="0">
+                <a:latin typeface="Oxygen" panose="02000503000000000000" pitchFamily="2" charset="0"/>
+                <a:sym typeface="Wingdings" panose="05000000000000000000" pitchFamily="2" charset="2"/>
+              </a:rPr>
+              <a:t>);</a:t>
+            </a:r>
+          </a:p>
+          <a:p>
+            <a:endParaRPr lang="en-US" sz="1600" b="1" dirty="0">
+              <a:latin typeface="Oxygen" panose="02000503000000000000" pitchFamily="2" charset="0"/>
+              <a:sym typeface="Wingdings" panose="05000000000000000000" pitchFamily="2" charset="2"/>
+            </a:endParaRPr>
+          </a:p>
+        </p:txBody>
+      </p:sp>
+      <p:sp>
+        <p:nvSpPr>
+          <p:cNvPr id="5" name="TextBox 4">
+            <a:extLst>
+              <a:ext uri="{FF2B5EF4-FFF2-40B4-BE49-F238E27FC236}">
+                <a16:creationId xmlns:a16="http://schemas.microsoft.com/office/drawing/2014/main" id="{3641DF2C-1285-15F0-D09B-EBF2B66E90B3}"/>
+              </a:ext>
+            </a:extLst>
+          </p:cNvPr>
+          <p:cNvSpPr txBox="1"/>
+          <p:nvPr/>
+        </p:nvSpPr>
+        <p:spPr>
+          <a:xfrm>
+            <a:off x="4245430" y="409871"/>
+            <a:ext cx="2699657" cy="457368"/>
+          </a:xfrm>
+          <a:prstGeom prst="rect">
+            <a:avLst/>
+          </a:prstGeom>
+          <a:noFill/>
+        </p:spPr>
+        <p:txBody>
+          <a:bodyPr wrap="square" rtlCol="0">
+            <a:spAutoFit/>
+          </a:bodyPr>
+          <a:lstStyle/>
+          <a:p>
+            <a:pPr algn="ctr"/>
+            <a:r>
+              <a:rPr lang="en-US" sz="2401" b="1" cap="small" dirty="0">
+                <a:latin typeface="Oxygen" panose="02000503000000000000" pitchFamily="2" charset="0"/>
+              </a:rPr>
+              <a:t>DML Statement</a:t>
+            </a:r>
+          </a:p>
+        </p:txBody>
+      </p:sp>
+    </p:spTree>
+    <p:extLst>
+      <p:ext uri="{BB962C8B-B14F-4D97-AF65-F5344CB8AC3E}">
+        <p14:creationId xmlns:p14="http://schemas.microsoft.com/office/powerpoint/2010/main" val="3655026325"/>
+      </p:ext>
+    </p:extLst>
+  </p:cSld>
+  <p:clrMapOvr>
+    <a:masterClrMapping/>
+  </p:clrMapOvr>
+</p:sld>
+</file>
+
+<file path=ppt/slides/slide12.xml><?xml version="1.0" encoding="utf-8"?>
+<p:sld xmlns:a="http://schemas.openxmlformats.org/drawingml/2006/main" xmlns:r="http://schemas.openxmlformats.org/officeDocument/2006/relationships" xmlns:p="http://schemas.openxmlformats.org/presentationml/2006/main">
+  <p:cSld>
+    <p:spTree>
+      <p:nvGrpSpPr>
+        <p:cNvPr id="1" name="">
+          <a:extLst>
+            <a:ext uri="{FF2B5EF4-FFF2-40B4-BE49-F238E27FC236}">
+              <a16:creationId xmlns:a16="http://schemas.microsoft.com/office/drawing/2014/main" id="{C2AFBD53-A0CB-503B-8D75-ECB519B3040E}"/>
+            </a:ext>
+          </a:extLst>
+        </p:cNvPr>
+        <p:cNvGrpSpPr/>
+        <p:nvPr/>
+      </p:nvGrpSpPr>
+      <p:grpSpPr>
+        <a:xfrm>
+          <a:off x="0" y="0"/>
+          <a:ext cx="0" cy="0"/>
+          <a:chOff x="0" y="0"/>
+          <a:chExt cx="0" cy="0"/>
+        </a:xfrm>
+      </p:grpSpPr>
+      <p:pic>
+        <p:nvPicPr>
+          <p:cNvPr id="15" name="Picture 14">
+            <a:extLst>
+              <a:ext uri="{FF2B5EF4-FFF2-40B4-BE49-F238E27FC236}">
+                <a16:creationId xmlns:a16="http://schemas.microsoft.com/office/drawing/2014/main" id="{677113DE-05CE-99F6-51F1-4FB4F7AA7E2E}"/>
+              </a:ext>
+            </a:extLst>
+          </p:cNvPr>
+          <p:cNvPicPr>
+            <a:picLocks noChangeAspect="1"/>
+          </p:cNvPicPr>
+          <p:nvPr/>
+        </p:nvPicPr>
+        <p:blipFill>
+          <a:blip r:embed="rId2">
+            <a:extLst>
+              <a:ext uri="{28A0092B-C50C-407E-A947-70E740481C1C}">
+                <a14:useLocalDpi xmlns:a14="http://schemas.microsoft.com/office/drawing/2010/main" val="0"/>
+              </a:ext>
+            </a:extLst>
+          </a:blip>
+          <a:stretch>
+            <a:fillRect/>
+          </a:stretch>
+        </p:blipFill>
+        <p:spPr>
+          <a:xfrm>
+            <a:off x="280522" y="275619"/>
+            <a:ext cx="725875" cy="725875"/>
+          </a:xfrm>
+          <a:prstGeom prst="rect">
+            <a:avLst/>
+          </a:prstGeom>
+        </p:spPr>
+      </p:pic>
+      <p:sp>
+        <p:nvSpPr>
+          <p:cNvPr id="2" name="TextBox 1">
+            <a:extLst>
+              <a:ext uri="{FF2B5EF4-FFF2-40B4-BE49-F238E27FC236}">
+                <a16:creationId xmlns:a16="http://schemas.microsoft.com/office/drawing/2014/main" id="{813BB768-E5B5-EC77-3862-786944B5D9B9}"/>
+              </a:ext>
+            </a:extLst>
+          </p:cNvPr>
+          <p:cNvSpPr txBox="1"/>
+          <p:nvPr/>
+        </p:nvSpPr>
+        <p:spPr>
+          <a:xfrm>
+            <a:off x="1122745" y="1001494"/>
+            <a:ext cx="10504577" cy="3539430"/>
+          </a:xfrm>
+          <a:prstGeom prst="rect">
+            <a:avLst/>
+          </a:prstGeom>
+          <a:noFill/>
+        </p:spPr>
+        <p:txBody>
+          <a:bodyPr wrap="square" rtlCol="0">
+            <a:spAutoFit/>
+          </a:bodyPr>
+          <a:lstStyle/>
+          <a:p>
+            <a:r>
+              <a:rPr lang="en-US" sz="1600" dirty="0">
+                <a:latin typeface="Oxygen" panose="02000503000000000000" pitchFamily="2" charset="0"/>
+                <a:sym typeface="Wingdings" panose="05000000000000000000" pitchFamily="2" charset="2"/>
+              </a:rPr>
+              <a:t>Read  To read existing record(s) from table, SELECT statement is used</a:t>
+            </a:r>
+          </a:p>
+          <a:p>
+            <a:r>
+              <a:rPr lang="en-US" sz="1600" dirty="0">
+                <a:latin typeface="Oxygen" panose="02000503000000000000" pitchFamily="2" charset="0"/>
+                <a:sym typeface="Wingdings" panose="05000000000000000000" pitchFamily="2" charset="2"/>
+              </a:rPr>
+              <a:t>SELECT product_id,product_name</a:t>
+            </a:r>
+          </a:p>
+          <a:p>
+            <a:r>
+              <a:rPr lang="en-US" sz="1600" dirty="0">
+                <a:latin typeface="Oxygen" panose="02000503000000000000" pitchFamily="2" charset="0"/>
+                <a:sym typeface="Wingdings" panose="05000000000000000000" pitchFamily="2" charset="2"/>
+              </a:rPr>
+              <a:t>FROM mst_product;</a:t>
+            </a:r>
+          </a:p>
+          <a:p>
+            <a:endParaRPr lang="en-US" sz="1600" dirty="0">
+              <a:latin typeface="Oxygen" panose="02000503000000000000" pitchFamily="2" charset="0"/>
+              <a:sym typeface="Wingdings" panose="05000000000000000000" pitchFamily="2" charset="2"/>
+            </a:endParaRPr>
+          </a:p>
+          <a:p>
+            <a:r>
+              <a:rPr lang="en-US" sz="1600" dirty="0">
+                <a:latin typeface="Oxygen" panose="02000503000000000000" pitchFamily="2" charset="0"/>
+                <a:sym typeface="Wingdings" panose="05000000000000000000" pitchFamily="2" charset="2"/>
+              </a:rPr>
+              <a:t>Update  To update existing record(s) from table, UPDATE statement is used</a:t>
+            </a:r>
+          </a:p>
+          <a:p>
+            <a:r>
+              <a:rPr lang="en-US" sz="1600" dirty="0">
+                <a:latin typeface="Oxygen" panose="02000503000000000000" pitchFamily="2" charset="0"/>
+                <a:sym typeface="Wingdings" panose="05000000000000000000" pitchFamily="2" charset="2"/>
+              </a:rPr>
+              <a:t>UPDATE mst_product</a:t>
+            </a:r>
+          </a:p>
+          <a:p>
+            <a:r>
+              <a:rPr lang="en-US" sz="1600" dirty="0">
+                <a:latin typeface="Oxygen" panose="02000503000000000000" pitchFamily="2" charset="0"/>
+                <a:sym typeface="Wingdings" panose="05000000000000000000" pitchFamily="2" charset="2"/>
+              </a:rPr>
+              <a:t>SET product_name=‘trouser’</a:t>
+            </a:r>
+          </a:p>
+          <a:p>
+            <a:r>
+              <a:rPr lang="en-US" sz="1600" dirty="0">
+                <a:latin typeface="Oxygen" panose="02000503000000000000" pitchFamily="2" charset="0"/>
+                <a:sym typeface="Wingdings" panose="05000000000000000000" pitchFamily="2" charset="2"/>
+              </a:rPr>
+              <a:t>WHERE product_id=1;</a:t>
+            </a:r>
+          </a:p>
+          <a:p>
+            <a:endParaRPr lang="en-US" sz="1600" dirty="0">
+              <a:latin typeface="Oxygen" panose="02000503000000000000" pitchFamily="2" charset="0"/>
+              <a:sym typeface="Wingdings" panose="05000000000000000000" pitchFamily="2" charset="2"/>
+            </a:endParaRPr>
+          </a:p>
+          <a:p>
+            <a:r>
+              <a:rPr lang="en-US" sz="1600" dirty="0">
+                <a:latin typeface="Oxygen" panose="02000503000000000000" pitchFamily="2" charset="0"/>
+                <a:sym typeface="Wingdings" panose="05000000000000000000" pitchFamily="2" charset="2"/>
+              </a:rPr>
+              <a:t>Delete  To delete existing record(s) from table, DELETE statement is used</a:t>
+            </a:r>
+          </a:p>
+          <a:p>
+            <a:r>
+              <a:rPr lang="en-US" sz="1600" dirty="0">
+                <a:latin typeface="Oxygen" panose="02000503000000000000" pitchFamily="2" charset="0"/>
+                <a:sym typeface="Wingdings" panose="05000000000000000000" pitchFamily="2" charset="2"/>
+              </a:rPr>
+              <a:t>DELETE FROM mst_product</a:t>
+            </a:r>
+          </a:p>
+          <a:p>
+            <a:r>
+              <a:rPr lang="en-US" sz="1600" dirty="0">
+                <a:latin typeface="Oxygen" panose="02000503000000000000" pitchFamily="2" charset="0"/>
+                <a:sym typeface="Wingdings" panose="05000000000000000000" pitchFamily="2" charset="2"/>
+              </a:rPr>
+              <a:t>WHERE product_id=1;</a:t>
+            </a:r>
+          </a:p>
+          <a:p>
+            <a:endParaRPr lang="en-US" sz="1600" b="1" dirty="0">
+              <a:latin typeface="Oxygen" panose="02000503000000000000" pitchFamily="2" charset="0"/>
+              <a:sym typeface="Wingdings" panose="05000000000000000000" pitchFamily="2" charset="2"/>
+            </a:endParaRPr>
+          </a:p>
+          <a:p>
+            <a:endParaRPr lang="en-US" sz="1600" b="1" dirty="0">
+              <a:latin typeface="Oxygen" panose="02000503000000000000" pitchFamily="2" charset="0"/>
+              <a:sym typeface="Wingdings" panose="05000000000000000000" pitchFamily="2" charset="2"/>
+            </a:endParaRPr>
+          </a:p>
+        </p:txBody>
+      </p:sp>
+      <p:sp>
+        <p:nvSpPr>
+          <p:cNvPr id="5" name="TextBox 4">
+            <a:extLst>
+              <a:ext uri="{FF2B5EF4-FFF2-40B4-BE49-F238E27FC236}">
+                <a16:creationId xmlns:a16="http://schemas.microsoft.com/office/drawing/2014/main" id="{6043285E-237F-376B-1492-35D1F916DD70}"/>
+              </a:ext>
+            </a:extLst>
+          </p:cNvPr>
+          <p:cNvSpPr txBox="1"/>
+          <p:nvPr/>
+        </p:nvSpPr>
+        <p:spPr>
+          <a:xfrm>
+            <a:off x="4245430" y="409871"/>
+            <a:ext cx="2699657" cy="457368"/>
+          </a:xfrm>
+          <a:prstGeom prst="rect">
+            <a:avLst/>
+          </a:prstGeom>
+          <a:noFill/>
+        </p:spPr>
+        <p:txBody>
+          <a:bodyPr wrap="square" rtlCol="0">
+            <a:spAutoFit/>
+          </a:bodyPr>
+          <a:lstStyle/>
+          <a:p>
+            <a:pPr algn="ctr"/>
+            <a:r>
+              <a:rPr lang="en-US" sz="2401" b="1" cap="small" dirty="0">
+                <a:latin typeface="Oxygen" panose="02000503000000000000" pitchFamily="2" charset="0"/>
+              </a:rPr>
+              <a:t>DML Statement</a:t>
+            </a:r>
+          </a:p>
+        </p:txBody>
+      </p:sp>
+    </p:spTree>
+    <p:extLst>
+      <p:ext uri="{BB962C8B-B14F-4D97-AF65-F5344CB8AC3E}">
+        <p14:creationId xmlns:p14="http://schemas.microsoft.com/office/powerpoint/2010/main" val="3405344823"/>
       </p:ext>
     </p:extLst>
   </p:cSld>
@@ -4544,44 +5318,16 @@
                 <a:latin typeface="Oxygen" panose="02000503000000000000" pitchFamily="2" charset="0"/>
                 <a:sym typeface="Wingdings" panose="05000000000000000000" pitchFamily="2" charset="2"/>
               </a:rPr>
-              <a:t>	</a:t>
-            </a:r>
-            <a:r>
-              <a:rPr lang="en-IN" sz="1600" dirty="0" err="1">
-                <a:latin typeface="Oxygen" panose="02000503000000000000" pitchFamily="2" charset="0"/>
-                <a:sym typeface="Wingdings" panose="05000000000000000000" pitchFamily="2" charset="2"/>
-              </a:rPr>
-              <a:t>emp_id</a:t>
-            </a:r>
+              <a:t>	emp_id int,</a:t>
+            </a:r>
+          </a:p>
+          <a:p>
             <a:r>
               <a:rPr lang="en-IN" sz="1600" dirty="0">
                 <a:latin typeface="Oxygen" panose="02000503000000000000" pitchFamily="2" charset="0"/>
                 <a:sym typeface="Wingdings" panose="05000000000000000000" pitchFamily="2" charset="2"/>
               </a:rPr>
-              <a:t> int,</a:t>
-            </a:r>
-          </a:p>
-          <a:p>
-            <a:r>
-              <a:rPr lang="en-IN" sz="1600" dirty="0">
-                <a:latin typeface="Oxygen" panose="02000503000000000000" pitchFamily="2" charset="0"/>
-                <a:sym typeface="Wingdings" panose="05000000000000000000" pitchFamily="2" charset="2"/>
-              </a:rPr>
-              <a:t>	</a:t>
-            </a:r>
-            <a:r>
-              <a:rPr lang="en-IN" sz="1600" dirty="0" err="1">
-                <a:latin typeface="Oxygen" panose="02000503000000000000" pitchFamily="2" charset="0"/>
-                <a:sym typeface="Wingdings" panose="05000000000000000000" pitchFamily="2" charset="2"/>
-              </a:rPr>
-              <a:t>emp_name</a:t>
-            </a:r>
-            <a:r>
-              <a:rPr lang="en-IN" sz="1600" dirty="0">
-                <a:latin typeface="Oxygen" panose="02000503000000000000" pitchFamily="2" charset="0"/>
-                <a:sym typeface="Wingdings" panose="05000000000000000000" pitchFamily="2" charset="2"/>
-              </a:rPr>
-              <a:t> varchar(50),</a:t>
+              <a:t>	emp_name varchar(50),</a:t>
             </a:r>
           </a:p>
           <a:p>
@@ -4630,31 +5376,14 @@
               <a:rPr lang="en-IN" sz="1600" dirty="0">
                 <a:latin typeface="Oxygen" panose="02000503000000000000" pitchFamily="2" charset="0"/>
               </a:rPr>
-              <a:t>a) </a:t>
-            </a:r>
-            <a:r>
-              <a:rPr lang="en-IN" sz="1600" dirty="0" err="1">
-                <a:latin typeface="Oxygen" panose="02000503000000000000" pitchFamily="2" charset="0"/>
-              </a:rPr>
-              <a:t>emp_id</a:t>
-            </a:r>
-            <a:r>
-              <a:rPr lang="en-IN" sz="1600" dirty="0">
-                <a:latin typeface="Oxygen" panose="02000503000000000000" pitchFamily="2" charset="0"/>
-              </a:rPr>
-              <a:t> </a:t>
+              <a:t>a) emp_id </a:t>
             </a:r>
           </a:p>
           <a:p>
             <a:r>
               <a:rPr lang="en-IN" dirty="0"/>
-              <a:t>b) </a:t>
-            </a:r>
-            <a:r>
-              <a:rPr lang="en-IN" dirty="0" err="1"/>
-              <a:t>emp_name</a:t>
-            </a:r>
-            <a:endParaRPr lang="en-IN" dirty="0"/>
+              <a:t>b) emp_name</a:t>
+            </a:r>
           </a:p>
           <a:p>
             <a:r>
@@ -6762,7 +7491,7 @@
         <p:cNvPr id="1" name="">
           <a:extLst>
             <a:ext uri="{FF2B5EF4-FFF2-40B4-BE49-F238E27FC236}">
-              <a16:creationId xmlns:a16="http://schemas.microsoft.com/office/drawing/2014/main" id="{6BEDA106-3D21-31E3-4BF7-25E332300305}"/>
+              <a16:creationId xmlns:a16="http://schemas.microsoft.com/office/drawing/2014/main" id="{3EA6FA98-1D7C-FA09-C210-8DAF497AFE52}"/>
             </a:ext>
           </a:extLst>
         </p:cNvPr>
@@ -6782,7 +7511,7 @@
           <p:cNvPr id="15" name="Picture 14">
             <a:extLst>
               <a:ext uri="{FF2B5EF4-FFF2-40B4-BE49-F238E27FC236}">
-                <a16:creationId xmlns:a16="http://schemas.microsoft.com/office/drawing/2014/main" id="{5AF0C8E7-FC2A-7F5F-5C79-B3C65F4A2D38}"/>
+                <a16:creationId xmlns:a16="http://schemas.microsoft.com/office/drawing/2014/main" id="{5C4F78F3-A0E6-2A69-BEA0-90FE79B8AD0B}"/>
               </a:ext>
             </a:extLst>
           </p:cNvPr>
@@ -6805,7 +7534,7 @@
         </p:blipFill>
         <p:spPr>
           <a:xfrm>
-            <a:off x="280522" y="275619"/>
+            <a:off x="330371" y="275619"/>
             <a:ext cx="725875" cy="725875"/>
           </a:xfrm>
           <a:prstGeom prst="rect">
@@ -6818,7 +7547,7 @@
           <p:cNvPr id="2" name="TextBox 1">
             <a:extLst>
               <a:ext uri="{FF2B5EF4-FFF2-40B4-BE49-F238E27FC236}">
-                <a16:creationId xmlns:a16="http://schemas.microsoft.com/office/drawing/2014/main" id="{C0F9FB86-CFAA-FB66-A69E-3B41C3979D86}"/>
+                <a16:creationId xmlns:a16="http://schemas.microsoft.com/office/drawing/2014/main" id="{2EE67381-FDCA-C718-C129-F09B79DE7712}"/>
               </a:ext>
             </a:extLst>
           </p:cNvPr>
@@ -6827,8 +7556,8 @@
         </p:nvSpPr>
         <p:spPr>
           <a:xfrm>
-            <a:off x="1122745" y="1001494"/>
-            <a:ext cx="10504577" cy="7478970"/>
+            <a:off x="1122745" y="1647670"/>
+            <a:ext cx="10504577" cy="5324535"/>
           </a:xfrm>
           <a:prstGeom prst="rect">
             <a:avLst/>
@@ -6842,291 +7571,173 @@
           <a:lstStyle/>
           <a:p>
             <a:r>
-              <a:rPr lang="en-US" sz="1600" dirty="0">
-                <a:latin typeface="Oxygen" panose="02000503000000000000" pitchFamily="2" charset="0"/>
-                <a:sym typeface="Wingdings" panose="05000000000000000000" pitchFamily="2" charset="2"/>
-              </a:rPr>
-              <a:t>In MySQL, a view is a virtual table which is created by SQL query by joining one or more tables.</a:t>
-            </a:r>
-          </a:p>
-          <a:p>
-            <a:r>
-              <a:rPr lang="en-US" sz="1600" dirty="0">
-                <a:latin typeface="Oxygen" panose="02000503000000000000" pitchFamily="2" charset="0"/>
-                <a:sym typeface="Wingdings" panose="05000000000000000000" pitchFamily="2" charset="2"/>
-              </a:rPr>
-              <a:t>It is operated like a table but does not contain any data of its own.</a:t>
-            </a:r>
-          </a:p>
-          <a:p>
-            <a:r>
-              <a:rPr lang="en-US" sz="1600" dirty="0">
-                <a:solidFill>
-                  <a:srgbClr val="333333"/>
-                </a:solidFill>
-                <a:latin typeface="Oxygen" panose="02000503000000000000" pitchFamily="2" charset="0"/>
-              </a:rPr>
-              <a:t>Views are definitions built on top of other tables (or views). </a:t>
-            </a:r>
-            <a:endParaRPr lang="en-US" sz="1600" dirty="0">
+              <a:rPr lang="en-US" sz="2000" dirty="0">
+                <a:latin typeface="Oxygen" panose="02000503000000000000" pitchFamily="2" charset="0"/>
+                <a:sym typeface="Wingdings" panose="05000000000000000000" pitchFamily="2" charset="2"/>
+              </a:rPr>
+              <a:t>Indexes are used to retrieve data from databases.</a:t>
+            </a:r>
+          </a:p>
+          <a:p>
+            <a:r>
+              <a:rPr lang="en-US" sz="2000" dirty="0">
+                <a:latin typeface="Oxygen" panose="02000503000000000000" pitchFamily="2" charset="0"/>
+                <a:sym typeface="Wingdings" panose="05000000000000000000" pitchFamily="2" charset="2"/>
+              </a:rPr>
+              <a:t>Users cannot see the indexes, they are used to speed up the searches/queries.</a:t>
+            </a:r>
+          </a:p>
+          <a:p>
+            <a:endParaRPr lang="en-US" sz="2000" dirty="0">
               <a:latin typeface="Oxygen" panose="02000503000000000000" pitchFamily="2" charset="0"/>
               <a:sym typeface="Wingdings" panose="05000000000000000000" pitchFamily="2" charset="2"/>
             </a:endParaRPr>
           </a:p>
           <a:p>
-            <a:r>
-              <a:rPr lang="en-US" sz="1600" dirty="0">
-                <a:latin typeface="Oxygen" panose="02000503000000000000" pitchFamily="2" charset="0"/>
-                <a:sym typeface="Wingdings" panose="05000000000000000000" pitchFamily="2" charset="2"/>
-              </a:rPr>
-              <a:t>If the underlying table or tables data changes, the view gets reflected.</a:t>
-            </a:r>
-          </a:p>
-          <a:p>
-            <a:endParaRPr lang="en-US" sz="1600" dirty="0">
+            <a:endParaRPr lang="en-US" sz="2000" dirty="0">
               <a:latin typeface="Oxygen" panose="02000503000000000000" pitchFamily="2" charset="0"/>
               <a:sym typeface="Wingdings" panose="05000000000000000000" pitchFamily="2" charset="2"/>
             </a:endParaRPr>
           </a:p>
           <a:p>
             <a:r>
-              <a:rPr lang="en-US" sz="1600" b="1" dirty="0">
-                <a:latin typeface="Oxygen" panose="02000503000000000000" pitchFamily="2" charset="0"/>
-                <a:sym typeface="Wingdings" panose="05000000000000000000" pitchFamily="2" charset="2"/>
-              </a:rPr>
-              <a:t>Create View</a:t>
-            </a:r>
-          </a:p>
-          <a:p>
-            <a:pPr algn="just"/>
-            <a:r>
-              <a:rPr lang="en-US" sz="1600" dirty="0">
-                <a:latin typeface="Oxygen" panose="02000503000000000000" pitchFamily="2" charset="0"/>
-              </a:rPr>
-              <a:t>CREATE VIEW product_details AS    </a:t>
-            </a:r>
-          </a:p>
-          <a:p>
-            <a:pPr algn="just"/>
-            <a:r>
-              <a:rPr lang="en-US" sz="1600" dirty="0">
-                <a:latin typeface="Oxygen" panose="02000503000000000000" pitchFamily="2" charset="0"/>
-              </a:rPr>
-              <a:t>SELECT product_name,product_price,product_weight</a:t>
-            </a:r>
-          </a:p>
-          <a:p>
-            <a:pPr algn="just"/>
-            <a:r>
-              <a:rPr lang="en-US" sz="1600" dirty="0">
-                <a:latin typeface="Oxygen" panose="02000503000000000000" pitchFamily="2" charset="0"/>
-              </a:rPr>
-              <a:t>FROM mst_product;    </a:t>
-            </a:r>
-          </a:p>
-          <a:p>
-            <a:endParaRPr lang="en-US" sz="1600" dirty="0">
+              <a:rPr lang="en-US" sz="2000" dirty="0">
+                <a:latin typeface="Oxygen" panose="02000503000000000000" pitchFamily="2" charset="0"/>
+                <a:sym typeface="Wingdings" panose="05000000000000000000" pitchFamily="2" charset="2"/>
+              </a:rPr>
+              <a:t>Below statement creates an index </a:t>
+            </a:r>
+            <a:r>
+              <a:rPr lang="en-US" sz="2000" b="0" i="0" dirty="0">
+                <a:solidFill>
+                  <a:srgbClr val="000000"/>
+                </a:solidFill>
+                <a:effectLst/>
+                <a:latin typeface="Oxygen" panose="02000503000000000000" pitchFamily="2" charset="0"/>
+              </a:rPr>
+              <a:t>on a table. Duplicate values are allowed.</a:t>
+            </a:r>
+          </a:p>
+          <a:p>
+            <a:r>
+              <a:rPr lang="en-US" sz="2000" b="0" i="0" dirty="0">
+                <a:effectLst/>
+                <a:latin typeface="Oxygen" panose="02000503000000000000" pitchFamily="2" charset="0"/>
+              </a:rPr>
+              <a:t>CREATE INDEX idx_product</a:t>
+            </a:r>
+            <a:br>
+              <a:rPr lang="en-US" sz="2000" dirty="0">
+                <a:latin typeface="Oxygen" panose="02000503000000000000" pitchFamily="2" charset="0"/>
+              </a:rPr>
+            </a:br>
+            <a:r>
+              <a:rPr lang="en-US" sz="2000" b="0" i="0" dirty="0">
+                <a:effectLst/>
+                <a:latin typeface="Oxygen" panose="02000503000000000000" pitchFamily="2" charset="0"/>
+              </a:rPr>
+              <a:t>ON mst_product (product_name);</a:t>
+            </a:r>
+          </a:p>
+          <a:p>
+            <a:endParaRPr lang="en-US" sz="2000" b="0" i="0" dirty="0">
+              <a:effectLst/>
+              <a:latin typeface="Oxygen" panose="02000503000000000000" pitchFamily="2" charset="0"/>
+            </a:endParaRPr>
+          </a:p>
+          <a:p>
+            <a:endParaRPr lang="en-US" sz="2000" dirty="0">
               <a:latin typeface="Oxygen" panose="02000503000000000000" pitchFamily="2" charset="0"/>
               <a:sym typeface="Wingdings" panose="05000000000000000000" pitchFamily="2" charset="2"/>
             </a:endParaRPr>
           </a:p>
           <a:p>
             <a:r>
-              <a:rPr lang="en-US" sz="1600" b="1" dirty="0">
-                <a:latin typeface="Oxygen" panose="02000503000000000000" pitchFamily="2" charset="0"/>
-                <a:sym typeface="Wingdings" panose="05000000000000000000" pitchFamily="2" charset="2"/>
-              </a:rPr>
-              <a:t>Update View</a:t>
-            </a:r>
-          </a:p>
-          <a:p>
-            <a:pPr algn="just"/>
-            <a:r>
-              <a:rPr lang="en-US" sz="1600" dirty="0">
-                <a:latin typeface="Oxygen" panose="02000503000000000000" pitchFamily="2" charset="0"/>
-              </a:rPr>
-              <a:t>ALTER</a:t>
-            </a:r>
-            <a:r>
-              <a:rPr lang="en-US" sz="1600" dirty="0">
+              <a:rPr lang="en-US" sz="2000" dirty="0">
+                <a:latin typeface="Oxygen" panose="02000503000000000000" pitchFamily="2" charset="0"/>
+                <a:sym typeface="Wingdings" panose="05000000000000000000" pitchFamily="2" charset="2"/>
+              </a:rPr>
+              <a:t>Below statement creates an index </a:t>
+            </a:r>
+            <a:r>
+              <a:rPr lang="en-US" sz="2000" b="0" i="0" dirty="0">
                 <a:solidFill>
                   <a:srgbClr val="000000"/>
                 </a:solidFill>
-                <a:latin typeface="inter-regular"/>
-              </a:rPr>
-              <a:t> </a:t>
-            </a:r>
-            <a:r>
-              <a:rPr lang="en-US" sz="1600" dirty="0">
-                <a:latin typeface="Oxygen" panose="02000503000000000000" pitchFamily="2" charset="0"/>
-              </a:rPr>
-              <a:t>VIEW product_details AS    </a:t>
-            </a:r>
-          </a:p>
-          <a:p>
-            <a:pPr algn="just"/>
-            <a:r>
-              <a:rPr lang="en-US" sz="1600" dirty="0">
-                <a:latin typeface="Oxygen" panose="02000503000000000000" pitchFamily="2" charset="0"/>
-              </a:rPr>
-              <a:t>SELECT product_name,product_price,product_weight</a:t>
-            </a:r>
-          </a:p>
-          <a:p>
-            <a:pPr algn="just"/>
-            <a:r>
-              <a:rPr lang="en-US" sz="1600" dirty="0">
-                <a:latin typeface="Oxygen" panose="02000503000000000000" pitchFamily="2" charset="0"/>
-              </a:rPr>
-              <a:t>FROM mst_product</a:t>
-            </a:r>
-          </a:p>
-          <a:p>
-            <a:pPr algn="just"/>
-            <a:r>
-              <a:rPr lang="en-US" sz="1600" dirty="0">
-                <a:solidFill>
-                  <a:srgbClr val="000000"/>
-                </a:solidFill>
-                <a:latin typeface="Oxygen" panose="02000503000000000000" pitchFamily="2" charset="0"/>
-              </a:rPr>
-              <a:t>WHERE product_price &gt; 100</a:t>
-            </a:r>
-            <a:endParaRPr lang="en-US" sz="1600" dirty="0">
-              <a:solidFill>
-                <a:srgbClr val="000000"/>
-              </a:solidFill>
-              <a:latin typeface="inter-regular"/>
-            </a:endParaRPr>
-          </a:p>
-          <a:p>
-            <a:pPr algn="just"/>
-            <a:r>
-              <a:rPr lang="en-US" sz="1600" dirty="0">
-                <a:solidFill>
-                  <a:srgbClr val="000000"/>
-                </a:solidFill>
-                <a:latin typeface="inter-regular"/>
-              </a:rPr>
-              <a:t> </a:t>
-            </a:r>
-          </a:p>
-          <a:p>
-            <a:pPr algn="just"/>
-            <a:r>
-              <a:rPr lang="en-US" sz="1600" b="1" dirty="0">
-                <a:solidFill>
-                  <a:srgbClr val="000000"/>
-                </a:solidFill>
-                <a:latin typeface="Oxygen" panose="02000503000000000000" pitchFamily="2" charset="0"/>
-              </a:rPr>
-              <a:t>Drop View</a:t>
-            </a:r>
-          </a:p>
-          <a:p>
-            <a:pPr algn="just"/>
-            <a:r>
-              <a:rPr lang="en-US" sz="1600" dirty="0">
-                <a:latin typeface="Oxygen" panose="02000503000000000000" pitchFamily="2" charset="0"/>
-              </a:rPr>
-              <a:t>DROP VIEW product_details ;    </a:t>
-            </a:r>
-          </a:p>
-          <a:p>
-            <a:pPr algn="just"/>
-            <a:endParaRPr lang="en-US" sz="1600" dirty="0">
-              <a:solidFill>
-                <a:srgbClr val="000000"/>
-              </a:solidFill>
-              <a:latin typeface="inter-regular"/>
-            </a:endParaRPr>
-          </a:p>
-          <a:p>
-            <a:r>
-              <a:rPr lang="en-US" sz="1600" b="1" dirty="0">
-                <a:latin typeface="Oxygen" panose="02000503000000000000" pitchFamily="2" charset="0"/>
-                <a:sym typeface="Wingdings" panose="05000000000000000000" pitchFamily="2" charset="2"/>
-              </a:rPr>
-              <a:t>Creating view from multiple tables</a:t>
-            </a:r>
-          </a:p>
-          <a:p>
-            <a:r>
-              <a:rPr lang="en-US" sz="1600" dirty="0">
-                <a:latin typeface="Oxygen" panose="02000503000000000000" pitchFamily="2" charset="0"/>
-              </a:rPr>
-              <a:t>CREATE VIEW product_details AS    </a:t>
-            </a:r>
-          </a:p>
-          <a:p>
-            <a:r>
-              <a:rPr lang="en-US" sz="1600" dirty="0">
-                <a:latin typeface="Oxygen" panose="02000503000000000000" pitchFamily="2" charset="0"/>
-                <a:sym typeface="Wingdings" panose="05000000000000000000" pitchFamily="2" charset="2"/>
-              </a:rPr>
-              <a:t>SELECT 	pg.product_group_name,</a:t>
-            </a:r>
-          </a:p>
-          <a:p>
-            <a:r>
-              <a:rPr lang="en-US" sz="1600" dirty="0">
-                <a:latin typeface="Oxygen" panose="02000503000000000000" pitchFamily="2" charset="0"/>
-                <a:sym typeface="Wingdings" panose="05000000000000000000" pitchFamily="2" charset="2"/>
-              </a:rPr>
-              <a:t>		p.product_name,</a:t>
-            </a:r>
-          </a:p>
-          <a:p>
-            <a:r>
-              <a:rPr lang="en-US" sz="1600" dirty="0">
-                <a:latin typeface="Oxygen" panose="02000503000000000000" pitchFamily="2" charset="0"/>
-                <a:sym typeface="Wingdings" panose="05000000000000000000" pitchFamily="2" charset="2"/>
-              </a:rPr>
-              <a:t>		p.product_price,</a:t>
-            </a:r>
-          </a:p>
-          <a:p>
-            <a:r>
-              <a:rPr lang="en-US" sz="1600" dirty="0">
-                <a:latin typeface="Oxygen" panose="02000503000000000000" pitchFamily="2" charset="0"/>
-                <a:sym typeface="Wingdings" panose="05000000000000000000" pitchFamily="2" charset="2"/>
-              </a:rPr>
-              <a:t>        		p.product_weight</a:t>
-            </a:r>
-          </a:p>
-          <a:p>
-            <a:r>
-              <a:rPr lang="en-US" sz="1600" dirty="0">
-                <a:latin typeface="Oxygen" panose="02000503000000000000" pitchFamily="2" charset="0"/>
-                <a:sym typeface="Wingdings" panose="05000000000000000000" pitchFamily="2" charset="2"/>
-              </a:rPr>
-              <a:t>FROM mst_product p</a:t>
-            </a:r>
-          </a:p>
-          <a:p>
-            <a:r>
-              <a:rPr lang="en-US" sz="1600" dirty="0">
-                <a:latin typeface="Oxygen" panose="02000503000000000000" pitchFamily="2" charset="0"/>
-                <a:sym typeface="Wingdings" panose="05000000000000000000" pitchFamily="2" charset="2"/>
-              </a:rPr>
-              <a:t>INNER JOIN mst_product_group pg</a:t>
-            </a:r>
-          </a:p>
-          <a:p>
-            <a:r>
-              <a:rPr lang="en-US" sz="1600" dirty="0">
-                <a:latin typeface="Oxygen" panose="02000503000000000000" pitchFamily="2" charset="0"/>
-                <a:sym typeface="Wingdings" panose="05000000000000000000" pitchFamily="2" charset="2"/>
-              </a:rPr>
-              <a:t>ON p.product_group_id=pg.product_group_id;</a:t>
-            </a:r>
-          </a:p>
-          <a:p>
-            <a:endParaRPr lang="en-US" sz="1600" b="1" dirty="0">
+                <a:effectLst/>
+                <a:latin typeface="Oxygen" panose="02000503000000000000" pitchFamily="2" charset="0"/>
+              </a:rPr>
+              <a:t>on a table. Duplicate values are not allowed.</a:t>
+            </a:r>
+          </a:p>
+          <a:p>
+            <a:r>
+              <a:rPr lang="en-US" sz="2000" b="0" i="0" dirty="0">
+                <a:effectLst/>
+                <a:latin typeface="Oxygen" panose="02000503000000000000" pitchFamily="2" charset="0"/>
+              </a:rPr>
+              <a:t>CREATE UNIQUE INDEX idx_product</a:t>
+            </a:r>
+            <a:br>
+              <a:rPr lang="en-US" sz="2000" dirty="0">
+                <a:latin typeface="Oxygen" panose="02000503000000000000" pitchFamily="2" charset="0"/>
+              </a:rPr>
+            </a:br>
+            <a:r>
+              <a:rPr lang="en-US" sz="2000" b="0" i="0" dirty="0">
+                <a:effectLst/>
+                <a:latin typeface="Oxygen" panose="02000503000000000000" pitchFamily="2" charset="0"/>
+              </a:rPr>
+              <a:t>ON mst_product (product_name);</a:t>
+            </a:r>
+          </a:p>
+          <a:p>
+            <a:endParaRPr lang="en-US" sz="2000" dirty="0">
               <a:latin typeface="Oxygen" panose="02000503000000000000" pitchFamily="2" charset="0"/>
               <a:sym typeface="Wingdings" panose="05000000000000000000" pitchFamily="2" charset="2"/>
             </a:endParaRPr>
           </a:p>
+          <a:p>
+            <a:endParaRPr lang="en-US" sz="2000" dirty="0">
+              <a:latin typeface="Oxygen" panose="02000503000000000000" pitchFamily="2" charset="0"/>
+              <a:sym typeface="Wingdings" panose="05000000000000000000" pitchFamily="2" charset="2"/>
+            </a:endParaRPr>
+          </a:p>
+          <a:p>
+            <a:r>
+              <a:rPr lang="en-US" sz="2000" dirty="0">
+                <a:latin typeface="Oxygen" panose="02000503000000000000" pitchFamily="2" charset="0"/>
+                <a:sym typeface="Wingdings" panose="05000000000000000000" pitchFamily="2" charset="2"/>
+              </a:rPr>
+              <a:t>Below statement drops an index on a table.</a:t>
+            </a:r>
+          </a:p>
+          <a:p>
+            <a:r>
+              <a:rPr lang="en-US" sz="2000" b="0" dirty="0">
+                <a:effectLst/>
+                <a:latin typeface="Oxygen" panose="02000503000000000000" pitchFamily="2" charset="0"/>
+              </a:rPr>
+              <a:t>ALTER TABLE mst_product</a:t>
+            </a:r>
+            <a:br>
+              <a:rPr lang="en-US" sz="2000" b="0" dirty="0">
+                <a:effectLst/>
+                <a:latin typeface="Oxygen" panose="02000503000000000000" pitchFamily="2" charset="0"/>
+              </a:rPr>
+            </a:br>
+            <a:r>
+              <a:rPr lang="en-US" sz="2000" b="0" dirty="0">
+                <a:effectLst/>
+                <a:latin typeface="Oxygen" panose="02000503000000000000" pitchFamily="2" charset="0"/>
+              </a:rPr>
+              <a:t>DROP INDEX idx_product;</a:t>
+            </a:r>
+            <a:endParaRPr lang="en-US" sz="2000" dirty="0">
+              <a:latin typeface="Oxygen" panose="02000503000000000000" pitchFamily="2" charset="0"/>
+              <a:sym typeface="Wingdings" panose="05000000000000000000" pitchFamily="2" charset="2"/>
+            </a:endParaRPr>
+          </a:p>
         </p:txBody>
       </p:sp>
       <p:sp>
@@ -7134,7 +7745,7 @@
           <p:cNvPr id="5" name="TextBox 4">
             <a:extLst>
               <a:ext uri="{FF2B5EF4-FFF2-40B4-BE49-F238E27FC236}">
-                <a16:creationId xmlns:a16="http://schemas.microsoft.com/office/drawing/2014/main" id="{3ED218C8-093D-55F1-0F58-CDD4A03D4D22}"/>
+                <a16:creationId xmlns:a16="http://schemas.microsoft.com/office/drawing/2014/main" id="{08289569-A618-3EB1-93ED-5A81B146B280}"/>
               </a:ext>
             </a:extLst>
           </p:cNvPr>
@@ -7144,7 +7755,7 @@
         <p:spPr>
           <a:xfrm>
             <a:off x="4245430" y="409871"/>
-            <a:ext cx="2699657" cy="457368"/>
+            <a:ext cx="3009612" cy="461793"/>
           </a:xfrm>
           <a:prstGeom prst="rect">
             <a:avLst/>
@@ -7162,7 +7773,7 @@
               <a:rPr lang="en-US" sz="2401" b="1" cap="small" dirty="0">
                 <a:latin typeface="Oxygen" panose="02000503000000000000" pitchFamily="2" charset="0"/>
               </a:rPr>
-              <a:t>MySQL - Views</a:t>
+              <a:t>MySQL - INDEXES</a:t>
             </a:r>
           </a:p>
         </p:txBody>
@@ -7170,7 +7781,7 @@
     </p:spTree>
     <p:extLst>
       <p:ext uri="{BB962C8B-B14F-4D97-AF65-F5344CB8AC3E}">
-        <p14:creationId xmlns:p14="http://schemas.microsoft.com/office/powerpoint/2010/main" val="2132937242"/>
+        <p14:creationId xmlns:p14="http://schemas.microsoft.com/office/powerpoint/2010/main" val="1385800701"/>
       </p:ext>
     </p:extLst>
   </p:cSld>

</xml_diff>

<commit_message>
MySQL is in progress
MySQL is in progress
</commit_message>
<xml_diff>
--- a/Offline/BusinessManagement/Teach_Tech@anodiam/IT/CourseMaterials/MySQL/MySQL.pptx
+++ b/Offline/BusinessManagement/Teach_Tech@anodiam/IT/CourseMaterials/MySQL/MySQL.pptx
@@ -5,7 +5,7 @@
     <p:sldMasterId id="2147483720" r:id="rId1"/>
   </p:sldMasterIdLst>
   <p:notesMasterIdLst>
-    <p:notesMasterId r:id="rId15"/>
+    <p:notesMasterId r:id="rId16"/>
   </p:notesMasterIdLst>
   <p:sldIdLst>
     <p:sldId id="259" r:id="rId2"/>
@@ -21,6 +21,7 @@
     <p:sldId id="270" r:id="rId12"/>
     <p:sldId id="272" r:id="rId13"/>
     <p:sldId id="271" r:id="rId14"/>
+    <p:sldId id="273" r:id="rId15"/>
   </p:sldIdLst>
   <p:sldSz cx="12192000" cy="8640763"/>
   <p:notesSz cx="6858000" cy="9144000"/>
@@ -3918,7 +3919,21 @@
                 <a:latin typeface="Oxygen" panose="02000503000000000000" pitchFamily="2" charset="0"/>
                 <a:sym typeface="Wingdings" panose="05000000000000000000" pitchFamily="2" charset="2"/>
               </a:rPr>
-              <a:t>SELECT 	pg.product_group_name,</a:t>
+              <a:t>SELECT 	</a:t>
+            </a:r>
+            <a:r>
+              <a:rPr lang="en-US" dirty="0" err="1">
+                <a:latin typeface="Oxygen" panose="02000503000000000000" pitchFamily="2" charset="0"/>
+                <a:sym typeface="Wingdings" panose="05000000000000000000" pitchFamily="2" charset="2"/>
+              </a:rPr>
+              <a:t>pg.product_group_name</a:t>
+            </a:r>
+            <a:r>
+              <a:rPr lang="en-US" dirty="0">
+                <a:latin typeface="Oxygen" panose="02000503000000000000" pitchFamily="2" charset="0"/>
+                <a:sym typeface="Wingdings" panose="05000000000000000000" pitchFamily="2" charset="2"/>
+              </a:rPr>
+              <a:t>,</a:t>
             </a:r>
           </a:p>
           <a:p>
@@ -5295,7 +5310,7 @@
         <p:spPr>
           <a:xfrm>
             <a:off x="1006399" y="775099"/>
-            <a:ext cx="11067917" cy="7971413"/>
+            <a:ext cx="11067917" cy="7610400"/>
           </a:xfrm>
           <a:prstGeom prst="rect">
             <a:avLst/>
@@ -5644,6 +5659,455 @@
     <p:extLst>
       <p:ext uri="{BB962C8B-B14F-4D97-AF65-F5344CB8AC3E}">
         <p14:creationId xmlns:p14="http://schemas.microsoft.com/office/powerpoint/2010/main" val="3405344823"/>
+      </p:ext>
+    </p:extLst>
+  </p:cSld>
+  <p:clrMapOvr>
+    <a:masterClrMapping/>
+  </p:clrMapOvr>
+</p:sld>
+</file>
+
+<file path=ppt/slides/slide14.xml><?xml version="1.0" encoding="utf-8"?>
+<p:sld xmlns:a="http://schemas.openxmlformats.org/drawingml/2006/main" xmlns:r="http://schemas.openxmlformats.org/officeDocument/2006/relationships" xmlns:p="http://schemas.openxmlformats.org/presentationml/2006/main">
+  <p:cSld>
+    <p:spTree>
+      <p:nvGrpSpPr>
+        <p:cNvPr id="1" name="">
+          <a:extLst>
+            <a:ext uri="{FF2B5EF4-FFF2-40B4-BE49-F238E27FC236}">
+              <a16:creationId xmlns:a16="http://schemas.microsoft.com/office/drawing/2014/main" id="{08C4D106-E66A-E7E7-12F1-50E0D1026505}"/>
+            </a:ext>
+          </a:extLst>
+        </p:cNvPr>
+        <p:cNvGrpSpPr/>
+        <p:nvPr/>
+      </p:nvGrpSpPr>
+      <p:grpSpPr>
+        <a:xfrm>
+          <a:off x="0" y="0"/>
+          <a:ext cx="0" cy="0"/>
+          <a:chOff x="0" y="0"/>
+          <a:chExt cx="0" cy="0"/>
+        </a:xfrm>
+      </p:grpSpPr>
+      <p:pic>
+        <p:nvPicPr>
+          <p:cNvPr id="15" name="Picture 14">
+            <a:extLst>
+              <a:ext uri="{FF2B5EF4-FFF2-40B4-BE49-F238E27FC236}">
+                <a16:creationId xmlns:a16="http://schemas.microsoft.com/office/drawing/2014/main" id="{25AB81F6-99E3-BE97-DB26-906C58FF79EB}"/>
+              </a:ext>
+            </a:extLst>
+          </p:cNvPr>
+          <p:cNvPicPr>
+            <a:picLocks noChangeAspect="1"/>
+          </p:cNvPicPr>
+          <p:nvPr/>
+        </p:nvPicPr>
+        <p:blipFill>
+          <a:blip r:embed="rId2">
+            <a:extLst>
+              <a:ext uri="{28A0092B-C50C-407E-A947-70E740481C1C}">
+                <a14:useLocalDpi xmlns:a14="http://schemas.microsoft.com/office/drawing/2010/main" val="0"/>
+              </a:ext>
+            </a:extLst>
+          </a:blip>
+          <a:stretch>
+            <a:fillRect/>
+          </a:stretch>
+        </p:blipFill>
+        <p:spPr>
+          <a:xfrm>
+            <a:off x="202146" y="133537"/>
+            <a:ext cx="725875" cy="725875"/>
+          </a:xfrm>
+          <a:prstGeom prst="rect">
+            <a:avLst/>
+          </a:prstGeom>
+        </p:spPr>
+      </p:pic>
+      <p:sp>
+        <p:nvSpPr>
+          <p:cNvPr id="2" name="TextBox 1">
+            <a:extLst>
+              <a:ext uri="{FF2B5EF4-FFF2-40B4-BE49-F238E27FC236}">
+                <a16:creationId xmlns:a16="http://schemas.microsoft.com/office/drawing/2014/main" id="{CEE7E3AE-73C7-90AE-E3BE-058AB3490E68}"/>
+              </a:ext>
+            </a:extLst>
+          </p:cNvPr>
+          <p:cNvSpPr txBox="1"/>
+          <p:nvPr/>
+        </p:nvSpPr>
+        <p:spPr>
+          <a:xfrm>
+            <a:off x="1084216" y="823407"/>
+            <a:ext cx="11051185" cy="7668000"/>
+          </a:xfrm>
+          <a:prstGeom prst="rect">
+            <a:avLst/>
+          </a:prstGeom>
+          <a:noFill/>
+        </p:spPr>
+        <p:txBody>
+          <a:bodyPr wrap="square" rtlCol="0">
+            <a:spAutoFit/>
+          </a:bodyPr>
+          <a:lstStyle/>
+          <a:p>
+            <a:r>
+              <a:rPr lang="en-US" sz="2000" b="1" dirty="0">
+                <a:latin typeface="Oxygen" panose="02000503000000000000" pitchFamily="2" charset="0"/>
+                <a:sym typeface="Wingdings" panose="05000000000000000000" pitchFamily="2" charset="2"/>
+              </a:rPr>
+              <a:t>JOINS</a:t>
+            </a:r>
+          </a:p>
+          <a:p>
+            <a:endParaRPr lang="en-US" sz="2000" b="1" dirty="0">
+              <a:latin typeface="Oxygen" panose="02000503000000000000" pitchFamily="2" charset="0"/>
+              <a:sym typeface="Wingdings" panose="05000000000000000000" pitchFamily="2" charset="2"/>
+            </a:endParaRPr>
+          </a:p>
+          <a:p>
+            <a:r>
+              <a:rPr lang="en-US" sz="2000" b="1" dirty="0">
+                <a:latin typeface="Oxygen" panose="02000503000000000000" pitchFamily="2" charset="0"/>
+                <a:sym typeface="Wingdings" panose="05000000000000000000" pitchFamily="2" charset="2"/>
+              </a:rPr>
+              <a:t>There are 2 types of joins</a:t>
+            </a:r>
+          </a:p>
+          <a:p>
+            <a:r>
+              <a:rPr lang="en-US" sz="2000" b="1" dirty="0">
+                <a:latin typeface="Oxygen" panose="02000503000000000000" pitchFamily="2" charset="0"/>
+                <a:sym typeface="Wingdings" panose="05000000000000000000" pitchFamily="2" charset="2"/>
+              </a:rPr>
+              <a:t> </a:t>
+            </a:r>
+          </a:p>
+          <a:p>
+            <a:r>
+              <a:rPr lang="en-US" sz="2000" b="1" dirty="0">
+                <a:latin typeface="Oxygen" panose="02000503000000000000" pitchFamily="2" charset="0"/>
+                <a:sym typeface="Wingdings" panose="05000000000000000000" pitchFamily="2" charset="2"/>
+              </a:rPr>
+              <a:t>INNER Join</a:t>
+            </a:r>
+          </a:p>
+          <a:p>
+            <a:pPr marL="342900" indent="-342900">
+              <a:buFont typeface="Wingdings" panose="05000000000000000000" pitchFamily="2" charset="2"/>
+              <a:buChar char="Ø"/>
+            </a:pPr>
+            <a:r>
+              <a:rPr lang="en-US" sz="2000" b="1" dirty="0">
+                <a:latin typeface="Oxygen" panose="02000503000000000000" pitchFamily="2" charset="0"/>
+                <a:sym typeface="Wingdings" panose="05000000000000000000" pitchFamily="2" charset="2"/>
+              </a:rPr>
+              <a:t>OUTER Join</a:t>
+            </a:r>
+          </a:p>
+          <a:p>
+            <a:r>
+              <a:rPr lang="en-US" sz="2000" b="1" dirty="0">
+                <a:latin typeface="Oxygen" panose="02000503000000000000" pitchFamily="2" charset="0"/>
+                <a:sym typeface="Wingdings" panose="05000000000000000000" pitchFamily="2" charset="2"/>
+              </a:rPr>
+              <a:t>      Outer Join can be 2 types</a:t>
+            </a:r>
+          </a:p>
+          <a:p>
+            <a:r>
+              <a:rPr lang="en-US" sz="2000" b="1" dirty="0">
+                <a:latin typeface="Oxygen" panose="02000503000000000000" pitchFamily="2" charset="0"/>
+                <a:sym typeface="Wingdings" panose="05000000000000000000" pitchFamily="2" charset="2"/>
+              </a:rPr>
+              <a:t>		a) Left Join</a:t>
+            </a:r>
+          </a:p>
+          <a:p>
+            <a:r>
+              <a:rPr lang="en-US" sz="2000" b="1" dirty="0">
+                <a:latin typeface="Oxygen" panose="02000503000000000000" pitchFamily="2" charset="0"/>
+                <a:sym typeface="Wingdings" panose="05000000000000000000" pitchFamily="2" charset="2"/>
+              </a:rPr>
+              <a:t>		b) Right Join</a:t>
+            </a:r>
+          </a:p>
+          <a:p>
+            <a:endParaRPr lang="en-US" sz="2000" b="1" dirty="0">
+              <a:latin typeface="Oxygen" panose="02000503000000000000" pitchFamily="2" charset="0"/>
+              <a:sym typeface="Wingdings" panose="05000000000000000000" pitchFamily="2" charset="2"/>
+            </a:endParaRPr>
+          </a:p>
+          <a:p>
+            <a:r>
+              <a:rPr lang="en-US" sz="2000" b="1" dirty="0">
+                <a:latin typeface="Oxygen" panose="02000503000000000000" pitchFamily="2" charset="0"/>
+                <a:sym typeface="Wingdings" panose="05000000000000000000" pitchFamily="2" charset="2"/>
+              </a:rPr>
+              <a:t>Inner Join  </a:t>
+            </a:r>
+            <a:r>
+              <a:rPr lang="en-US" sz="2000" dirty="0">
+                <a:latin typeface="Oxygen" panose="02000503000000000000" pitchFamily="2" charset="0"/>
+                <a:sym typeface="Wingdings" panose="05000000000000000000" pitchFamily="2" charset="2"/>
+              </a:rPr>
+              <a:t>retrieves </a:t>
+            </a:r>
+            <a:r>
+              <a:rPr lang="en-US" sz="2000" i="0" dirty="0">
+                <a:solidFill>
+                  <a:srgbClr val="000000"/>
+                </a:solidFill>
+                <a:effectLst/>
+                <a:latin typeface="Oxygen" panose="02000503000000000000" pitchFamily="2" charset="0"/>
+              </a:rPr>
+              <a:t>records that have matching values in both tables.</a:t>
+            </a:r>
+            <a:endParaRPr lang="en-US" sz="2000" dirty="0">
+              <a:latin typeface="Oxygen" panose="02000503000000000000" pitchFamily="2" charset="0"/>
+              <a:sym typeface="Wingdings" panose="05000000000000000000" pitchFamily="2" charset="2"/>
+            </a:endParaRPr>
+          </a:p>
+          <a:p>
+            <a:r>
+              <a:rPr lang="en-US" sz="2000" dirty="0">
+                <a:latin typeface="Oxygen" panose="02000503000000000000" pitchFamily="2" charset="0"/>
+                <a:sym typeface="Wingdings" panose="05000000000000000000" pitchFamily="2" charset="2"/>
+              </a:rPr>
+              <a:t>SELECT pg.product_group_name,p.product_name,</a:t>
+            </a:r>
+          </a:p>
+          <a:p>
+            <a:r>
+              <a:rPr lang="en-US" sz="2000" dirty="0">
+                <a:latin typeface="Oxygen" panose="02000503000000000000" pitchFamily="2" charset="0"/>
+                <a:sym typeface="Wingdings" panose="05000000000000000000" pitchFamily="2" charset="2"/>
+              </a:rPr>
+              <a:t>		p.product_price,p.product_weight</a:t>
+            </a:r>
+          </a:p>
+          <a:p>
+            <a:r>
+              <a:rPr lang="en-US" sz="2000" dirty="0">
+                <a:latin typeface="Oxygen" panose="02000503000000000000" pitchFamily="2" charset="0"/>
+                <a:sym typeface="Wingdings" panose="05000000000000000000" pitchFamily="2" charset="2"/>
+              </a:rPr>
+              <a:t>FROM mst_product p</a:t>
+            </a:r>
+          </a:p>
+          <a:p>
+            <a:r>
+              <a:rPr lang="en-US" sz="2000" dirty="0">
+                <a:latin typeface="Oxygen" panose="02000503000000000000" pitchFamily="2" charset="0"/>
+                <a:sym typeface="Wingdings" panose="05000000000000000000" pitchFamily="2" charset="2"/>
+              </a:rPr>
+              <a:t>INNER JOIN mst_product_group pg</a:t>
+            </a:r>
+          </a:p>
+          <a:p>
+            <a:r>
+              <a:rPr lang="en-US" sz="2000" dirty="0">
+                <a:latin typeface="Oxygen" panose="02000503000000000000" pitchFamily="2" charset="0"/>
+                <a:sym typeface="Wingdings" panose="05000000000000000000" pitchFamily="2" charset="2"/>
+              </a:rPr>
+              <a:t>ON p.product_group_id=pg.product_group_id;</a:t>
+            </a:r>
+          </a:p>
+          <a:p>
+            <a:endParaRPr lang="en-US" sz="2000" dirty="0">
+              <a:latin typeface="Oxygen" panose="02000503000000000000" pitchFamily="2" charset="0"/>
+              <a:sym typeface="Wingdings" panose="05000000000000000000" pitchFamily="2" charset="2"/>
+            </a:endParaRPr>
+          </a:p>
+          <a:p>
+            <a:r>
+              <a:rPr lang="en-US" sz="2000" b="1" dirty="0">
+                <a:latin typeface="Oxygen" panose="02000503000000000000" pitchFamily="2" charset="0"/>
+                <a:sym typeface="Wingdings" panose="05000000000000000000" pitchFamily="2" charset="2"/>
+              </a:rPr>
+              <a:t>LEFT Join  </a:t>
+            </a:r>
+            <a:r>
+              <a:rPr lang="en-US" sz="2000" b="0" i="0" dirty="0">
+                <a:solidFill>
+                  <a:srgbClr val="000000"/>
+                </a:solidFill>
+                <a:effectLst/>
+                <a:latin typeface="Oxygen" panose="02000503000000000000" pitchFamily="2" charset="0"/>
+              </a:rPr>
+              <a:t>returns all records from the left table and the matching records from the right table</a:t>
+            </a:r>
+            <a:r>
+              <a:rPr lang="en-US" sz="2000" i="0" dirty="0">
+                <a:solidFill>
+                  <a:srgbClr val="000000"/>
+                </a:solidFill>
+                <a:effectLst/>
+                <a:latin typeface="Oxygen" panose="02000503000000000000" pitchFamily="2" charset="0"/>
+              </a:rPr>
+              <a:t>. </a:t>
+            </a:r>
+            <a:r>
+              <a:rPr lang="en-US" sz="2000" dirty="0">
+                <a:solidFill>
+                  <a:srgbClr val="000000"/>
+                </a:solidFill>
+                <a:latin typeface="Oxygen" panose="02000503000000000000" pitchFamily="2" charset="0"/>
+              </a:rPr>
+              <a:t>Right join is just opposite to left join.</a:t>
+            </a:r>
+            <a:endParaRPr lang="en-US" sz="2000" dirty="0">
+              <a:latin typeface="Oxygen" panose="02000503000000000000" pitchFamily="2" charset="0"/>
+              <a:sym typeface="Wingdings" panose="05000000000000000000" pitchFamily="2" charset="2"/>
+            </a:endParaRPr>
+          </a:p>
+          <a:p>
+            <a:r>
+              <a:rPr lang="en-US" sz="2000" dirty="0">
+                <a:latin typeface="Oxygen" panose="02000503000000000000" pitchFamily="2" charset="0"/>
+                <a:sym typeface="Wingdings" panose="05000000000000000000" pitchFamily="2" charset="2"/>
+              </a:rPr>
+              <a:t>SELECT pg.product_group_name,p.product_name,</a:t>
+            </a:r>
+          </a:p>
+          <a:p>
+            <a:r>
+              <a:rPr lang="en-US" sz="2000" dirty="0">
+                <a:latin typeface="Oxygen" panose="02000503000000000000" pitchFamily="2" charset="0"/>
+                <a:sym typeface="Wingdings" panose="05000000000000000000" pitchFamily="2" charset="2"/>
+              </a:rPr>
+              <a:t>		p.product_price,p.product_weight</a:t>
+            </a:r>
+          </a:p>
+          <a:p>
+            <a:r>
+              <a:rPr lang="en-US" sz="2000" dirty="0">
+                <a:latin typeface="Oxygen" panose="02000503000000000000" pitchFamily="2" charset="0"/>
+                <a:sym typeface="Wingdings" panose="05000000000000000000" pitchFamily="2" charset="2"/>
+              </a:rPr>
+              <a:t>FROM mst_product p</a:t>
+            </a:r>
+          </a:p>
+          <a:p>
+            <a:r>
+              <a:rPr lang="en-US" sz="2000" dirty="0">
+                <a:latin typeface="Oxygen" panose="02000503000000000000" pitchFamily="2" charset="0"/>
+                <a:sym typeface="Wingdings" panose="05000000000000000000" pitchFamily="2" charset="2"/>
+              </a:rPr>
+              <a:t>LEFT JOIN mst_product_group pg</a:t>
+            </a:r>
+          </a:p>
+          <a:p>
+            <a:r>
+              <a:rPr lang="en-US" sz="2000" dirty="0">
+                <a:latin typeface="Oxygen" panose="02000503000000000000" pitchFamily="2" charset="0"/>
+                <a:sym typeface="Wingdings" panose="05000000000000000000" pitchFamily="2" charset="2"/>
+              </a:rPr>
+              <a:t>ON p.product_group_id=pg.product_group_id;</a:t>
+            </a:r>
+          </a:p>
+          <a:p>
+            <a:endParaRPr lang="en-US" sz="2000" dirty="0">
+              <a:latin typeface="Oxygen" panose="02000503000000000000" pitchFamily="2" charset="0"/>
+              <a:sym typeface="Wingdings" panose="05000000000000000000" pitchFamily="2" charset="2"/>
+            </a:endParaRPr>
+          </a:p>
+          <a:p>
+            <a:endParaRPr lang="en-US" sz="2000" b="1" dirty="0">
+              <a:latin typeface="Oxygen" panose="02000503000000000000" pitchFamily="2" charset="0"/>
+              <a:sym typeface="Wingdings" panose="05000000000000000000" pitchFamily="2" charset="2"/>
+            </a:endParaRPr>
+          </a:p>
+          <a:p>
+            <a:endParaRPr lang="en-US" sz="2000" b="1" dirty="0">
+              <a:latin typeface="Oxygen" panose="02000503000000000000" pitchFamily="2" charset="0"/>
+              <a:sym typeface="Wingdings" panose="05000000000000000000" pitchFamily="2" charset="2"/>
+            </a:endParaRPr>
+          </a:p>
+          <a:p>
+            <a:endParaRPr lang="en-US" sz="2000" b="1" dirty="0">
+              <a:latin typeface="Oxygen" panose="02000503000000000000" pitchFamily="2" charset="0"/>
+              <a:sym typeface="Wingdings" panose="05000000000000000000" pitchFamily="2" charset="2"/>
+            </a:endParaRPr>
+          </a:p>
+          <a:p>
+            <a:endParaRPr lang="en-US" sz="2000" b="1" dirty="0">
+              <a:latin typeface="Oxygen" panose="02000503000000000000" pitchFamily="2" charset="0"/>
+              <a:sym typeface="Wingdings" panose="05000000000000000000" pitchFamily="2" charset="2"/>
+            </a:endParaRPr>
+          </a:p>
+          <a:p>
+            <a:endParaRPr lang="en-US" sz="2000" b="1" dirty="0">
+              <a:latin typeface="Oxygen" panose="02000503000000000000" pitchFamily="2" charset="0"/>
+              <a:sym typeface="Wingdings" panose="05000000000000000000" pitchFamily="2" charset="2"/>
+            </a:endParaRPr>
+          </a:p>
+          <a:p>
+            <a:endParaRPr lang="en-US" sz="2000" b="1" dirty="0">
+              <a:latin typeface="Oxygen" panose="02000503000000000000" pitchFamily="2" charset="0"/>
+              <a:sym typeface="Wingdings" panose="05000000000000000000" pitchFamily="2" charset="2"/>
+            </a:endParaRPr>
+          </a:p>
+          <a:p>
+            <a:endParaRPr lang="en-US" sz="2000" b="1" dirty="0">
+              <a:latin typeface="Oxygen" panose="02000503000000000000" pitchFamily="2" charset="0"/>
+              <a:sym typeface="Wingdings" panose="05000000000000000000" pitchFamily="2" charset="2"/>
+            </a:endParaRPr>
+          </a:p>
+          <a:p>
+            <a:endParaRPr lang="en-US" sz="1600" b="1" dirty="0">
+              <a:latin typeface="Oxygen" panose="02000503000000000000" pitchFamily="2" charset="0"/>
+              <a:sym typeface="Wingdings" panose="05000000000000000000" pitchFamily="2" charset="2"/>
+            </a:endParaRPr>
+          </a:p>
+        </p:txBody>
+      </p:sp>
+      <p:sp>
+        <p:nvSpPr>
+          <p:cNvPr id="5" name="TextBox 4">
+            <a:extLst>
+              <a:ext uri="{FF2B5EF4-FFF2-40B4-BE49-F238E27FC236}">
+                <a16:creationId xmlns:a16="http://schemas.microsoft.com/office/drawing/2014/main" id="{AB6CD064-1217-E5F9-CA95-156311FC54B4}"/>
+              </a:ext>
+            </a:extLst>
+          </p:cNvPr>
+          <p:cNvSpPr txBox="1"/>
+          <p:nvPr/>
+        </p:nvSpPr>
+        <p:spPr>
+          <a:xfrm>
+            <a:off x="4454440" y="189410"/>
+            <a:ext cx="2699657" cy="457368"/>
+          </a:xfrm>
+          <a:prstGeom prst="rect">
+            <a:avLst/>
+          </a:prstGeom>
+          <a:noFill/>
+        </p:spPr>
+        <p:txBody>
+          <a:bodyPr wrap="square" rtlCol="0">
+            <a:spAutoFit/>
+          </a:bodyPr>
+          <a:lstStyle/>
+          <a:p>
+            <a:pPr algn="ctr"/>
+            <a:r>
+              <a:rPr lang="en-US" sz="2401" b="1" cap="small" dirty="0">
+                <a:latin typeface="Oxygen" panose="02000503000000000000" pitchFamily="2" charset="0"/>
+              </a:rPr>
+              <a:t>DML Statement</a:t>
+            </a:r>
+          </a:p>
+        </p:txBody>
+      </p:sp>
+    </p:spTree>
+    <p:extLst>
+      <p:ext uri="{BB962C8B-B14F-4D97-AF65-F5344CB8AC3E}">
+        <p14:creationId xmlns:p14="http://schemas.microsoft.com/office/powerpoint/2010/main" val="903311954"/>
       </p:ext>
     </p:extLst>
   </p:cSld>

</xml_diff>